<commit_message>
Binary Tree  Interview Questions -> Diameter + Check for BST + Convert a BT to LL + Print all nodes at distance k.
</commit_message>
<xml_diff>
--- a/Day 26/Class - 26.pptx
+++ b/Day 26/Class - 26.pptx
@@ -234,7 +234,7 @@
           <a:p>
             <a:fld id="{8CCFA85B-F0D0-46B4-B4F4-F331F321C77C}" type="datetimeFigureOut">
               <a:rPr lang="en-IN" smtClean="0"/>
-              <a:t>27-05-2022</a:t>
+              <a:t>30-05-2022</a:t>
             </a:fld>
             <a:endParaRPr lang="en-IN"/>
           </a:p>
@@ -1698,20 +1698,20 @@
   <inkml:trace contextRef="#ctx0" brushRef="#br0" timeOffset="195640">7437 7359 953 0,'0'0'127'16,"0"0"-85"-16,0 0 1 16,0 0 25-16,0 0-27 0,0 0-18 15,0 0 1-15,312 103 47 16,-131-41-28-16,16 15-8 15,10 17-1-15,-14 6-20 16,-17 6-3-16,-22-4 1 16,-31-11-12-16,-8-11 4 15,-32-7-1-15,-17-9-2 16,-18-22 1-16,-17-5-2 16,-22-14 1-16,0-10-1 15,-1-4 2-15,-8-9-2 16,0 0 3-16,0 0-3 15,0 6-91-15,9 11-138 0,22 7-46 16,-22 8-402-16</inkml:trace>
   <inkml:trace contextRef="#ctx0" brushRef="#br0" timeOffset="196002">7785 10214 866 0,'0'0'42'0,"0"0"19"16,0 0-10-16,0 0 24 16,0 0 13-16,0 0-35 15,0-25-27-15,13 25-8 16,22-8-6-16,40 0 17 16,39-6 3-16,18-1-13 15,13 5-13-15,-4 2-5 16,-10 5-1-16,-16 3-36 15,-10 0-121-15,-12 0-91 16,-23 0-334-16</inkml:trace>
   <inkml:trace contextRef="#ctx0" brushRef="#br0" timeOffset="196356">9662 9676 833 0,'0'0'100'0,"0"0"-28"0,0 0 8 15,0 0 25-15,0 0 14 16,0 0-20-16,-9-80-26 15,9 80-29-15,0 0-17 16,0 0-12-16,0 0-12 16,0 8-3-16,0 31-2 15,0 20 2-15,0 22 8 16,9 3-4-16,21 7 3 16,-12 4-2-16,22 2-3 15,-14-3 0-15,13 12-2 16,-30 14-78-16,-9 0-219 15,-17 5-351-15</inkml:trace>
-  <inkml:trace contextRef="#ctx0" brushRef="#br2" timeOffset="365319">19640 11153 289 0,'0'0'708'15,"0"0"-540"-15,0 0-6 16,0 0-36-16,0 0-69 16,0 0-44-16,97 30 1 15,-31 6 30-15,39 8 1 16,27 4 7-16,18 3-28 16,12 7-2-16,1-7-3 0,-5-3-16 15,-13-8 9-15,-22-15-12 16,-30-10 3-16,-18-3 2 15,-36-6-5-15,-21-1 0 16,-10-2 0-16,-8-3 6 16,0 0 0-16,0 0-6 15,0 0-6-15,-43 0 4 16,-15 7-72-16,-8 15-61 16,27 8-106-16,39 3-181 15</inkml:trace>
-  <inkml:trace contextRef="#ctx0" brushRef="#br2" timeOffset="365685">22084 11990 725 0,'0'0'272'16,"0"0"-120"-16,0 0-11 15,0 0-19-15,0 0-63 16,0 0-51-16,137-102 8 16,-71 102-8-16,0 0-5 15,-18 4 10-15,-13 18-13 0,-4 3 5 16,-31 11-4-16,0 5 3 16,-48 11 4-16,-58 2-4 15,-26 1-2-15,35-7 2 16,23-12-4-16,56-10 0 15,18-8-6-15,75-11-23 16,79-7 18-16,44 0-15 16,30-29-13-16,-13-7-1 15,-34 6-71-15,-58 9-26 16,-66 2-84-16,-48 8-572 16</inkml:trace>
-  <inkml:trace contextRef="#ctx0" brushRef="#br2" timeOffset="366264">17746 11216 518 0,'0'0'325'0,"0"0"-117"16,0 0-43-16,0 0 2 16,0 0-58-16,0 0-35 15,17-55-36-15,-83 61-5 16,-35 39-13-16,-44 17 3 15,-35 15 22-15,-18 18-8 0,-22 8-18 16,5 6 8-16,26-7-20 16,26-14 3-16,58-26-7 15,39-17-1-15,48-25 1 16,18-12-3-16,0-8-6 16,0 0 5-16,0 0-3 15,0 0-2-15,18 0 4 16,39-8-12-16,-18-5-34 15,-3-3-81-15,-23 13-94 16,-13 3-90-16,0 0-367 16</inkml:trace>
-  <inkml:trace contextRef="#ctx0" brushRef="#br2" timeOffset="364067">17214 10144 906 0,'0'0'197'16,"0"0"-34"-16,0 0-7 15,0 0-30-15,0 0-47 16,0 0-11-16,0-65-22 16,0 65-5-16,0 0-13 15,0 0-22-15,0 0 22 16,0 0-23-16,0 0-3 16,0 0-2-16,0 0-3 15,0 3 3-15,-18 19-1 16,-30 5 1-16,21-2 2 15,5-4-2-15,14 6 0 0,8-2-3 16,0 0 0-16,8 1-4 16,41-1 6-16,8-2-11 15,0-1 12-15,0-4-3 16,0 0 2-16,1 0-2 16,-19 1 3-16,-13-5 0 15,-17 4-1-15,0 1-1 16,-9-1 2-16,0 4-1 15,-9-1 2-15,-39-1-2 16,-18-6 1-16,-9-7-8 16,1-4-11-16,-14-3-44 15,13 0-11-15,0 0-48 0,9 0-49 16,18 0-35 0,21 0-82-16,14-10-286 0</inkml:trace>
-  <inkml:trace contextRef="#ctx0" brushRef="#br2" timeOffset="364286">16990 10199 518 0,'0'0'312'0,"0"0"-176"16,0 0 2-16,0 0-38 15,338-120-27-15,-241 106-22 16,-14 7-28-16,-17 7-20 0,-9 0-3 15,1 7 0 1,-10 21-14-16,9 13-54 0,-9 2-104 16,-4 2-112-16,-4-5-379 15</inkml:trace>
-  <inkml:trace contextRef="#ctx0" brushRef="#br2" timeOffset="364636">18080 10305 670 0,'0'0'196'15,"0"0"-14"-15,0 0-54 16,0 0 6-16,0 0-62 16,0 0 1-16,-31-134-11 15,13 134-29-15,-4 0-25 16,-4 0-6-16,-5 33-2 0,5 10 0 16,17 1 3-16,9 7-7 15,0-3 4-15,18-1 0 16,56-7-2-16,6-15 0 15,12-10 2-15,-4-15 0 16,4 0 6-16,-4-3-4 16,-31-34 0-16,-4-3 1 15,-14-7 12-15,-30 3 9 16,-9-3 15-16,0 2-7 16,-9 8-23-16,-56 1 1 15,-10 14-10-15,-13 7-2 16,4 15-1-16,18 0-36 15,18 8-40-15,30 32-65 16,18 9-67-16,0-3-47 16,75-1-144-16</inkml:trace>
-  <inkml:trace contextRef="#ctx0" brushRef="#br2" timeOffset="364989">19016 10401 542 0,'0'0'219'0,"0"0"-58"15,0 0-25-15,0 0-45 16,0 0-20-16,0 0-40 16,-141-96-10-16,93 96 3 15,17 15-14-15,22 20-6 0,9 14 2 16,0-1-5-16,9-4 4 16,40-11-4-16,17-12 8 15,8-13 8-15,5-8 3 16,5 0 14-16,13-23 2 15,-23-10 4-15,-16-3 20 16,-23-1-18-16,-13-2 7 16,-22-5 10-16,0 0-48 15,-49 4 2-15,-25 7-13 16,-14 8 2-16,13 13-8 16,18 12 5-16,8 0-30 15,23 52-44-15,8 24-17 16,18 20-62-16,0 2-108 0,66 2-143 15</inkml:trace>
-  <inkml:trace contextRef="#ctx0" brushRef="#br2" timeOffset="367260">21280 12290 607 0,'0'0'166'15,"0"0"-39"-15,0 0-15 16,0 0 3-16,-312-36-14 15,294 32-14-15,9 4-19 16,9 0-11-16,0 0-29 16,0-3-12-16,0 3 1 15,9 0-8-15,35 0-6 16,27 0 16-16,3-4 9 16,10-4 3-16,-9 2-20 15,-18 2-4-15,-9-7-2 16,-8 4-4-16,-32-1 2 15,-8 8-3-15,0 0-19 0,-74 0-191 16,-49 26-221-16</inkml:trace>
-  <inkml:trace contextRef="#ctx0" brushRef="#br2" timeOffset="368844">14875 13171 1081 0,'0'0'170'0,"0"0"-17"16,0 0-17-16,0 0-29 15,0 0-49-15,0 0-6 16,18-66-30-16,-18 66-13 16,-35 22-9-16,-45 29 3 15,-34 26 5-15,-9 11-7 16,13 4 3-16,-4-1 0 0,8-7-4 15,10-14 1 1,21-12-2-16,9-18 1 0,9-7 0 16,30-8 6-16,5-17-6 15,22-5 1-15,0-3-1 16,0 0 0-16,0 0-1 16,0 0-10-16,0 22-59 15,0 4-64-15,-8 14-130 16,-27 11-190-16</inkml:trace>
-  <inkml:trace contextRef="#ctx0" brushRef="#br2" timeOffset="369142">13046 14162 800 0,'0'0'288'0,"0"0"-124"16,0 0-18-16,0 0 6 15,0 0-71-15,0 0-46 16,0-41-17-16,0 41-18 16,0 26 0-16,-8 29-3 15,-23 1 6-15,-4 12 2 16,13 2-5-16,-5-2 0 15,19-5-3-15,8-15-10 0,0-8-148 16,0-14-131-16,26-8-108 16</inkml:trace>
-  <inkml:trace contextRef="#ctx0" brushRef="#br2" timeOffset="369543">13407 14301 113 0,'0'0'651'0,"0"0"-493"16,0 0 1-16,0 0-29 16,0 0 12-16,0 0-51 15,17-88 2-15,-17 84-24 16,0 4-26-16,0 0-12 0,0 0-12 16,0 0-15-16,0 0-4 15,0 0-3-15,0 18-5 16,0 4 5-16,0 4 6 15,0 0-3-15,0-8 0 16,18 12 0-16,4-6 0 16,13-5 0-16,-4 3 2 15,4 0-3-15,5 4 2 16,-1-1-1-16,-4 8 2 16,-4-11-3-16,-13-1 2 15,-1 9-1-15,-8-12 0 16,-9 4-2-16,0 4 1 0,0-11 1 15,0 3-1-15,-26-11 2 16,-1 0-2-16,-21-3-28 16,9-4-69-16,-10 0-104 15,23 0-96-15,-5-18-197 16</inkml:trace>
-  <inkml:trace contextRef="#ctx0" brushRef="#br2" timeOffset="369749">13587 14169 830 0,'0'0'118'16,"0"0"-45"-16,0 0-4 0,0 0-21 16,0 0-15-16,0 0 9 15,312-40-3-15,-197 10-32 16,-23 20-7-16,-13-5-6 15,-44 15-154-15,-35 0-230 16</inkml:trace>
-  <inkml:trace contextRef="#ctx0" brushRef="#br2" timeOffset="368117">14743 12328 748 0,'0'0'308'16,"0"0"-127"-16,0 0 11 16,0 0-29-16,0 0-87 15,0 0-12-15,9-78-15 16,-9 71-8-16,0 3-17 15,0 4-3-15,0 0 1 16,0 0-22-16,0 0 0 0,0 11-3 16,0 26 3-16,0 14 2 15,0 4 1-15,0 4-3 16,0 6 0-16,0 1 4 16,0-1-7-16,-9-2 3 15,9-9-31-15,0-2-35 16,0-16-90-16,9-14-114 15,26-19-97-15,14-3-394 16</inkml:trace>
-  <inkml:trace contextRef="#ctx0" brushRef="#br2" timeOffset="368476">15227 12543 665 0,'0'0'221'0,"0"0"-47"16,0 0-19-16,0 0-26 15,0 0-43-15,0 0-7 16,0-51-44-16,0 51-27 16,-13 10-6-16,-5 23-1 15,18 7 0-15,0-3 3 16,0-1-2-16,0-6-4 16,31-9 2-16,26-6 0 15,9-15 4-15,17 0-2 16,1 0 7-16,4-25 5 15,-13-16 6-15,-18 5 22 0,-26-9 6 16,-23 6-7 0,-8-5-1-16,0 4-22 0,-39 7-6 15,-36 11-7-15,-13 7-5 16,5 15 0-16,-14 0-9 16,22 7-41-16,18 38-70 15,9 16-99-15,12 9-168 16,6 11-630-16</inkml:trace>
+  <inkml:trace contextRef="#ctx0" brushRef="#br2" timeOffset="-64177.73">19640 11153 289 0,'0'0'708'15,"0"0"-540"-15,0 0-6 16,0 0-36-16,0 0-69 16,0 0-44-16,97 30 1 15,-31 6 30-15,39 8 1 16,27 4 7-16,18 3-28 16,12 7-2-16,1-7-3 0,-5-3-16 15,-13-8 9-15,-22-15-12 16,-30-10 3-16,-18-3 2 15,-36-6-5-15,-21-1 0 16,-10-2 0-16,-8-3 6 16,0 0 0-16,0 0-6 15,0 0-6-15,-43 0 4 16,-15 7-72-16,-8 15-61 16,27 8-106-16,39 3-181 15</inkml:trace>
+  <inkml:trace contextRef="#ctx0" brushRef="#br2" timeOffset="-63811.73">22084 11990 725 0,'0'0'272'16,"0"0"-120"-16,0 0-11 15,0 0-19-15,0 0-63 16,0 0-51-16,137-102 8 16,-71 102-8-16,0 0-5 15,-18 4 10-15,-13 18-13 0,-4 3 5 16,-31 11-4-16,0 5 3 16,-48 11 4-16,-58 2-4 15,-26 1-2-15,35-7 2 16,23-12-4-16,56-10 0 15,18-8-6-15,75-11-23 16,79-7 18-16,44 0-15 16,30-29-13-16,-13-7-1 15,-34 6-71-15,-58 9-26 16,-66 2-84-16,-48 8-572 16</inkml:trace>
+  <inkml:trace contextRef="#ctx0" brushRef="#br2" timeOffset="-63232.73">17746 11216 518 0,'0'0'325'0,"0"0"-117"16,0 0-43-16,0 0 2 16,0 0-58-16,0 0-35 15,17-55-36-15,-83 61-5 16,-35 39-13-16,-44 17 3 15,-35 15 22-15,-18 18-8 0,-22 8-18 16,5 6 8-16,26-7-20 16,26-14 3-16,58-26-7 15,39-17-1-15,48-25 1 16,18-12-3-16,0-8-6 16,0 0 5-16,0 0-3 15,0 0-2-15,18 0 4 16,39-8-12-16,-18-5-34 15,-3-3-81-15,-23 13-94 16,-13 3-90-16,0 0-367 16</inkml:trace>
+  <inkml:trace contextRef="#ctx0" brushRef="#br2" timeOffset="-65429.73">17214 10144 906 0,'0'0'197'16,"0"0"-34"-16,0 0-7 15,0 0-30-15,0 0-47 16,0 0-11-16,0-65-22 16,0 65-5-16,0 0-13 15,0 0-22-15,0 0 22 16,0 0-23-16,0 0-3 16,0 0-2-16,0 0-3 15,0 3 3-15,-18 19-1 16,-30 5 1-16,21-2 2 15,5-4-2-15,14 6 0 0,8-2-3 16,0 0 0-16,8 1-4 16,41-1 6-16,8-2-11 15,0-1 12-15,0-4-3 16,0 0 2-16,1 0-2 16,-19 1 3-16,-13-5 0 15,-17 4-1-15,0 1-1 16,-9-1 2-16,0 4-1 15,-9-1 2-15,-39-1-2 16,-18-6 1-16,-9-7-8 16,1-4-11-16,-14-3-44 15,13 0-11-15,0 0-48 0,9 0-49 16,18 0-35 0,21 0-82-16,14-10-286 0</inkml:trace>
+  <inkml:trace contextRef="#ctx0" brushRef="#br2" timeOffset="-65210.73">16990 10199 518 0,'0'0'312'0,"0"0"-176"16,0 0 2-16,0 0-38 15,338-120-27-15,-241 106-22 16,-14 7-28-16,-17 7-20 0,-9 0-3 15,1 7 0 1,-10 21-14-16,9 13-54 0,-9 2-104 16,-4 2-112-16,-4-5-379 15</inkml:trace>
+  <inkml:trace contextRef="#ctx0" brushRef="#br2" timeOffset="-64860.73">18080 10305 670 0,'0'0'196'15,"0"0"-14"-15,0 0-54 16,0 0 6-16,0 0-62 16,0 0 1-16,-31-134-11 15,13 134-29-15,-4 0-25 16,-4 0-6-16,-5 33-2 0,5 10 0 16,17 1 3-16,9 7-7 15,0-3 4-15,18-1 0 16,56-7-2-16,6-15 0 15,12-10 2-15,-4-15 0 16,4 0 6-16,-4-3-4 16,-31-34 0-16,-4-3 1 15,-14-7 12-15,-30 3 9 16,-9-3 15-16,0 2-7 16,-9 8-23-16,-56 1 1 15,-10 14-10-15,-13 7-2 16,4 15-1-16,18 0-36 15,18 8-40-15,30 32-65 16,18 9-67-16,0-3-47 16,75-1-144-16</inkml:trace>
+  <inkml:trace contextRef="#ctx0" brushRef="#br2" timeOffset="-64507.73">19016 10401 542 0,'0'0'219'0,"0"0"-58"15,0 0-25-15,0 0-45 16,0 0-20-16,0 0-40 16,-141-96-10-16,93 96 3 15,17 15-14-15,22 20-6 0,9 14 2 16,0-1-5-16,9-4 4 16,40-11-4-16,17-12 8 15,8-13 8-15,5-8 3 16,5 0 14-16,13-23 2 15,-23-10 4-15,-16-3 20 16,-23-1-18-16,-13-2 7 16,-22-5 10-16,0 0-48 15,-49 4 2-15,-25 7-13 16,-14 8 2-16,13 13-8 16,18 12 5-16,8 0-30 15,23 52-44-15,8 24-17 16,18 20-62-16,0 2-108 0,66 2-143 15</inkml:trace>
+  <inkml:trace contextRef="#ctx0" brushRef="#br2" timeOffset="-62236.73">21280 12290 607 0,'0'0'166'15,"0"0"-39"-15,0 0-15 16,0 0 3-16,-312-36-14 15,294 32-14-15,9 4-19 16,9 0-11-16,0 0-29 16,0-3-12-16,0 3 1 15,9 0-8-15,35 0-6 16,27 0 16-16,3-4 9 16,10-4 3-16,-9 2-20 15,-18 2-4-15,-9-7-2 16,-8 4-4-16,-32-1 2 15,-8 8-3-15,0 0-19 0,-74 0-191 16,-49 26-221-16</inkml:trace>
+  <inkml:trace contextRef="#ctx0" brushRef="#br2" timeOffset="-60652.73">14875 13171 1081 0,'0'0'170'0,"0"0"-17"16,0 0-17-16,0 0-29 15,0 0-49-15,0 0-6 16,18-66-30-16,-18 66-13 16,-35 22-9-16,-45 29 3 15,-34 26 5-15,-9 11-7 16,13 4 3-16,-4-1 0 0,8-7-4 15,10-14 1 1,21-12-2-16,9-18 1 0,9-7 0 16,30-8 6-16,5-17-6 15,22-5 1-15,0-3-1 16,0 0 0-16,0 0-1 16,0 0-10-16,0 22-59 15,0 4-64-15,-8 14-130 16,-27 11-190-16</inkml:trace>
+  <inkml:trace contextRef="#ctx0" brushRef="#br2" timeOffset="-60354.73">13046 14162 800 0,'0'0'288'0,"0"0"-124"16,0 0-18-16,0 0 6 15,0 0-71-15,0 0-46 16,0-41-17-16,0 41-18 16,0 26 0-16,-8 29-3 15,-23 1 6-15,-4 12 2 16,13 2-5-16,-5-2 0 15,19-5-3-15,8-15-10 0,0-8-148 16,0-14-131-16,26-8-108 16</inkml:trace>
+  <inkml:trace contextRef="#ctx0" brushRef="#br2" timeOffset="-59953.73">13407 14301 113 0,'0'0'651'0,"0"0"-493"16,0 0 1-16,0 0-29 16,0 0 12-16,0 0-51 15,17-88 2-15,-17 84-24 16,0 4-26-16,0 0-12 0,0 0-12 16,0 0-15-16,0 0-4 15,0 0-3-15,0 18-5 16,0 4 5-16,0 4 6 15,0 0-3-15,0-8 0 16,18 12 0-16,4-6 0 16,13-5 0-16,-4 3 2 15,4 0-3-15,5 4 2 16,-1-1-1-16,-4 8 2 16,-4-11-3-16,-13-1 2 15,-1 9-1-15,-8-12 0 16,-9 4-2-16,0 4 1 0,0-11 1 15,0 3-1-15,-26-11 2 16,-1 0-2-16,-21-3-28 16,9-4-69-16,-10 0-104 15,23 0-96-15,-5-18-197 16</inkml:trace>
+  <inkml:trace contextRef="#ctx0" brushRef="#br2" timeOffset="-59747.73">13587 14169 830 0,'0'0'118'16,"0"0"-45"-16,0 0-4 0,0 0-21 16,0 0-15-16,0 0 9 15,312-40-3-15,-197 10-32 16,-23 20-7-16,-13-5-6 15,-44 15-154-15,-35 0-230 16</inkml:trace>
+  <inkml:trace contextRef="#ctx0" brushRef="#br2" timeOffset="-61379.73">14743 12328 748 0,'0'0'308'16,"0"0"-127"-16,0 0 11 16,0 0-29-16,0 0-87 15,0 0-12-15,9-78-15 16,-9 71-8-16,0 3-17 15,0 4-3-15,0 0 1 16,0 0-22-16,0 0 0 0,0 11-3 16,0 26 3-16,0 14 2 15,0 4 1-15,0 4-3 16,0 6 0-16,0 1 4 16,0-1-7-16,-9-2 3 15,9-9-31-15,0-2-35 16,0-16-90-16,9-14-114 15,26-19-97-15,14-3-394 16</inkml:trace>
+  <inkml:trace contextRef="#ctx0" brushRef="#br2" timeOffset="-61020.73">15227 12543 665 0,'0'0'221'0,"0"0"-47"16,0 0-19-16,0 0-26 15,0 0-43-15,0 0-7 16,0-51-44-16,0 51-27 16,-13 10-6-16,-5 23-1 15,18 7 0-15,0-3 3 16,0-1-2-16,0-6-4 16,31-9 2-16,26-6 0 15,9-15 4-15,17 0-2 16,1 0 7-16,4-25 5 15,-13-16 6-15,-18 5 22 0,-26-9 6 16,-23 6-7 0,-8-5-1-16,0 4-22 0,-39 7-6 15,-36 11-7-15,-13 7-5 16,5 15 0-16,-14 0-9 16,22 7-41-16,18 38-70 15,9 16-99-15,12 9-168 16,6 11-630-16</inkml:trace>
   <inkml:trace contextRef="#ctx0" brushRef="#br2" timeOffset="78961">24216 2681 285 0,'0'0'575'0,"0"0"-388"16,0 0-32-16,0 0-47 15,0 0 31-15,0 0-43 16,40-179-68-16,-40 179 45 15,0 0-73-15,-84 19 1 16,-39 39 7-16,-39 22 19 16,-10 12-27-16,14 9 0 15,-5 13 16-15,10-1-18 16,-6 16 4-16,-21 9-2 16,-9-2 11-16,-13-4 6 15,22-24 0-15,39-23-17 16,35-23 12-16,40-18-14 0,31-18 2 15,5-13 0-15,21-5-1 16,9-8 21-16,-9 0-20 16,9 0 0-16,0 0 7 15,0 0-11-15,0 0 4 16,0 0 0-16,0 0-1 16,0 0-79-16,0 7-87 15,0-3-197-15,0 0-261 16</inkml:trace>
   <inkml:trace contextRef="#ctx0" brushRef="#br2" timeOffset="79311">19148 4877 730 0,'0'0'145'0,"0"0"-10"15,0 0-25-15,0 0-4 0,0 0-72 16,0 0-5-16,0-36-8 15,66 18-3-15,22-4-16 16,13 12-2-16,4 2 4 16,-21 8-15-16,-5 0 11 15,-4 0-44-15,-9 0-105 16,8 14-146-16,1-2-289 16</inkml:trace>
   <inkml:trace contextRef="#ctx0" brushRef="#br2" timeOffset="79689">20304 4556 602 0,'0'0'165'0,"0"0"-55"16,0 0-30-16,0 0 6 15,0 0-60-15,0 0-1 16,198-92 18-16,-119 92-41 15,-13 0 37-15,-9 0-20 16,-13 12-18-16,-4 13 31 16,-23 8-32-16,-17 15 0 15,0 13 21-15,0 17-11 16,-75 10 7-16,-17-2-14 16,-5-5 6-16,-8-20-3 15,30-16-5-15,27-22-1 16,21-13 1-16,27-6 16 0,0-4-17 15,0 0 0-15,0 3 2 16,18-3-7-16,88 0 14 16,52 0-1-16,70-40 7 15,49-5 0-15,-4 6-25 16,4 10 10-16,-40 11-184 16,-48 13-337-16</inkml:trace>
@@ -1727,77 +1727,77 @@
   <inkml:trace contextRef="#ctx0" brushRef="#br2" timeOffset="84428">16607 7776 143 0,'0'0'539'0,"0"0"-426"15,0 0 0-15,0 0 14 16,0 0-43-16,0 0 3 16,-17-51-27-16,56 18-13 15,5-4-10-15,13 1-11 16,0 3 21-16,9 0-24 16,-17 4-5-16,-1 7 13 15,-22 11-29-15,-12 8 16 16,-6-2-10-16,-8 5-1 0,0 0 0 15,0 0-7-15,0 0 0 16,9 0-5-16,0 12 4 16,-9 25 1-16,9 10 0 15,-9 4 10-15,0 7-16 16,9 0 6-16,4-2 0 16,-4-5-1-16,-9-3 11 15,8-8-10-15,-8-11 0 16,0-3 4-16,0-12-6 15,0-7 2-15,0 1 0 0,0-4-2 16,0-1 16 0,0 8-14-16,-8 0 2 0,-41 3 5 15,-8-2-2-15,17-1-4 16,14-4-1-16,8-4 0 16,18-3 8-16,0 0-8 15,0 0 0-15,0 0 7 16,0 0-11-16,0 0 4 15,9 0-2-15,48 0-9 16,27-10 21-16,21-16-10 16,19-10 0-16,-1-1-15 15,-9 6-4-15,-22 11-197 16,-13 5-61-16,-35 8-147 16</inkml:trace>
   <inkml:trace contextRef="#ctx0" brushRef="#br2" timeOffset="85532">28274 5785 563 0,'0'0'156'0,"0"0"-54"16,0 0-15-16,0 0 71 15,0 0-81-15,0 0 10 16,-132-173 8-16,123 163-42 16,0 2 48-16,9 5-42 0,0 3-36 15,0 0 21-15,0 0-34 16,0 11-10-1,18 36 4-15,48 23 16 0,31 14 4 16,26 14-6-16,17 9-16 16,10 1 30-16,-14 2-19 15,14-4-13-15,-27-7 0 16,-9-15 24-16,-9-11-25 16,-47-14 1-16,-1-12 0 15,-22-10 1-15,4-6 5 16,-21-14-6-16,-9-7 0 15,-9-2 22-15,0-5-24 16,9-3 2-16,-9 4 0 0,0-4 4 16,0 0 9-1,0 0-13-15,0 0 0 0,0 0 19 16,0 0-18-16,0 0-1 16,0 0 0-16,0 0-6 15,0 0 10-15,0 0-4 16,0 0 0-16,0 0-40 15,0 0 38-15,13 0-43 16,-13 0-16-16,9 3 22 16,-9 10-117-16,0 7-83 15,0 2-54-15</inkml:trace>
   <inkml:trace contextRef="#ctx0" brushRef="#br2" timeOffset="87644">29738 7591 674 0,'0'0'178'0,"0"0"-95"15,0 0 62-15,0 0 2 16,0 0-58-16,0 0 11 15,-181-88-50-15,181 85-15 0,0-2 16 16,9-5-44 0,48-1 1-16,18-1-8 0,0 9 12 15,4 3-21-15,-35 0 9 16,-4 0 0-16,-14 11-16 16,5 8 17-16,-23 6-1 15,-8 5 0-15,0 2 14 16,0 1-22-16,-39 4 8 15,-27-4 0-15,0-1 4 16,9-6 5-16,0-5-9 16,30-9 0-16,-3-5 11 15,21-4-22-15,9-3 11 0,0 0 0 16,0 0-4 0,0 0 15-16,0 0-11 0,0 0 0 15,0 0 7-15,9 0-20 16,30 0 13-16,36 0 0 15,30 0-25-15,-8 0 36 16,-22 0-11-16,-18 0 0 16,-9 0 0-16,-13 27-11 15,-4-6 11-15,-13 12 0 16,-9 0-12-16,-9 4 19 16,0 3-7-16,0 0 0 15,-27-4 10-15,-39-6-9 16,-30-12-1-16,-10-7 0 15,-8-7 0-15,4-4 0 16,22 0-5-16,22-15-92 0,40-25-204 16,26-18-320-16</inkml:trace>
-  <inkml:trace contextRef="#ctx0" brushRef="#br1" timeOffset="389703">30265 652 264 0,'0'0'160'0,"0"0"-5"0,0 0-40 16,0 0 2-16,0 0 18 15,0 0-54-15,84-91 21 16,-84 86-6 0,0 5-5-16,0 0 5 0,0 0-64 15,0 0 3-15,0 0 9 16,0 0-37-16,0 0 44 15,0 0-27-15,-35 0-14 16,-71 0 7-16,-39 0-10 16,-4 0-7-16,-14 0 0 15,13 0 16-15,-3 0-19 16,-14 0 3-16,-53 0 0 16,-44 0-6-16,-31 0 9 15,1 0-3-15,-1 0 0 0,10 0 4 16,-19 0-7-16,14 0 3 15,13 0 0-15,62 0-14 16,52 0 19-16,49 0-5 16,30-10 0-16,27 3 16 15,0-8-22-15,0 4 6 16,0 1 0-16,-9-2-6 16,-9 5 11-16,-4 7-5 15,-35 0 0-15,-9 0 6 16,-18 0-12-16,-22 11 6 15,5 15 0-15,-13-1-5 16,-18-2 11-16,-9-1-6 16,-22-1 0-16,-17-3 11 0,8 1-19 15,14-5 8 1,-5 1 0-16,22 0-12 0,9-1 15 16,0 2-3-16,9 1 0 15,8 4 11-15,-8 2-18 16,9 7 7-16,-18 3 0 15,-9 7-6-15,-22 7 12 16,5-3-6-16,4-4 0 16,22-5 6-16,26-8-14 15,31-5 8-15,0-3 0 16,-9-6-10-16,-21 6 17 16,-18 7-7-16,-27 7 0 0,-22 10-14 15,1 8-2-15,-18 4 11 16,17 4 2-16,-4-1-18 15,5 4 22-15,30-7-1 16,26-7 0-16,40-9 12 16,18-4-19-16,9-7 7 15,-1-3 0-15,-8-2-8 16,4-1 16-16,-13-1-8 16,17 6 0-16,10 1 11 15,3 5-18-15,14 11 7 16,-4 7 0-16,-1 4-8 15,5 7 15-15,26 4-7 16,5 3 0-16,17 12 10 16,-4 3-21-16,4 14 11 15,-4 16 0-15,-13 14 9 0,-1 14 6 16,1 12-11-16,-18 11 11 16,18 2-4-16,-18 2 23 15,31-4-27-15,-5-15-5 16,22-8 23-16,10-7-15 15,8-6 1-15,0-2 5 16,0 2-2-16,0 1 9 16,0 17-22-16,0 9-1 15,0-1 10-15,0-2 6 16,0-11-16-16,0-8 0 0,0 14 8 16,0-4-1-1,0-3-7-15,-14-6 0 0,-3-11 1 16,-10 0 19-16,-12-10-20 15,-1-4 0-15,5-8 9 16,-4-4-11-16,12 1 2 16,-4 0 0-16,14-7-4 15,17-12 15-15,0-11-11 16,0-11 0-16,0-3 3 16,0-4-12-16,0 1 9 15,17 2 0-15,1-2-2 16,-5-1 13-16,5-15-11 15,-9-10 0-15,-1-4 0 16,1 0-7-16,13 3 7 16,-4-2 0-16,-1 6-2 0,-3 0 13 15,3 1-11-15,1-2 0 16,-10-2 2-16,23 3-12 16,-13-3 10-16,13 3 0 15,4-3-2-15,4-1 10 16,18-2-8-16,-21-5 0 15,12 4 2-15,9-8-11 16,9-3 9-16,31-8 0 16,26-3-5-16,48 0 19 15,18 0-15-15,18 0 1 16,-9-7 0-16,13 7-4 16,-22 0 4-16,-9 4 0 0,-9 25-2 15,10-3 14 1,-23-4-12-16,5 0 0 0,-1-4 3 15,5-7-8-15,14-7 6 16,30-4-1-16,26 0 0 16,35-15 12-16,5-14-12 15,5 0 0-15,-5 3 1 16,-31 4-17-16,-9 14 16 16,-21 1 0-16,-14 7-2 15,-22 0 10-15,9 0-8 16,18-3 0-16,30-15 6 15,27-8-14-15,39-7 8 16,14-4 0-16,4 8 1 0,-18 11 10 16,-31 7-11-1,-25 11 0-15,-28 0 7 0,-30 0-22 16,9 2 15-16,22 14 0 16,9-8-8-16,26-1 11 15,8 0-3-15,5-7 0 16,-21 0 5-16,-32 0-11 15,-4 0 6-15,-44 4 0 16,-4 0-7-16,-23 3 17 16,5 4-10-16,-13-4 0 15,31 1 9-15,17 2-20 16,18-6 11-16,9 0 0 0,4-4-6 16,-14 0 13-1,-8 0-7-15,-26 0 0 0,4-8 4 16,-13 5-18-16,9 3 14 15,-5 0 0-15,22 0-10 16,-17 0 22-16,8 0-12 16,-30 0 0-16,-9 3 6 15,-9-3-17-15,-9 4 11 16,-8 0 0-16,-23-1-7 16,-17 1 18-16,-9 4-11 15,-17-5 0-15,-14 1 6 16,-17-4-15-16,4 0 9 15,-13 0 0-15,0 0-7 16,0 0 20-16,9 0-13 16,-9 0 0-16,18 0 8 0,-1-12-16 15,5-13 8-15,5-4 0 16,12-15-6-16,-4-7 16 16,5-15-10-16,-1-8 0 15,-30-6 7-15,0 0-13 16,-9-1 6-16,0-2 0 15,0-1-6-15,-40-5 15 16,23 2-9-16,8-8 0 16,9-3 8-16,0-12-18 15,0-3 10-15,48-5 0 16,-21-2-8-16,4-7 23 16,-23-5-15-16,1-4 0 0,-9 0 4 15,0 2-14-15,-48 2 10 16,21 0 0-16,-21 5-4 15,30-2 16-15,5 2-12 16,13-1 0-16,0 10 5 16,0 9-14-16,0 6 9 15,0 8 0-15,13-3-5 16,-4-1 17-16,-9 0-12 16,0-2 0-16,0-2 7 15,0 0-17-15,0 1 10 16,0 7 0-16,9 0-6 15,0 3 20-15,0 1-14 16,21-7 0-16,-30-8 6 16,9-8-15-16,0 4 9 15,0 1 0-15,-9 6-5 0,0 2 18 16,0 2-13 0,0 4 0-16,0-1 5 0,0 5-13 15,-9 0 8-15,-9 3 0 16,-21 5-7-16,-1 2 23 15,23 3-16-15,-1 10 0 16,9-2 2-16,9 4-12 16,0 8 10-16,0-1 0 15,0 1-8-15,0-5 20 16,0-10-12-16,0 0 0 0,0-3 8 16,9-9-20-1,-9 9 12-15,9-8 0 0,-9-1-4 16,0 9 17-16,0-1-13 15,0 11 0-15,-18 8 2 16,-30 7-18-16,-18 3 16 16,-40 5 0-16,-17 2-9 15,-26 9 13-15,-14 2-6 16,9 12 2-16,23 3-44 16,38 9-1-16,-3-3-152 15,38-9-221-15</inkml:trace>
-  <inkml:trace contextRef="#ctx0" brushRef="#br1" timeOffset="390673">31676 685 714 0,'0'0'194'16,"0"0"-69"-16,0 0 9 15,0 0-22-15,0 0-28 16,0 0-2-16,0 0-39 16,-96 0 36-16,109 0-35 15,13 0-21-15,14-22 32 16,-5-4-44-16,-4 1 18 16,-14 7 9-16,1 0-38 15,4-2 37-15,-22 14-32 0,9 6-4 16,-9 0 13-16,0 0-8 15,0 0-6-15,0 0 0 16,0 0-4-16,8 4-6 16,-8 24 10-16,9 14 0 15,-9 9-9-15,0 7 12 16,0 3-3-16,0-1 0 16,0-2 12-16,0-8-20 15,0-5 8-15,0-9 0 16,0-6-6-16,0-12 11 15,0-11-5-15,0 1 0 16,0-5 5-16,-9 1-14 16,-8-1 9-16,-32-3 0 0,10 0 2 15,21 0 5 1,1 0-7-16,17 0 0 0,0 0 17 16,0 0-23-16,0 0 6 15,0 0 0-15,0 0-9 16,44-7 14-16,35-11-5 15,-13 0 0-15,8-2 6 16,1 0-22-16,13-3-15 16,-31-6-91-16,9 0-137 15,-22 4-102-15,-13 4-448 16</inkml:trace>
-  <inkml:trace contextRef="#ctx0" brushRef="#br1" timeOffset="391202">32252 312 210 0,'0'0'576'0,"0"0"-384"16,0 0-61-16,-132-227 48 16,97 195-61-16,-22 6-35 15,-9 11 10-15,9 8-61 16,-22 7 7-16,4 0-15 15,-17 22-14-15,4 26 5 16,-5 14-15-16,-21 19 0 0,17 13 5 16,23 16 10-1,25 7-15-15,23 4 0 16,17-5 9-16,9 5-5 0,0-8-4 16,0-7 0-16,44-2-3 15,-4-13 12-15,8-11-9 16,0-14 0-16,18-11 10 15,0-12-15-15,18-7 5 16,13-14 0-16,-5-11 10 16,13-11 2-16,-21 0 1 15,-5 0 24-15,-4-33-18 16,-9-10 45-16,-9-8-44 16,0-11 0-16,-9-19 38 15,9-20-58-15,-4-10 28 0,-13-13-24 16,-23 0 12-16,-17 3-16 15,0 3 0-15,-66 9 0 16,-26 14 0-16,-40 7 0 16,-22 16 0-16,5 24 0 15,-14 23 0-15,23 25 0 16,25 0-8-16,27 58-55 16,31 29-5-16,22 31-90 15,-4 2-229-15</inkml:trace>
-  <inkml:trace contextRef="#ctx0" brushRef="#br1" timeOffset="394173">22616 10131 402 0,'0'0'175'0,"0"0"-49"15,0 0-25-15,0 0 15 16,0 0 17-16,0 0-69 0,18-78 18 15,-18 71 9 1,0-1-40-16,0-2 15 16,0-5-38-16,-18 4-6 0,-39-4 24 15,-9 1-42-15,-26 6 20 16,-36 1-23-16,-21 4 6 16,-14 3-6-16,-17-4-1 15,-9-3 0-15,-9-5-1 16,0-1 11-16,-4-7-10 15,26 2 0-15,23-7 2 16,29 4-5-16,19-1 3 16,13-5 0-16,-5 6 0 15,5 2 10-15,-45 1-10 16,-12 10 0-16,-49 8 0 16,-22 0-8-16,-8 0 6 0,21 0 2 15,9 0-2 1,18 0 11-16,0 0-12 0,17 5 3 15,14-5 0-15,4 7-2 16,13 7 5-16,-9 5-3 16,-4 6 0-16,-4 4 13 15,8-3-14-15,18-4 1 16,9-3 0-16,-1-6 1 16,10-1 0-16,12-4-1 15,-12-8 1-15,8 3 10 16,5-3-14-16,-22 4 3 15,-10 7 0-15,-21 3-3 0,-13 0 5 16,-31 5-2-16,0-5 0 16,-13 1 8-1,44 0-13-15,26 0 5 0,35-5 0 16,40-2-6-16,17-1 6 16,23-7 0-16,8 0 0 15,9 3 7-15,-9-3-9 16,9 4 2-16,-22 3-1 15,5 12-4-15,-41 6-2 16,1 12 7-16,-17-1 0 16,8-6 10-16,0-1-13 15,9-3 3-15,-1 0 0 16,10-1-5-16,0-5 8 16,-5 8-3-16,5-3 0 15,8-10 3-15,14-1-3 0,4 4 0 16,-13 8 0-16,-14 10-5 15,-17 16 8-15,-8 7-3 16,-6 9 0-16,6 10 5 16,-10 2-7-16,-4 4 2 15,13-2 0-15,18-3-6 16,0-6 9-16,9-4-3 16,4-3 0-16,-4 0 5 15,-1-1-6-15,10 2 1 16,-5 9 0-16,-13-3-4 15,8 11 8-15,-8 1-4 16,17-9 0-16,5-3 3 0,4-7-7 16,23 4 4-16,-10-4 0 15,9 7-2-15,-13-8 7 16,5 4-5-16,8 2 0 16,-9-3 6-16,-4 5-8 15,5 0 2-15,-10 5 0 16,-12 3 2-16,-9 2 4 15,8-2-3-15,5 2 1 16,-5 5-3-16,5 0 14 16,4 3-14-16,5 5 5 15,4-2-2-15,13 6-2 16,0-6 3-16,1 5-5 16,-1-10 2-16,-13 2-4 0,4-4 4 15,1-4-2-15,-14 3 0 16,4-3 8-16,19-3-8 15,-14-2 0-15,4 1 0 16,18 2 5-16,-9-1-5 16,9-3 0-16,0 3-1 15,0-7 7-15,0 0-9 16,0-7 3-16,-8-11 0 16,-1-4 2-16,9-6-2 15,0-13 0-15,0-6-1 16,0-8 6-16,0-3-6 15,0-8 1-15,0 0 0 0,26-4-4 16,14 5 6 0,4-8-2-16,35 0 5 15,22 0-1-15,44-8-1 0,44-32-3 16,26-7 0-16,36-12 0 16,4 9 0-16,-9 2 0 15,-31 8 2-15,-12 14 5 16,-36 1-9-16,-13 2 2 15,-5 5 0-15,14-12 1 16,17 2-1-16,27-9 0 16,21 1 2-16,27-1 0 15,4 12-4-15,-26 5 2 16,-4 7 0-16,-18-2-9 0,-13 4 9 16,-9-6 0-1,9 1 0-15,-9-13 4 0,22 3-4 16,-5-7 0-16,14 8 1 15,-22 3 1-15,0 4-2 16,-18 3 0-16,-9 4-1 16,-8-4 6-16,17 2-5 15,27-6 0-15,48-4 0 16,39 2 4-16,32 2-4 16,12 10 0-16,5-3-6 15,-13 8 11-15,-27 4-6 16,-26 0 1-16,-22 0 0 15,-18 0-5-15,-8-4 5 16,-5-3 0-16,5-15 5 16,8 4 2-16,9-15-7 0,9 6 0 15,0 4 7-15,5 0-4 16,-36 1-3-16,-22 4 0 16,-35 3-5-16,-44 4 11 15,-17 4-6-15,-23-4 0 16,-13 4 3-16,-26 2-1 15,-4 2-2-15,-22-4 0 16,4 7 9-16,-14 0-2 16,-8-8 2-16,0 8-2 15,0-7-5-15,0-4 33 16,0-3-21-16,0-12 1 16,0-14-2-16,0-8-7 0,0-10 7 15,-8-15-13 1,-32-15 6-16,-8-3 6 0,-1-15-12 15,-8 0 0-15,13 3 5 16,-22 4 4-16,18 8-9 16,-9-5 0-16,17 5 2 15,5 0-4-15,13-11 2 16,4 0 0-16,10-9 1 16,-1-4 9-16,0-3-10 15,-4-2 0-15,4-1 1 16,0 3-2-16,-8-6 1 15,8 11 0-15,-4 7-1 16,4 18 10-16,0 9-9 0,0 9 0 16,-8 4 1-1,-5 0-7-15,-5 1 6 0,-3-1 0 16,3-7-1-16,-21-1 11 16,13-3-10-16,4 4 0 15,5 19 2-15,-5-1-12 16,22 22 10-16,0 8 0 15,0-5 0-15,1 6 11 16,8-7-12-16,0-6 1 16,-14-2 0-16,6-2-7 15,-10 1 7-15,0 0 0 16,-12 4-4-16,12 3 17 0,-13 7-13 16,-4 4 0-1,-13 7 0-15,-9 2-13 0,-27-6 13 16,-4 5 0-16,-4 2-8 15,-14-3 17-15,-8 5-10 16,22 2 1-16,-14 1 0 16,-8 1-18-16,0 6 16 15,-27 0-62-15,-22 0-99 16,-34 0-315-16</inkml:trace>
-  <inkml:trace contextRef="#ctx0" brushRef="#br1" timeOffset="394787">22959 9067 679 0,'0'0'214'0,"0"0"-10"15,0 0-51-15,0 0-44 16,0 0-1-16,0 0-61 16,0 0-9-16,44-106-7 15,-4 98-28-15,-1 8 24 16,-4 0-21-16,-4 0 2 16,-4 8 1-16,-5 21-9 15,-14 4 0-15,-8 3 0 16,0 8 14-16,0 3-14 15,-66 8 0-15,-30 4 7 0,12-12-6 16,-4-14-1 0,44-11 0-16,14-14 1 15,30-8 13-15,0 0-14 0,0 0 24 16,0 0-1-16,48 0 23 16,9-22-37-16,18-1 1 15,21 9 4-15,-3 0-2 16,12 6-6-16,1 1-6 15,-14 7 4-15,-4 0-8 16,-22 0 4-16,-31 0-14 16,-4 3-26-16,-13 13-139 15,-18-2-131-15,0-4-99 16</inkml:trace>
-  <inkml:trace contextRef="#ctx0" brushRef="#br1" timeOffset="395299">23838 8767 739 0,'0'0'178'0,"0"0"-24"16,0 0-5-16,-171-220-20 16,114 192-36-16,-9 5 16 15,9 1-60-15,-9 6 7 16,9 7-14-16,-1 9-35 15,-7 0 39-15,-19 0-46 16,0 40 0-16,-12 18 6 0,-19 26 13 16,-8 16-19-16,9 16 0 15,13 5 5 1,13-4-9-16,40-4 4 0,21-3 0 16,27-8-2-16,0-7 14 15,27-4-12-15,52-7 0 16,4-14 0-16,40-7 0 15,9-24 1-15,31-20-1 16,17-19 7-16,9 0 3 16,9-30 1-16,0-21 20 15,-5-4-13-15,-34-10 30 16,-14-12-33-16,-35-8 16 16,-5-16 10-16,-39-13-36 0,-35-17 27 15,-22-15-22-15,-9-1-10 16,-88 9 0-16,-53 13 0 15,-66 38 0-15,-39 26 0 16,-22 38 0-16,22 23 0 16,39 23 0-16,45 59-71 15,38 27-2-15,32 13-88 16,26-6-256-16</inkml:trace>
-  <inkml:trace contextRef="#ctx0" brushRef="#br1" timeOffset="1.21131E6">25148 10788 916 0,'0'0'173'0,"0"0"3"15,0 0-41-15,0 0-16 16,0 0-35-16,0 0-42 16,0 0 16-16,0-80-28 15,0 80-15-15,-8 0-3 0,-14 25-8 16,-5 16-4-16,-12 10 0 16,12 7 8-16,14 0-9 15,13-3 1-15,0-4 0 16,0-3-5-16,13-8 5 15,22-8 0-15,23-6 0 16,-1-7 3-16,39-12-3 16,19-3 0-16,8-4-29 15,0 0-27-15,-13 0-82 16,-31-11-69-16,-22-11-62 16,-22-1-167-16</inkml:trace>
-  <inkml:trace contextRef="#ctx0" brushRef="#br1" timeOffset="1.21173E6">26115 10825 229 0,'0'0'524'15,"0"0"-366"-15,0 0-12 16,0 0-17-16,0 0-36 16,0 0-16-16,9-169-21 15,-9 166-21-15,0 3-6 16,0 0-28-16,-22 0-1 15,-4 29 0-15,-14 4 4 16,14 0-6-16,8-4 2 16,5 1 0-16,4-8-3 0,9 3 2 15,0-4 1-15,0 2 0 16,40 2 3-16,17-3-4 16,-9 0 1-16,5-4 0 15,-4 1 0-15,-1 3 2 16,-9-5-2-16,-12 2 0 15,-18-1 2-15,-1-3-4 16,-8 1 2-16,0-7 0 16,-17-1 4-16,-49-1-3 15,-18 2 7-15,-12-9-8 16,3 0 3-16,14 0-8 16,22 0-30-16,22 0-68 15,26-12-10-15,9-13-29 16,0-6-30-16,27-2-45 0,30 1-157 15</inkml:trace>
-  <inkml:trace contextRef="#ctx0" brushRef="#br1" timeOffset="1.21179E6">26115 10825 363 0</inkml:trace>
-  <inkml:trace contextRef="#ctx0" brushRef="#br1" timeOffset="1.21217E6">26115 10825 363 0,'264'-59'227'0,"-255"45"-84"0,-9 0-19 0,9-2 16 15,0 9-43-15,-9 3-7 16,13 4-12-16,-4 0-27 15,8 0-9-15,23-3-30 16,-5 3-10-16,31-3 1 16,22 3 0-16,-5 0-3 15,23 0 0-15,-23 0-2 0,-26 0-10 16,-17 0-49-16,-31 0-34 16,-9 0 5-16,0 0-33 15,0 0-17-15,-18 3 52 16,-48-3-31-16,9 0-134 15,0 0 61-15,0 0 192 16,17 0 33-16,23-3 147 16,8-6 17-16,0 6-80 15,9-1-10-15,0 1-5 16,-13 3-9-16,13 0-46 16,0 0-17-16,0 15-11 15,0 22 47-15,0 6-33 0,0 5-5 16,0 3-2-16,0 7-18 15,0 5-7-15,0 2 6 16,0-6-4-16,0-9-3 16,0-6 0-16,0-7-91 15,13-12-169-15,5-2-193 16</inkml:trace>
-  <inkml:trace contextRef="#ctx0" brushRef="#br1" timeOffset="1.21239E6">27091 11099 645 0,'0'0'169'0,"0"0"-54"16,0 0-6-16,0 0-58 16,0 0-21-16,0 0-21 15,225-37-9-15,-138 37 4 16,28 0-3-16,-14 0-1 15,-22 0 0-15,-13 0-67 16,-40 0-160-16,-26 7-259 16</inkml:trace>
-  <inkml:trace contextRef="#ctx0" brushRef="#br1" timeOffset="1.2126E6">27364 10832 244 0,'0'0'466'0,"0"0"-302"0,0 0-18 16,0 0-63-16,0 0-51 16,0 0-22-16,-18-3-9 15,36 46 10-15,13 5 7 16,-14 10-16-16,10 4 12 16,3 5-14-16,-21 6 0 15,9-4-2-15,-9-4-9 16,-9-6-134-16,0-7-265 15</inkml:trace>
-  <inkml:trace contextRef="#ctx0" brushRef="#br1" timeOffset="1.2132E6">27962 11004 274 0,'0'0'482'16,"0"0"-301"-16,0 0-30 15,0 0-19-15,0 0-35 16,0 0-40-16,39-165-21 16,-39 169-36-16,0 33 0 15,0 17-2-15,0 5 10 16,0 3-3-16,0 0-3 16,0-7-1-16,0-8 7 15,0-13-8-15,0-13 0 0,0-14 1 16,0-7 2-16,0 0 6 15,0 0 7-15,0-18 57 16,0-26-36-16,0-10-23 16,18-12 6-16,-1-4 11 15,-17-3-16-15,9 0 9 16,-9 11-11-16,0 15-8 16,0 21 20-16,0 16-18 15,0 10-2-15,9 0-5 16,-9 17-8-16,22 35 6 15,-13 6 2-15,17 5 0 16,-4-6-4-16,5-5 8 16,12-9-4-16,-13-10 0 0,23-7-1 15,-10-12 1 1,5-2 0-16,5-10 2 0,8-2-3 16,0 0 7-16,0-17-6 15,-8-22 2-15,-14-13 3 16,-13-14 7-16,-14-7-6 15,-8-12-3-15,0 5 3 16,0 7-2-16,0 14-4 16,-8 19 0-16,-14 22 1 15,13 18-6-15,0 4-55 16,-17 58-56-16,26 26-26 16,-31 7-113-16,22-1-58 15,9-9-432-15</inkml:trace>
-  <inkml:trace contextRef="#ctx0" brushRef="#br1" timeOffset="1.21356E6">28946 11253 336 0,'0'0'475'0,"0"0"-324"16,0 0-28-16,0 0-21 15,0 0-15-15,0 0-32 16,-48-166-21-16,30 166-19 15,-8 0-15-15,-13 15 5 16,8 27-5-16,4-3 0 16,10 4 2-16,8 2-4 15,9-17 2-15,0 2 0 0,0-15-2 16,9-5 4-16,35-10-2 16,13 0 3-16,-9 0-3 15,9-10 14-15,-8-20 5 16,-23-3 12-16,-4-7 2 15,-22-3-29-15,0-2 6 16,0 5-10-16,-31 7-7 16,-17 15-6-16,13 15-56 15,-14 3-43-15,10 3-78 16,21 34-102-16,10 8-393 16</inkml:trace>
-  <inkml:trace contextRef="#ctx0" brushRef="#br1" timeOffset="1.21427E6">29448 11318 702 0,'0'0'184'0,"0"0"-23"16,0 0-58-16,0 0 25 15,0 0-65-15,-36-205-17 16,-3 179-1-16,-10 8-22 15,14 8 7-15,5 10-24 16,-6 0-3-16,-3 21-4 16,-1 27 1-16,5 4 0 0,4 6 0 15,23-7 6 1,8-4-12-16,0-10 6 0,17-8 0 16,31-14 2-16,10-12 2 15,-1-3-3-15,9 0 4 16,0-25 1-16,-9-16 4 15,-9-6 26-15,-8-11 10 16,-5-8 7-16,-4-10-22 16,-23-5-6-16,-8-4 0 15,0 1-20-15,0 19 20 16,0 11-14-16,-17 21-7 16,-5 17 18-16,22 16-22 0,0 0 0 15,0 12 0 1,0 42-2-16,-9 20 0 0,9 13 2 15,-9 1 0-15,9 0-3 16,0-15 3-16,0-8 0 16,18-9-2-16,30-16-10 15,18-15 10-15,0-11-3 16,22-14 5-16,-4 0-4 16,-1 0 7-16,-4-33-3 15,-13-3 0-15,-9-4 8 16,-22-8-6-16,-13 5-2 15,-22-5 1-15,0 11 9 16,0 9-7-16,-22 13-2 16,-4 15-1-16,-14 0-5 15,5 25 5-15,-13 33 0 0,8 5 0 16,14 3-2-16,26-4 3 16,0-4-1-16,0-10 0 15,18-5-6-15,39-13 5 16,9-9-23-16,-9-9-46 15,9-12-23-15,0 0-106 16,-27-18-21-16,-12-45-99 16</inkml:trace>
-  <inkml:trace contextRef="#ctx0" brushRef="#br1" timeOffset="1.21564E6">32151 2779 717 0,'0'0'235'15,"0"0"-73"-15,0 0-54 16,0 0 9-16,0 0-53 16,0 0-38-16,0 0 28 15,-145 60-49-15,127 1 9 16,18 5 9-16,-8 7-17 15,8 0 25-15,0-12-31 16,0-9 3-16,0-12-3 16,0-17 4-16,0-11-4 0,0-12 7 15,0 0 3 1,0 0 38-16,0-16 42 0,0-25-75 16,0-13 16-16,8-8-20 15,23-16-5-15,4-13-6 16,14-10 18-16,-1-2-12 15,-13 12-6-15,-4 21 0 16,-13 26-10-16,-10 22 22 16,-8 16-12-16,0 6 0 15,9 0-7-15,4 28-4 16,5 31 11-16,21 18 0 16,-12 14-13-16,21 4 21 0,18 0-8 15,0-12 0 1,0-15 12-16,0-21-21 0,-18-22 9 15,-8-17 0-15,-5-8-11 16,-4 0 21-16,-5-41-10 16,-8-18 0-16,-5-7 19 15,-13-10-25-15,0-4 6 16,0-1 0-16,-13 15-8 16,-14 11 17-16,10 22-9 15,-14 15 0-15,5 18-7 16,4 0-9-16,-13 11-36 15,4 41-63-15,22 17 16 16,9 12-103-16,0-4-33 16,0-8-115-16</inkml:trace>
-  <inkml:trace contextRef="#ctx0" brushRef="#br1" timeOffset="1.21601E6">33096 3117 566 0,'0'0'192'15,"0"0"-28"-15,0 0-45 16,0 0-28-16,0 0-11 16,0 0-39-16,31-114 15 15,-31 114-56-15,0 0 6 16,0 0-16-16,0 15 15 16,0 10-5-16,0 4 0 15,0 0 5-15,0-3-14 0,0-3 9 16,26-9 0-1,-4-8-5-15,5-6 17 0,12 0-12 16,-30 0 9-16,9-10-4 16,-1-20 44-16,5-3-26 15,-22-5-11-15,0 0 17 16,0 5-14-16,-9 8-15 16,-21 6 0-16,12 8 8 15,-13 11-25-15,14 0-15 16,-10 0-64-16,5 11-3 15,5 26-62-15,17 3-53 16,0 0-154-16</inkml:trace>
-  <inkml:trace contextRef="#ctx0" brushRef="#br1" timeOffset="1.21607E6">33096 3117 551 0</inkml:trace>
-  <inkml:trace contextRef="#ctx0" brushRef="#br1" timeOffset="1.21665E6">33096 3117 551 0,'361'17'190'0,"-361"-39"-71"0,0-3-9 0,0 2-35 15,0 2-19-15,0 2-2 16,-18 5-16-16,9 3 15 16,-13 3-48-16,13 8-4 15,1 0-1-15,-1 0 2 16,0 12-2-16,0 16 0 16,9 0 5-16,0-8-17 15,0 2 12-15,0-11 0 16,0 1-12-16,18-9 4 0,-1-3 8 15,23 0 0-15,-14 0 11 16,5-18-6-16,-22-12-5 16,0-3 0-16,-9-3 23 15,0-4-14-15,0 0 8 16,0-1 5-16,0 9-9 16,-9-1 33-16,0 7-34 15,0 11-1-15,9 11-4 16,-22 1 11-16,22 3-18 15,0 0 0-15,-8 11-4 16,-1 29-11-16,9 4 15 16,0 7 0-16,0 0-8 15,9-3 7-15,30-8-6 0,-4-7-12 16,5-8-23-16,8-10 39 16,1-8-18-16,-23-7 21 15,14 0-11-15,-14 0 22 16,5-4-11-16,-23-21 0 15,1-5 10-15,-9-3 16 16,0 2-24-16,0 1 11 16,0 5 9-16,0 10-10 15,-9 7 0-15,1 8-12 16,8 0-2-16,-22 10-5 16,22 28-3-16,0 5 10 15,0 2-4-15,0-2 19 0,22 2-15 16,22-9 0-16,-5 5-37 15,10-12 33-15,-1-4-74 16,-22-4-94-16,-8-9-56 16,-5-8-274-16</inkml:trace>
-  <inkml:trace contextRef="#ctx0" brushRef="#br1" timeOffset="1.21833E6">32177 3979 116 0,'0'0'662'15,"0"0"-540"-15,0 0 9 16,0 0-65-16,0 0 17 0,0 0-43 15,-149-146-3-15,101 146-16 16,8 0-10-16,-4 7-5 16,-13 29-6-16,17 12 0 15,1 3-7-15,12 4 9 16,27-4-2-16,0-7 0 16,0-11 10-16,0-8-11 15,18-10 1-15,22-7 0 16,8-8-10-16,-4 0 17 15,13 0-7-15,0-33 3 16,-8-8 11-16,-10-6-6 16,-21-8 11-16,-10-4 17 15,1-6 23-15,-9-1-52 0,0 11 19 16,0 8-16-16,0 17 3 16,-17 16-9-16,-23 9-4 15,5 5 0-15,-5 0-15 16,1 38 12-16,4 12 3 15,4 16 0-15,5 4 9 16,17-4-18-16,9-5 9 16,0-9 0-16,0-12-11 15,17-11 13-15,23-7-2 16,-5-14 0-16,-4-5 8 16,17-3-7-16,-4 0-1 15,4 0 0-15,1-18 3 0,-1-8 7 16,-21 4-10-16,3 0 0 15,-3 1 10-15,-19 2-10 16,14 8 0-16,-13 9 0 16,-9 2-8-16,9 0 5 15,0 0-3-15,0 13 1 16,-1 13 7-16,-8 0-15 16,9 0 13-16,-9-5 0 15,13-7-6-15,-13-2 16 16,9-9-10-16,-9-3 0 15,9 0 8-15,0 0-11 16,8 0 3-16,-3 0 0 16,12-3 1-16,13-15 11 0,-12-5-12 15,4 5 0 1,-5-1 10-16,-17 9-18 0,-9 7 8 16,9 3 0-16,13 0-10 15,-22 0-5-15,0 6 15 16,8 24 0-16,10-5 1 15,-9 0-20-15,13-2 19 16,-5-8-13-16,10-8 4 16,-5-3-17-16,13-4 26 15,4 0 0-15,1-8 9 16,-5-25-11-16,5-7 6 16,-14-3-4-16,5-9 46 0,-14-3-46 15,-17-3 33 1,0 6-10-16,0 5-20 0,-8 10 26 15,-32 15-29-15,14 11 0 16,17 11-3-16,-39 0-3 16,17 20 6-16,13 30 0 15,1 9 8-15,8 6-18 16,9-3 10-16,0-3 0 16,0-7-9-16,26-13-28 15,14-13 14-15,-5-8-5 16,13-7-23-16,-8-7 50 15,17-4-29-15,-39 0 30 16,8 0-13-16,5-18 24 16,-5 3-11-16,5-3 0 15,-14 3 7-15,14 6-16 0,-31 3 9 16,9 3 0-16,-9 3-8 16,18 0 8-16,-10 0 0 15,1 0 0-15,22 0 1 16,-5 0-11-16,23 0 10 15,8 0 0-15,26 0 1 16,14 0 12-16,9-14-13 16,-14-5 23-16,-4 0-19 15,-31 1 66-15,-31 0-38 16,-8-4 14-16,-18 7 25 16,0 2-60-16,0 0 18 15,0 6-29-15,0 7 20 0,-18 0-41 16,-8 22 16-16,-22 29 5 15,-18 22-11-15,8 12 26 16,1 10-15-16,0 28 0 16,40 32 7-16,-5 20-13 15,22 15 6-15,22-7 0 16,35-26-3-16,9-18 20 16,-31-26-17-16,-13-28 0 15,-13-27 6-15,-9-22-13 16,0-24 7-16,0-12 0 15,-88 0 27-15,-35-41-13 16,-58-14 11-16,-34-10-25 16,4-8 11-16,22-5-14 0,31 9 3 15,61 7 0-15,40 0-10 16,39 3-23-16,18 1-19 16,49 3-93-16,74 8-144 15,35 2-137-15</inkml:trace>
-  <inkml:trace contextRef="#ctx0" brushRef="#br2" timeOffset="1.22099E6">3257 11482 734 0,'0'0'259'0,"0"0"-112"0,0 0-9 16,0 0-3-16,0 0-40 15,0 0 6-15,0 0-49 16,39-102-8-16,-39 95 6 15,0 3-46-15,0 0 26 16,0 1-20-16,0 3 4 16,0 0-13-16,0 0-1 15,0 0 0-15,0 3-12 16,0 19 25-16,0 8-14 16,9-5 1-16,17 8 0 15,23 3-8-15,8-3 8 0,9 4 0 16,0-10-5-16,-9-3 18 15,-9-2-13-15,-12 1 0 16,-6-5 6-16,-12-4-13 16,-9 0 7-16,-9-2 0 15,0-5-5-15,0 1 2 16,-44-5-1-16,-35 4 4 16,4-7-46-16,-9 0-5 15,5 0-58-15,13 0-42 16,31-28-22-16,26-14-53 15,9-12 45-15,0-11-516 16</inkml:trace>
-  <inkml:trace contextRef="#ctx0" brushRef="#br2" timeOffset="1.22105E6">3257 11482 574 0</inkml:trace>
-  <inkml:trace contextRef="#ctx0" brushRef="#br2" timeOffset="1.22117E6">3257 11482 574 0,'140'-266'174'0,"-140"255"-16"15,0 4-36-15,0-1-51 0,22 4 21 16,-4 4-55-16,30 0-6 15,10 0-11-15,25 0-18 16,14 0 16-16,4 0-18 16,-13 12 0-16,-14 9-1 15,-8 9-114-15,-17-1-136 16,8 0-284-16</inkml:trace>
-  <inkml:trace contextRef="#ctx0" brushRef="#br2" timeOffset="1.22155E6">4536 11365 806 0,'0'0'167'15,"0"0"-35"-15,0 0-34 16,0 0-20-16,0 0-8 16,0 0-67-16,-97-47 0 15,62 69-3-15,4 15 12 16,23-1-12-16,8 9 0 15,0 2 0-15,0 0 0 16,30-7 4-16,14-7-4 16,27-11 0-16,-5-11 13 15,8-11-8-15,-8 0-4 0,0 0 1 16,-9-26 37-16,-8-14 0 16,-23-3 13-16,-26-8 23 15,0-1-61-15,0 4 15 16,-57 4-29-16,-18 16 10 15,-22 9-23-15,14 11 13 16,-1 8-5-16,27 0-24 16,26 30-108-16,14 14 4 15,17 0-106-15,0 4-168 16</inkml:trace>
-  <inkml:trace contextRef="#ctx0" brushRef="#br2" timeOffset="1.22189E6">5314 11508 678 0,'0'0'183'16,"0"0"-31"-16,0 0-65 0,0 0-25 16,0 0-17-16,0 0-40 15,-57-37 16-15,39 37-21 16,18 27 1-16,0 1-4 15,0-5 9-15,9-6-6 16,35-2 2-16,13-15 4 16,22 0 16-16,-22 0-9 0,-4 0 5 15,-13 0 31 1,-9-32-21-16,-5 2 32 0,-26-3-2 16,0-4-37-16,0 5 27 15,-9 2-40-15,-48 8 0 16,-9 15-8-16,-9 7 0 15,-4 0-3-15,-4 4-13 16,8 32-166-16,-4 8-64 16,4 12-332-16</inkml:trace>
-  <inkml:trace contextRef="#ctx0" brushRef="#br2" timeOffset="1.22238E6">3797 11972 775 0,'0'0'245'0,"0"0"-102"16,0 0 16-16,0 0-37 0,0 0-70 16,0 0-8-1,0-29-44-15,0 29 2 0,-17 26 21 16,-40 10-7-16,-22 8 39 16,-5 0-25-16,-21 7-18 15,3 4 24-15,6-4-34 16,12 0 12-16,5-11-4 15,22-7 1-15,31-14 2 16,8-8-13-16,5-8 3 16,13-3 7-16,0 0-3 15,0 0-2-15,0 0 20 16,0 0-18-16,0 0 17 16,0 0-24-16,0 0 4 15,0 0-11-15,0 0 5 0,0 0-34 16,0 0-35-16,0 13-108 15,0 3-44-15,13 10-131 16,-13-1-400-16</inkml:trace>
-  <inkml:trace contextRef="#ctx0" brushRef="#br2" timeOffset="1.22263E6">1626 12835 651 0,'0'0'203'0,"0"0"-66"0,0 0 16 16,0 0-41-16,0 0-69 16,0 0-3-16,75 0-25 15,-27 0 23-15,-8 0-24 16,8 0-7-16,9 0-10 15,-4 0 3-15,-5 0-105 16,0 7-198-16,-8 11-399 16</inkml:trace>
-  <inkml:trace contextRef="#ctx0" brushRef="#br2" timeOffset="1.22299E6">2470 12736 800 0,'0'0'138'16,"0"0"-35"-16,0 0-23 15,0 0-10-15,0 0-39 16,0 0 3-16,286-22 6 16,-260 30-30-16,5 10 16 15,-5 7-15-15,-17 12-10 16,-9-4 11-16,0 7-12 15,-18-4 0-15,-30 4 6 16,0-2 4-16,4-10-10 16,22-9 0-16,13-8 1 15,9-4-5-15,0-7 4 0,0 0 0 16,0 0 23-16,57 0-23 16,18 3 44-16,22-3-12 15,26 0-29-15,8 0-4 16,10 0 1-16,13 0-127 15,9 0-121-15,17-3-438 16</inkml:trace>
-  <inkml:trace contextRef="#ctx0" brushRef="#br2" timeOffset="1.22366E6">5464 11907 730 0,'0'0'207'0,"0"0"-68"16,0 0 6-16,0 0-28 16,0 0-45-16,0 0 18 15,-190-74-58-15,190 74-12 16,18 33-1-16,61 15-6 0,14 17 32 15,38 12-11-15,23 8-17 16,-4 3 17-16,12 6-29 16,-8-6 3-16,4-7-4 15,14-13 11-15,-9-5-12 16,-5-23-3-16,-13-7 1 16,-35-11 5-16,-31-8 1 15,-31-10-7-15,-30 0 0 16,-9-4 12-16,-9 0-9 15,0 0-3-15,0 0-3 16,-9 0-1-16,-48 7-70 16,-9 15-49-16,0 11-119 15,9 3-130-15,8 4-371 0</inkml:trace>
-  <inkml:trace contextRef="#ctx0" brushRef="#br2" timeOffset="1.22394E6">6945 12901 880 0,'0'0'207'16,"0"0"-55"-16,0 0-6 16,0 0-38-16,0 0-38 15,0 0-11-15,-57-99-44 0,57 99 9 16,0 0-24-1,-13 0-1-15,4 33-9 0,9 14 15 16,0 12-5-16,0-1 0 16,0 7-8-16,0-2 3 15,0 3-94-15,0-11-126 16,31-4-114-16,-5-18-578 16</inkml:trace>
-  <inkml:trace contextRef="#ctx0" brushRef="#br2" timeOffset="1.22427E6">7292 12996 873 0,'0'0'155'0,"0"0"-67"0,0 0 6 16,0 0-27-16,0 0-65 15,0 0 1-15,-9-23-3 16,9 53 0-16,0 3 0 15,0 0 5-15,49-3-5 16,-1-9 0-16,-4-14 8 16,26-7-6-16,-26 0 1 15,5-4 9-15,-10-24 62 16,-21-10 2-16,-9-2 14 16,-9-6-9-16,0 1-58 0,-9 5 12 15,-31 12-32 1,5 8 2-16,-4 17-10 0,3 3-1 15,-3 0 2-15,-18 33-32 16,17 16-138-16,5 5-45 16,13 11-157-16</inkml:trace>
-  <inkml:trace contextRef="#ctx0" brushRef="#br2" timeOffset="1.22459E6">7283 13566 918 0,'0'0'123'0,"0"0"24"0,0 0-17 15,0 0-47-15,0 0-37 16,0 0-28-16,-17-15 5 15,100 15-2-15,23 23 34 16,26 2 5-16,8 0-41 16,5 1-8-16,-21-1 1 15,-19 5-9-15,-30-5-3 16,-27-7 0-16,-21 8-12 16,-27 4-33-16,0-5-135 15,0 8-88-15,-58 4-148 0</inkml:trace>
-  <inkml:trace contextRef="#ctx0" brushRef="#br2" timeOffset="1.22486E6">8325 13829 915 0,'0'0'213'15,"0"0"-47"-15,0 0-28 16,0 0-16-16,0 0-73 16,0 0-21-16,22-36-23 0,-22 54-1 15,18 23-4 1,-1 9 0-16,14-2 8 0,-4 4-6 16,-10-6-2-16,14-5 0 15,-22-9 6-15,-9-2-13 16,0-4-70-16,8-8-158 15,14-11-149-15</inkml:trace>
-  <inkml:trace contextRef="#ctx0" brushRef="#br2" timeOffset="1.22521E6">8923 13859 877 0,'0'0'219'0,"0"0"-91"15,0 0-5-15,0 0-12 16,0 0-32-16,0 0-53 16,0-40 8-16,0 40-30 15,0 0 6-15,9 7-17 16,13 19 10-16,4 6-3 16,1 1 2-16,12 3 11 15,1-3-13-15,-5-4 0 16,-13-3 3-16,4-1-9 15,5-2 8-15,-22-9-2 16,0 4 0-16,-9-7 6 16,0 4-9-16,0 0 3 15,0-8-6-15,-49 1 3 0,-17 2-51 16,0-2-116-16,0-8-33 16,1 0-78-16,16 0-181 15</inkml:trace>
-  <inkml:trace contextRef="#ctx0" brushRef="#br2" timeOffset="1.22534E6">8866 13911 638 0,'0'0'196'0,"0"0"-40"15,0 0-9-15,0 0-47 16,0 0-22-16,277-191-65 16,-194 187-5-16,14 4-13 15,-22 0 5-15,-9 0-100 0,-40 22-204 16</inkml:trace>
-  <inkml:trace contextRef="#ctx0" brushRef="#br1" timeOffset="1.22911E6">8897 11460 492 0,'0'0'150'16,"0"0"-105"-16,0 0 8 0,0 0 0 16,0 0-13-16,0 0 46 15,0 0-16-15,74-69 10 16,-74 58-13-16,0-4-30 16,0 1 23-16,-8-5-15 15,-32 1-25-15,-8 0 23 16,-27-4-30-16,-22 4 10 15,-13 0 13-15,-43 3-33 16,-19 0 18-16,-8 5-16 16,-9-2 1-16,0 6-2 15,9-2 1-15,-9 1-5 16,-9-8 0-16,-13 4 13 16,-5 0-13-16,-12 3 0 0,21 5 0 15,-13-1-13 1,14 4 15-16,-5 0-2 0,13 0 0 15,9 0 9-15,17 0-11 16,10 0 2-16,12 0 0 16,18-6-5-16,9-6 5 15,0 1 0-15,-13 3-3 16,-5 1 16-16,1 7-15 16,-23 0 2-16,22 0 0 15,-4 0-7-15,22 0 7 16,13 0 0-16,5 0-1 15,8 0 11-15,5 0-11 16,4 0 1-16,13 0 0 16,0 0-8-16,9 0 8 0,9-3 0 15,-9-8 0-15,18 3 15 16,-9-2-18-16,17 6 3 16,5 0 0-16,-4 1-11 15,3 3 11-15,6 0 0 16,-10 0-1-16,-4 0 7 15,5 0-8-15,-1 0 2 16,14 0 0-16,-5 0-8 16,13 3 8-16,1 5 0 15,-14 7-1-15,-4 9 5 0,-14 17-8 16,-8 9 4 0,9 2 0-16,4 7-7 0,-4-1 7 15,8 4 0-15,0 5-2 16,14-2 13-16,0 4-15 15,4-4 4-15,4 6 0 16,1-2-9-16,-5 8 10 16,13-1-1-16,9 5 0 15,0 0 11-15,-9 2-12 16,9 2 1-16,-9 6 0 16,9 7 14-16,-9-14-7 15,1 4 0-15,-14-7 7 16,22-1-5-16,0-3 19 15,0 0-22-15,0-8-1 16,22 4 16-16,4-3-13 0,-8 6-8 16,12 12 4-16,-21 0 8 15,-9 7-5-15,0 7-7 16,0-3 1-16,0-3 4 16,0-4-5-16,0-10 0 15,0-1 0-15,0-1 17 16,0 4-12-16,0 1-3 15,0 0 1-15,9-6 12 16,0 2-10-16,13-13-5 16,-5-5 2-16,1-7 11 15,13-6-8-15,-14-2-5 16,23-1 0-16,-14-3 0 16,5-4 4-16,-5-7-4 0,1-15 0 15,3 4 6-15,10-4-6 16,4-3 0-16,13 3 2 15,9-3 3-15,31-15 4 16,17 0-9-16,44 0 8 16,23 0 1-16,38 0-3 15,-12-11-6-15,22-4 0 16,-1-3-3-16,1 7 4 16,-14 8-1-16,14 3 0 15,-23-8 9-15,-3 8-12 16,-6-7 3-16,-8 7 0 15,0 0 1-15,9 0 1 0,22 0-2 16,9 0 0 0,-5 0 14-16,13 0-9 0,9 0-5 15,1 0 1-15,12-8-1 16,-22 5 0-16,-30 3 0 16,-9 0-2-16,-1 0 6 15,14-7-6-15,27-1 2 16,17 1 0-16,9-11-5 15,-5 3 7-15,-13 0-2 16,-39 5 0-16,-27-5 9 16,-48 0-9-16,-18 8 0 15,-39-4 0-15,-27 5 0 16,-8 1 2-16,-14 1-2 16,-8 1 0-16,13 3 5 0,-14-4-5 15,-8 0 0-15,4 4 0 16,-13-7-3-1,0 7 7-15,0 0-4 0,9 0 0 16,-9-8 11-16,17 1-10 16,14-8-1-16,-4 5 0 15,12-12-4-15,-12-4 11 16,3-7-7-16,5-10 5 16,-17-5 0-16,13-7 6 15,-31-14-2-15,0-9 1 16,0-13 4-16,0-14-8 0,-31-9-4 15,-4 1-2 1,-5-4 3-16,23 7-6 0,-14-3 3 16,22 8 0-1,0-5-2-15,1-1 11 0,8 2-9 16,-9 3 4-16,0 0-2 16,-13-4 16-16,13 1-18 15,0-4 0-15,9 3 1 16,-8 4 5-16,-1 14-6 15,0 12 0-15,-4 11 6 16,4 6-11-16,0 2 5 16,1-2 0-16,-10-1-4 15,5-4 10-15,-5 6-6 16,1 1 0-16,17 6 4 16,-9 7-5-16,0 0 1 0,-4 8 0 15,4-8-7-15,0-2 17 16,-8-2-10-16,-5-2 0 15,13 3 2-15,-9 3-6 16,1 0 4-16,-14 8 0 16,-4 1-8-16,-5 4 19 15,1 12-12-15,-5 7 1 16,-27 16-12-16,-21 0 3 16,-49 0 2-16,-61 33 4 15,-13 8-3-15,4-2-47 16,39 1-19-16,49-7-101 15,57-15-281-15</inkml:trace>
-  <inkml:trace contextRef="#ctx0" brushRef="#br1" timeOffset="1.23671E6">3674 15075 597 0,'0'0'281'0,"0"0"-155"16,0 0-3-16,0 0 18 16,0 0-52-16,0 0-22 15,-48 0-5-15,48 0 12 16,0 0-31-16,0 0-9 15,0 0 16-15,0 0-29 16,0 0 6-16,0 0-15 16,0 0-5-16,0 0-2 0,0 0-5 15,0 0 0-15,-9 0-7 16,-22 0-30-16,14 15-66 16,8 25-110-16,9 1-104 15,0 9-180-15</inkml:trace>
-  <inkml:trace contextRef="#ctx0" brushRef="#br1" timeOffset="1.2374E6">3437 15375 863 0,'0'0'210'0,"0"0"-88"0,0 0 29 16,0 0-38-16,0 0-34 15,0 0-14-15,-132-55-38 16,132 55-2-16,0 0 0 16,0 0-21-16,0 0 11 15,0 12-12-15,0 31 6 16,0 8 29-16,0 4-28 15,0-7 1-15,0 3-4 16,0-4-3-16,0-6 3 0,0-16-7 16,0-7 0-16,0-6-2 15,0-9 6-15,0-3-4 16,0 0 9-16,0 0-9 16,0 0 25-16,0-26 16 15,-9-21-35-15,-4-4-6 16,13-12-4-16,0-6 4 15,0 7-1-15,22-3 6 16,4 13-10-16,5 15 5 16,-4 19-8-16,3 3 6 15,-3 15-8-15,4 0 10 16,4 8-1-16,-18 22-14 0,14 2 11 16,-22 1 1-1,-9 7-5-15,0 4 7 0,0-4-14 16,-40 0 15-16,5 1 0 15,-4-16-13-15,21-7 9 16,-13-3 1-16,22-8 3 16,1 1-6-16,8-5 6 15,0 1-2-15,0-1 1 16,0 5-8-16,30-1 5 16,28 1-3-16,16-1 7 15,1-7 0-15,9 0 2 16,-5 0-2-16,-5 0 0 15,-8 0-3-15,-17 0 1 16,-14 0-121-16,-22 6-87 16,-4 6-85-16,-9 3-102 0</inkml:trace>
-  <inkml:trace contextRef="#ctx0" brushRef="#br1" timeOffset="1.23782E6">4215 15426 581 0,'0'0'280'16,"0"0"-85"-16,0 0-62 16,0 0-28-16,0 0-26 15,0 0-15-15,0-167 12 16,0 167-2-16,0-5-29 16,-22 5-19-16,-4 0-22 0,-5 0-3 15,13 0-1-15,-8 0 0 16,-5 21-1-16,22 6-7 15,9-5 9-15,0 7-1 16,0 1 0-16,0-11-4 16,31 5 3-16,4-2 1 15,14-7 0-15,8 3-2 16,0-3 5-16,-9-8-3 16,-12 4 0-16,-6 4 2 15,-12-8-4-15,-1 4 2 16,-17 4 0-16,0-8 0 15,0-4 0-15,0 5 0 16,0 6-2-16,-17-3-2 0,-31 11 4 16,-10-4 3-16,-8 5-3 15,18-5-20-15,4 4-96 16,22-14-89-16,22-1-81 16,0-7-213-16</inkml:trace>
-  <inkml:trace contextRef="#ctx0" brushRef="#br1" timeOffset="1.23827E6">4699 15402 382 0,'0'0'224'0,"0"0"-94"16,0 0-6-1,0 0-16-15,0 0-36 0,0 0-13 16,-181-9-13-16,181 6 6 15,0 3-7-15,36-7-25 16,43-1-5-16,4 0-2 16,1-2 8-16,4 3 6 15,-22 0-21-15,-9-1 2 16,-22 0 1-16,-13 8-7 16,-13-3 3-16,-9 3-1 15,0 0-4-15,0 0-1 16,-31 0-28-16,5 0 20 15,-5 0-8-15,13 0-10 0,9 3 21 16,-8 5 1 0,8 0 5-16,9-1-4 0,-13 7 7 15,4 5-3-15,9 0 13 16,-9 5 0-16,0 6 14 16,9 2-10-16,0-6-9 15,0 4 8-15,0-2-14 16,0 9 0-16,0-4-2 15,0-7 7-15,0 6-14 16,0-9-30-16,0 3-215 16,0-3-224-16</inkml:trace>
-  <inkml:trace contextRef="#ctx0" brushRef="#br1" timeOffset="1.23852E6">5349 15635 851 0,'0'0'144'16,"0"0"-18"-16,0 0-55 16,0 0-36-16,0 0-14 15,0 0-14-15,97-26 10 16,-49 19-10-16,-4 7-2 15,13 0-3-15,-8-8-2 16,-10 8-18-16,-12 0-74 0,-5 0-100 16,-22 0-78-16</inkml:trace>
-  <inkml:trace contextRef="#ctx0" brushRef="#br1" timeOffset="1.23875E6">5349 15635 700 0,'97'-147'203'16,"-115"133"-20"-16,18 3-72 16,-13 4-1-16,13 7-37 15,0 0-35-15,0 0-14 16,0 0-24-16,0 7 0 16,31 26 0-16,-13 0 3 0,12 7-3 15,-3 0 0-15,-19-1 0 16,1-1-9-16,4 2-139 15,-4-10-82-15,0-2-340 16</inkml:trace>
-  <inkml:trace contextRef="#ctx0" brushRef="#br1" timeOffset="1.23933E6">5978 15503 802 0,'0'0'210'16,"0"0"-72"-16,0 0 2 16,0 0-46-16,0 0-63 0,0 0-21 15,0-40-10-15,0 58 0 16,9 15-1-16,-9 0 7 16,8-4-6-16,1 0 0 15,0-7 3-15,0-4-5 16,4-3 2-16,-13-15 0 15,9 0 6-15,0 0-6 16,-9 0 20-16,0-18 73 16,0-19-66-16,0-6 15 15,0-5-1-15,0-3-14 16,0-10 13-16,0 2-28 16,0 11 1-16,0 15-4 15,0 18-5-15,0 12 4 0,0 3-8 16,0 0-3-16,0 18-1 15,8 30-6-15,32-1 10 16,-14 11 0-16,14-7-6 16,-5-3-1-16,5 0-13 15,-1-16-10-15,5-9 26 16,4-13-13-16,1-10 17 16,-1 0-2-16,-13 0 5 15,5-33 4-15,-23-14-4 16,5-4 16-16,-22 3 28 15,0-7-31-15,0 12 7 16,0-5-7-16,-39 21-16 0,-1 4 0 16,-4 15-1-1,5 8-7-15,12 0-16 0,-3 15-62 16,30 36-25-16,0-4-58 16,0 11-89-16,30-10-19 15,6-5-301-15</inkml:trace>
-  <inkml:trace contextRef="#ctx0" brushRef="#br1" timeOffset="1.23968E6">6708 15529 632 0,'0'0'239'16,"0"0"-50"-16,0 0-39 16,0 0-29-16,0 0-25 0,0 0-42 15,8-63-16-15,-8 63-20 16,0 0-18-16,0 0-10 15,0 15 3-15,0 18 7 16,0-3-5-16,9-2 1 16,9 2-16-16,21-5 2 15,1-10-18-15,-5-12 11 16,13-3 24-16,-8 0 1 16,-14 0 1-16,1-3 0 15,-14-22 15-15,-13-5 41 16,0-3-18-16,0 0-6 15,-40 0-7-15,-8 8-25 16,-18 0 6-16,9 13-7 0,0 12-8 16,22 0-19-16,4 4-113 15,31 36-68-15,0 4-73 16,0 4-346-16</inkml:trace>
-  <inkml:trace contextRef="#ctx0" brushRef="#br1" timeOffset="1.24035E6">7437 15620 831 0,'0'0'227'16,"0"0"-71"-16,0 0 6 16,0 0-52-16,0 0-42 0,0 0-6 15,-202-164-35-15,176 164-2 16,17 0-19-16,0 0-4 15,9 0-4-15,-13 32-2 16,13 1 4-16,0 0 0 16,0 7-12-16,13-7 4 15,22-7-1-15,14-4-22 16,-10-11 25-16,5-4-6 16,-4-7 1-16,-1 0 11 15,-12-7 0-15,-19-19 6 16,14-14 3-16,-22-8 22 15,9-3 12-15,-9-7-22 16,0-12-2-16,0 9 12 0,-9 9-15 16,-21 19 5-1,3 15-7-15,5 10-8 0,22 8 1 16,-17 0-7-16,17 15 0 16,-9 24-8-16,9 21 11 15,0 7-8-15,17 1 4 16,41 1-11-16,8 1 10 15,-9-4-25-15,9-15-3 16,0-5 4-16,-9-22-10 16,9-6 17-16,-18-18 3 15,0 0 16-15,1 0-2 16,-23-33 5-16,-8-7-3 0,4-8 24 16,-22-3-8-16,0 3 13 15,0 8-10-15,-31 0-4 16,5 14 17-16,-5 12-32 15,13 6 11-15,18 8-11 16,-9 0 0-16,9 22-2 16,0 19 2-16,0-1 0 15,0 0-6-15,27-7 3 16,12 0-2-16,27-15-11 16,9-3-39-16,13-15-22 15,26 0-115-15,-4 0-38 16,-13 0-98-16</inkml:trace>
-  <inkml:trace contextRef="#ctx0" brushRef="#br1" timeOffset="1.2414E6">10840 11841 662 0,'0'0'221'0,"0"0"-71"16,0 0-31-16,0 0-25 15,0 0-41-15,0 0-20 16,110-66-17-16,-31 59-2 16,4 3 21-16,-8 4-26 15,-9 0 11-15,-27 0-6 16,-12 0-6-16,-14 0-2 15,-13 0-6-15,0 7 0 0,-13 18 0 16,-53 12 12-16,-9 4-2 16,0-1-10-16,1-4 8 15,17-7-11-15,17-3 3 16,22-8 0-16,-4-10 0 16,22-1 2-16,0-7-2 15,0 8 0-15,0-8 2 16,49 3-2-16,26 8 1 15,4-3-1-15,13 5 7 16,-13 7-5-16,13 1-2 16,-26 8 0-16,0 1 2 15,-9 6-6-15,-26-3 4 16,-13-3 0-16,-18-2-3 16,0-8 5-16,-27-3-2 0,-52-6 9 15,-13 4-5-15,-22-15-8 16,-1 0-27-16,10 0-36 15,30 0-27-15,27 0-31 16,21-26 2-16,27-11-77 16,0-10-45-16,27-18-342 15</inkml:trace>
-  <inkml:trace contextRef="#ctx0" brushRef="#br1" timeOffset="1.24188E6">11521 11428 534 0,'0'0'266'0,"0"0"-64"16,0 0-81-16,0 0 26 0,0 0-33 15,0 0-19-15,-352-135-26 16,278 146-47-16,-23 36-5 16,22 15 9-16,18 11-13 15,-9 12 19-15,0 8-21 16,18 14-7-16,8 10 1 15,14 11 2-15,26 4-7 16,0 3 0-16,9-4 5 16,57 5 0-16,30-15-5 15,19-20 0-15,17-20-5 16,8-26 9-16,14-37-4 0,-13-18 0 16,-18 0 5-1,0-18 3-15,-18-44 25 0,-21-15 21 16,4-18 3-16,-22-14-24 15,-9-12 7-15,-40-18 6 16,1-15-27-16,-18-7 8 16,0-10-20-16,-75-7-5 15,-30 8 6-15,-45 25-3 16,-39 31-5-16,-39 46 0 16,-10 35-2-16,19 33-9 15,52 0 6-15,30 50-12 16,36 34-11-16,35 22-49 15,9 18-1-15,26 9-55 0,31-3-168 16,-8-2-336 0</inkml:trace>
-  <inkml:trace contextRef="#ctx0" brushRef="#br1" timeOffset="1.24709E6">11851 1512 677 0,'0'0'235'0,"0"0"-117"0,0 0-51 16,0 0-45-16,-304-187 64 15,190 150-24-15,-18 4-52 16,-17-7 52-16,-14 0-54 16,-35-4 14-16,-21 4 7 15,-36 7-5-15,-22 8-15 16,-35 2-9-16,-9 10 13 15,0 8-15-15,-22 5 2 16,4 0 0-16,-4 0-1 16,23 22 29-16,16 11-28 15,27 4 0-15,22-5 9 16,27 5-28-16,30 0 19 0,18 10 0 16,17 8-4-1,-26 14 26-15,-9 19-22 0,-22 11 0 16,-4 10 0-16,-4 8-19 15,-10 0 19-15,-8 1 0 16,-9-9-1-16,0-6 25 16,5-9-27-16,25-9 3 15,36-9 0-15,36-10-11 16,38-4 13-16,14-7-2 16,4-3 0-16,23-5 16 15,-14 1-21-15,13 3 5 16,-8 4 0-16,-5 10-13 15,-5 1 13-15,-3 3 0 16,12-8 0-16,9-1 16 16,5-9-19-16,13-3 3 0,13-8 0 15,4-3-18-15,1-9 26 16,12-5-8-16,1 2 0 16,-5 5 14-16,-8 6-20 15,-5 8 6-15,-22 10 0 16,-5 9-14-16,-3-1 21 15,-1 7-7-15,-9-3 0 16,5 0 16-16,13-4-23 16,9-7 7-16,13-8 0 15,5 5-10-15,-1-5 16 16,5 4-6-16,-5 4 0 16,1 7 15-16,-18 8-19 0,22 14 4 15,-23 11 0-15,1 11 0 16,0 7 17-16,0 1-17 15,9-8 8-15,12-15 9 16,-3-8-4-16,13-9-13 16,4-1 0-16,4-3 6 15,0-1 8-15,-4 4-14 16,5 7 0-16,-1 8 10 16,-4-4-15-16,5 1 5 15,8-6 0-15,0-6-3 16,0 1 12-16,1-5-9 15,-6-5 0-15,14-8 14 16,-8-4-24-16,8-13 10 0,-9-1 0 16,9-5-6-16,0 7 14 15,-9 0-8-15,9 7 0 16,-9 5 9-16,0-1-17 16,-4 0 8-16,4 0 0 15,1 4-8-15,8 3 21 16,-9 2-13-16,0-2 0 15,0 0 6-15,0-3-11 16,9-1 5-16,-13 1 0 16,13 4-9-16,-17-7 23 15,17 2-14-15,-9-2 0 16,0-1 4-16,0-1-13 0,-4 1 9 16,4 10 0-16,1 3-8 15,8 9 20-15,-18 1-12 16,9-1 0-16,-4-4 4 15,4-7-10-15,0-7 6 16,9-1 0-16,-8-2-10 16,8 2 27-16,0 1-17 15,0-3 0-15,0 2 3 16,0 1-12-16,0 8 9 16,0 3 0-16,0 7-5 15,-9 3 19-15,9 5-14 16,-9-5 0-16,0-10 3 15,9-7-12-15,0-7 9 0,0-10 0 16,0 3-5 0,0-2 17-16,0-3-12 0,0 5 0 15,0 6 2-15,0 3-12 16,0 5 10-16,0 7 0 16,0-12-4-16,9-2 17 15,9-9-17-15,-1-6 4 16,14-1 0-16,-5-6-13 15,5 3 13-15,4 0 0 16,-4 3-2-16,-5 0 17 16,5 5-15-16,-4 0 0 15,-5-1 1-15,4-3-9 16,0-1 8-16,14-11 0 0,-1 1-3 16,19-4 16-16,-1-4-13 15,17-3 0-15,1-5 0 16,9-6-2-16,4 0 2 15,4-1 0-15,-4 1 0 16,-13 4 15-16,-1-5-19 16,-8 4 4-16,22-4 0 15,18-3-5-15,17 0 5 16,26 0 0-16,5 0 0 16,22-6 14-16,-5 2-14 15,-8 4 0-15,0 0 1 16,-40 0-13-16,0 0 12 15,-9 0 0-15,-13 0-6 16,22 4 17-16,9-4-12 16,22 0 1-16,9 0 0 0,4 0-10 15,-5 0 10-15,1 0 0 16,-31 0-1-16,-9 0 12 16,-9 0-12-16,-21 0 1 15,-6 0 0-15,6 0-5 16,4 0 5-16,17 0 0 15,18 0 0-15,0 0 12 16,-1-4-14-16,1-4 2 16,-17-2 0-16,-10 6-6 15,-21 0 6-15,-5-1 0 16,-13 5 0-16,0 0 9 0,0 0-9 16,-1 0 0-16,10 0 2 15,22 0-10-15,8 0 8 16,5 0 0-16,-13 0-1 15,-5 5 15-15,-4 10-14 16,-22 0 0-16,0-1 0 16,-9 5-14-16,-17-5 14 15,-5 4 0-15,5 4-1 16,8 0 10-16,18 4-9 16,0 4 0-16,-9-9 1 15,9 1-10-15,0 0 9 16,0-7 0-16,0-3-2 15,0-3 16-15,-9-5-14 16,9 0 0-16,0 0 0 16,0-2-8-16,-9-2 8 0,9 5 0 15,-9-5 0-15,0 0 11 16,0 0-11-16,9 0 0 16,22 0 0-16,4-11 1 15,14-11 3-15,-9 3-4 16,-14 4 0-16,-17 5 13 15,0 7-13-15,-26 3 0 16,-5 0 1-16,-5 0-8 16,-12-5 7-16,22 2 0 15,17-5 0-15,9-6 14 16,8 4-16-16,10-10 2 16,-5 10 0-16,-22 2-7 0,0 5 7 15,-13 3 0-15,-13 0 0 16,-5 0 10-16,-17 0-12 15,4 0 2-15,-4 0 0 16,9 0-8-16,-1 0 8 16,32 0 0-16,-1 0-1 15,9 0 12-15,0 0-13 16,-8 3 2-16,-23 3 0 16,-8-4-9-16,4 2 11 15,-22-1-2-15,0-3 0 16,0 0 10-16,0 0-11 15,0 0 1-15,0 0 0 16,17 0-9-16,10 0 9 0,21 0 0 16,18 0-2-16,0 0 15 15,-9 0-13-15,9 0 0 16,-18-3 2-16,-8-3-11 16,-14 0 9-16,-17 3 0 15,13-1 0-15,-22 1 14 16,9-2-14-16,0-1 0 15,-1-9 6-15,14-2 2 16,-13-10-5-16,18 1-3 16,-10 1 0-16,5-6 16 15,-13 4-17-15,8-2 1 16,-8-8 0-16,4 0-6 0,5-7 13 16,-9-6-7-16,0-2 0 15,13-10 15-15,-5 7-15 16,1 4 0-16,-1-2 1 15,5 3-8-15,-4-1 9 16,0-4-2-16,3-4 0 16,-3-2 12-16,0-13-19 15,4-9 7-15,-14-8 0 16,19-8-8-16,-18-1 14 16,21 2-6-16,-12 4 0 15,22-5 12-15,8 7-18 16,9-7 6-16,9 4 0 15,0-5-10-15,0-5 12 16,0-8-2-16,0-14 0 0,0-5 11 16,-9-2-16-16,-18 5 5 15,-3 12 0-15,-6 11-13 16,-12 11 16-16,-9 7-3 16,8 4 0-16,-4 8 12 15,5 2-25-15,0 12 13 16,12 13 0-16,-21 17-16 15,9 3 21-15,-9 11-5 16,13 0 0-16,4 1 8 16,13-7-19-16,10-1 11 15,4 0 0-15,26-8-16 16,13-8 17-16,14-3-1 16,-1-3 0-16,-4 7 5 0,-22-8-14 15,-4-4 9-15,-9-6 0 16,-9-8-12-16,0 1 23 15,-8-8-11-15,-5 0 0 16,26-4 9-16,5 0-17 16,26 4 8-16,35 0 0 15,22 4-11-15,14-4 23 16,-1 7-12-16,-30 0 0 16,-18 4 10-16,-18 2-17 15,-21-4 7-15,-18-2 0 16,4-7-7-16,-35-6 15 15,-4-3-8-15,-5 1 0 16,-8-7 13-16,-5 1-20 0,-4-1 7 16,0 0 0-16,-9 1 0 15,0-5 17-15,0-3-17 16,-18-4 0-16,-21-8 16 16,-18 3-18-16,-1 1 2 15,10 1 0-15,22 6-5 16,-5 9 26-16,22 3-21 15,0-4 0-15,1-6 24 16,-1-2-25-16,0-2 1 16,-4-5 0-16,-5 4 5 15,1-2 10-15,-14-5-15 16,-4 3 0-16,-5-3 18 0,0 7-17 16,5 1-1-1,-4 3 0-15,4 4-7 0,-14 6 22 16,1-2-15-16,-9 1 0 15,-18 3 15-15,-13-1-24 16,-44 12 9-16,-17-2 0 16,-23 4-19-16,-17 9 36 15,-9-2-17-15,9 8 0 16,18 7 13-16,26 13-40 16,13 9 27-16,0 22-71 15,-17 4-36-15,-31 40-138 16,-14 23-140-16</inkml:trace>
-  <inkml:trace contextRef="#ctx0" brushRef="#br1" timeOffset="1.24913E6">5692 3942 637 0,'0'0'131'0,"0"0"-52"16,0 0 6-16,0 0 30 15,0 0-55-15,0 0-46 16,0 0 50-16,-171-190-45 16,96 172-18-16,0 6 19 15,-39 9-18-15,0 3-2 16,-27 0 0-16,-22 0 17 16,-8 3-17-16,-1 23 0 15,-17 3 0-15,9 7-7 16,-18 4 7-16,9 1 0 15,18 4 0-15,21-2 14 0,27-5-18 16,9 1 4 0,17-3 0-16,14 5-9 0,-14 2 9 15,-8-3 0-15,12 0 0 16,10-2 12-16,4-9-12 16,21-7 0-16,1 0 0 15,13-1-14-15,-22 1 18 16,-4 4-4-16,4-4 0 15,0-1 8-15,9 6-9 16,0 4 1-16,-9 14 0 16,-18 11-10-16,10 6 10 15,-23 11 0-15,14 0-1 16,-14-4 15-16,13-4-18 16,-4 1 4-16,-4 0 0 0,-5 4-5 15,-4 6 6-15,-4 5-1 16,-1 3 0-16,1-7 18 15,21-1-17-15,9-6-1 16,18 0 0-16,9-1-1 16,22-4 3-16,-5 1-2 15,4 4 0-15,5-4 13 16,5-1-13-16,8-2 0 16,-22-2 3-16,5 9-9 15,8-1 7-15,-12 1-1 16,3-8 0-16,5-3 15 15,5-8-16-15,-1 0 1 16,-4-4 0-16,5-3-7 16,8 0 7-16,-9-12 0 0,5 5 0 15,-5 0 12-15,10-1-13 16,-1 5 1-16,9-4 0 16,0 6-11-16,0 9 11 15,0-1 0-15,0 3-6 16,35 1 23-16,5-4-18 15,-1-3 1-15,9-4 0 16,-12-11-5-16,12 0 7 16,27-4-2-16,21-7 0 15,36 0 13-15,49-7-7 16,34-1-6-16,22-7 4 0,23-3-5 16,3 4 5-16,-8-1-4 15,9 0 0-15,-18 4 19 16,-17 0-23-16,-18 4 4 15,-31-5 0-15,9 1-16 16,0-4 18-16,9 1-2 16,13-4 0-16,4-1 13 15,5 1-15-15,-13 5 2 16,-9 0 0-16,-18-1-10 16,-18-2 16-16,1-2-6 15,-22 2 0-15,-1-4 16 16,-16 5-18-16,12-4 2 15,-13 5 0-15,18-5 9 16,8-3-1-16,44 0-5 16,14-3 5-16,22-17 2 0,17-4-1 15,-22 6-9-15,-13-1 0 16,4 1 3-16,-12-4 9 16,-14-3-12-16,0-4 11 15,-18-4-4-15,-21 0 12 16,-19 4-14-16,15 0-2 15,-23-4 25-15,8-1-26 16,-16 9 12-16,-10-4 2 16,-12 10-9-16,-19-1 23 15,5 1-23-15,-4-3-6 0,-9-5 18 16,0-5-8 0,-9-5-9-16,0-6 12 0,-17-5-7 15,-14 0 17-15,1 1-24 16,3 3 4-16,-12-3 22 15,13-9-19-15,-5-2 3 16,14-4-10-16,-14-4 12 16,5-7-10-16,-5 0-2 15,-17-4 0-15,13-5 5 16,-22-11 8-16,0-9-13 16,0-4 0-16,-22-4 17 15,-35 0-5-15,-18 1-12 16,-17 2 0-16,-22 1-1 15,-18 0 14-15,-22-3-13 16,-9-8 0-16,-17-3 6 0,-18-5-15 16,-17 5 9-16,-31-1 0 15,-49 4-12-15,-17 11 27 16,-40 7-15-16,-39 5 0 16,-13 6 10-16,-5 3-20 15,0 12 10-15,48 7 0 16,71 8-21-16,62 10 5 15,96 16 15-15,66 13-64 16,26 12-150-16,23-4-91 16</inkml:trace>
-  <inkml:trace contextRef="#ctx0" brushRef="#br1" timeOffset="1.25164E6">3340 3616 718 0,'0'0'82'15,"0"0"-44"-15,0 0 85 16,0 0 70-16,0 0-22 16,0 0-101-16,22-91 37 15,-44 44-20-15,-13-1-55 16,-4-6 35-16,-19-9-31 0,-8-2-25 16,-8-16 19-16,-14-7-21 15,-13-21 4-15,-5-12-13 16,1-7 12-16,-10-4-11 15,14 4-1-15,-4 12 0 16,21 9-8-16,18 25 13 16,-4 22-5-16,35 24 0 15,-5 13 10-15,31 13-19 16,1 7 9-16,8 3 0 16,0 0-6-16,0 0 15 15,0 0-9-15,0 0 0 16,0 0-7-16,-9 18-10 15,0 32 12-15,-13 24 5 16,5 17-13-16,-23-8 26 16,14-2-13-16,-5-18 0 0,13-8 6 15,18-23-12 1,-9-14 6-16,9-7 0 0,0-11-9 16,0 0 28-16,0 0-19 15,0 0 2-15,0-33 6 16,0-21-1-16,0-23-7 15,0-7 0-15,0-14-2 16,0-9 16-16,9 5-14 16,9 13 0-16,-5 33 2 15,-4 21-12-15,-9 28 10 16,9 7 0-16,8 0-5 16,32 0-11-16,25 26 16 0,23 14 0 15,17 0 9-15,9-3-18 16,0-1 9-16,18-13-48 15,-18-9-35-15,9-14-99 16,-44 0-84-16,-62 0-227 16</inkml:trace>
-  <inkml:trace contextRef="#ctx0" brushRef="#br1" timeOffset="1.25317E6">747 776 644 0,'0'0'235'0,"0"0"-44"16,0 0-58-16,0 0 36 15,0 0-52-15,0 0-36 16,-31-101 21-16,31 96-60 0,0 5-4 16,0 0-12-1,0 0-8-15,0 0-16 0,0 0-2 16,0 15 2-16,0 15-19 15,0 6 17-15,0 1 0 16,0 3-2-16,0-4 18 16,0 6-16-16,0 0 0 15,0-2 2-15,0-3-10 16,0-11 8-16,0-8 0 16,0-11-6-16,0-3 19 15,0-4-13-15,0 0 0 16,0 0-6-16,0 0-6 0,22 0-7 15,22 0 17 1,13-11-14-16,-9-7 31 16,1 0-16-16,-14-1 1 0,-13 2 0 15,13-2-8-15,-4 1 8 16,-5-1 0-16,-17 5-3 16,4 2 17-16,-13 3-14 15,0-7 0-15,0 5 4 16,0-1 22-16,0 6-22 15,0 2 7-15,0 4 6 16,0 0-3-16,0 0 6 16,0 0-20-16,0 0 7 15,0 0-17-15,0 0 10 16,0 7 0-16,0 26-7 16,0 11 19-16,-13 0-14 0,13 1 2 15,0 1 0-15,0 2-10 16,0-5 10-16,0-6 0 15,0-4-2-15,0-10-58 16,0-10-13-16,0-5-71 16,0-8-85-16,0 0 5 15,0-8 0-15,0-35-597 16</inkml:trace>
-  <inkml:trace contextRef="#ctx0" brushRef="#br1" timeOffset="1.25361E6">1217 524 690 0,'0'0'153'16,"0"0"6"-16,0 0-31 16,0 0-20-16,0 0-4 0,0 0-74 15,-303-172-2-15,228 198-16 16,0 22 0-16,1 10 6 16,16 8-6-16,1-1-10 15,18 8 21-15,12 12-18 16,5 6 3-16,22 7 4 15,0 6-4-15,0-3 6 16,49-8-14-16,17-9 2 16,22-23 1-16,4-14 2 15,13-17-5-15,10-23 9 16,8-7-2-16,0-14 30 0,0-45 22 16,-9-18-5-1,-21-7 20-15,-14-11-58 0,-13 1 19 16,-18-10 3-16,-30-1-36 15,-18-5 42-15,0 0-43 16,-18 6 0-16,-39 4 10 16,-14 17-4-16,6 20-7 15,-10 30 0-15,0 25 0 16,-8 8-15-16,-14 26 15 16,0 40-13-16,14 18 4 15,17 15-60-15,26 4-13 16,31-2-55-16,9-2-128 15,18-15-112-15</inkml:trace>
-  <inkml:trace contextRef="#ctx0" brushRef="#br1" timeOffset="1.25401E6">2725 663 500 0,'0'0'356'0,"0"0"-204"16,0 0 9-16,0 0-49 15,0 0-19-15,0 0-41 0,22-18-43 16,-22 18 30-16,0 0-39 15,0 10 1-15,0 20 20 16,-13 3-17-16,-5 5 14 16,0-6-18-16,18 4 3 15,0-11-5-15,0 1 2 16,0-7 0-16,0-5 1 16,0 1 15-16,36-8-16 15,12 1 0-15,9-8 11 16,9 0-26-16,-9 0-24 15,9 0-54-15,0-30-64 0,-9-7-118 16,-8-6-171-16</inkml:trace>
-  <inkml:trace contextRef="#ctx0" brushRef="#br1" timeOffset="1.25441E6">3389 444 663 0,'0'0'176'0,"0"0"-8"15,0 0-15-15,0 0-32 16,0 0-19-16,0 0-23 16,0-70-21-16,0 70 10 15,0 0-65-15,-9 0 1 16,9 0-4-16,-27 8-5 16,-3 19 5-16,3 8 0 0,5-3 6 15,14 1-15-15,8-6 9 16,0-2 0-16,0-4-7 15,0-2 18-15,8-1-11 16,23-3 0-16,4-4 2 16,14-1-10-16,-10-2 8 15,-4 4 0-15,-4-2-4 16,-4 1 12-16,-19-4-8 16,-8 5 0-16,0-2-3 15,0 1-13-15,0 0 16 16,0 3 0-16,-17-2-2 15,-18 3 16-15,-5-4-28 16,0-8-5-16,5 1-112 16,-4-4 14-16,21 0-97 0,9 0-68 15,9-33-489-15</inkml:trace>
-  <inkml:trace contextRef="#ctx0" brushRef="#br1" timeOffset="1.2545E6">3389 444 456 0</inkml:trace>
-  <inkml:trace contextRef="#ctx0" brushRef="#br1" timeOffset="1.25482E6">3389 444 456 0,'255'-11'240'0,"-255"11"-131"15,0-3 3-15,0 3 24 0,0-4-92 16,8 4 7-16,23 0-42 16,18 0-1-16,16-8 18 0,10 5-9 15,-9-9 13-15,-9 2-11 16,-17 2-5-16,-14 1-14 15,-17 3 0-15,-9 0 2 16,0 4 0-16,0-3-2 16,0-4-3-16,-9 4 0 15,-8 3-33-15,-1 0 35 16,-4 0-5-16,4 0 5 16,10 0-16-16,-1 3 17 15,9 11 0-15,-13 9-3 16,4-2 8-16,9 9-5 15,0 6 0-15,0 1 3 0,0 3 5 16,0 4-1-16,0 3-7 16,0-3 3-16,0 3 10 15,0 1-13-15,0-4 0 16,0-4-93-16,0-9-162 16,0-10-416-16</inkml:trace>
-  <inkml:trace contextRef="#ctx0" brushRef="#br1" timeOffset="1.25912E6">4307 524 641 0,'0'0'167'15,"0"0"-58"-15,0 0 11 16,0 0-1-16,0 0-54 16,0 0 17-16,40-3-16 15,-31 3-4-15,0 0 14 16,-9 0-53-16,0 0 4 15,0 0 11-15,0 0-34 16,0 0 24-16,17-4-11 16,14-4-10-16,17 2 1 15,9-2-8-15,1 4 0 0,-1 1-5 16,-5-1 18 0,-12 4-13-16,-9 0 0 0,-22 0-27 15,-9 0-4-15,0 0-99 16,0 0-32-16,0 0-13 15,-22 0-164-15,-5 0-143 16</inkml:trace>
-  <inkml:trace contextRef="#ctx0" brushRef="#br1" timeOffset="1.25921E6">4307 524 555 0</inkml:trace>
-  <inkml:trace contextRef="#ctx0" brushRef="#br1" timeOffset="1.25937E6">4307 524 555 0,'132'-194'168'0,"-141"176"-21"0,9 8-8 15,0 2-43-15,0 8 21 0,0 0-45 16,0 0-41-16,0 0 2 16,0 0-33-16,0 15 0 15,0 17-5-15,9 20 22 16,13 3-7-16,-13 3-3 16,9 5 4-16,-10 2-3 15,-8 1-8-15,0 0 0 16,0-8-2-16,0-11-187 15,0-12-201-15</inkml:trace>
-  <inkml:trace contextRef="#ctx0" brushRef="#br1" timeOffset="1.25992E6">4896 612 663 0,'0'0'141'0,"0"0"14"15,0 0-26-15,0 0-81 16,0 0-38-16,0 0 2 16,9 43-12-16,-9 2 50 15,0-5-26-15,0 4 32 16,0-7-31-16,0-1-22 16,0-11 12-16,0-13-13 15,9-5-2-15,-9-7 17 16,0 0-12-16,9 0 142 15,4-34-28-15,5-16-116 16,-1-9 5-16,1-3-1 0,-5 3-7 16,5 4 8-16,-1 6 12 15,-8 11-19-15,4 13-1 16,-4 13 0-16,-9 12-11 16,0 0 11-16,9 0-7 15,-1 18 0-15,10 23-6 16,13 6 13-16,-5 1 0 15,14-5 0-15,-1-10-12 16,-12-6 16-16,-1-13-4 16,5-3 0-16,-14-11 16 15,14 0-8-15,4 0-8 16,5-25 4-16,8-12 9 16,-13-7-1-16,5 1 4 0,-31-2 17 15,-9-1-29 1,0 1 25-16,0 8-29 0,0 12 3 15,-40 10-16-15,5 11 3 16,-13 4-30-16,-9 4-40 16,8 36-110-16,23 18 19 15,8 8-54-15,18-3-42 16</inkml:trace>
-  <inkml:trace contextRef="#ctx0" brushRef="#br1" timeOffset="1.26027E6">5806 751 659 0,'0'0'145'0,"0"0"-27"15,0 0 17-15,0 0-20 16,0 0-70-16,0 0 42 16,0-76-31-16,0 76-42 15,0 0 6-15,-8 0-20 16,8 3-8-16,0 22-8 15,0 5 23-15,0-5-7 16,0-7 0-16,8-3 8 16,41-7 2-16,-14-8-10 15,13 0 0-15,-8 0 9 16,-14-11 5-16,-8-11-12 0,-5-4 15 16,-13-3-14-16,0 0 28 15,0 2-31-15,-22 6 0 16,-26 6-9-16,-5 11-7 15,5 4-50-15,8 0-77 16,14 19-61-16,4 10-10 16,13-4-182-16</inkml:trace>
-  <inkml:trace contextRef="#ctx0" brushRef="#br1" timeOffset="1.26035E6">5806 751 114 0</inkml:trace>
-  <inkml:trace contextRef="#ctx0" brushRef="#br1" timeOffset="1.2609E6">5806 751 114 0,'255'-40'560'0,"-246"25"-406"0,-9 1-15 0,0-1 23 0,0 3-96 16,0 2-8-16,0 2 4 15,-9 5-56-15,1 3 32 16,-10 0-38-16,-4 0 7 16,4 11-21-16,10 22 14 15,8 4 0-15,0-1-10 16,0-11 24-16,0-2-15 15,0-13 1-15,17-10-13 16,14 0 5-16,-5 0 9 16,14-18-1-16,-5-17 4 15,-4-3 18-15,-5-5-22 16,-17-5 31-16,4 3-16 16,-13-1 57-16,0 1-58 0,0 5 18 15,0 11-2-15,0 7-12 16,-13 11-12-16,4 11-6 15,0 0 6-15,9 0-19 16,-8 8-15-16,-1 31 28 16,9 13-24-16,0 6 42 15,0-7-18-15,0-3 0 16,26-5 7-16,14-13-11 16,-5-5 4-16,13-10 0 15,9-12-4-15,1-3 10 0,-1 0-6 16,0 0 0-1,0-21 6-15,-17-8-7 0,-14-4 1 16,-17-3 0-16,-9-5 3 16,0 4 16-16,0 1-6 15,0 14-13-15,0 7 9 16,-18 12 0-16,1 3-9 16,-14 0-4-16,13 29-7 15,-4 18 8-15,13 8 3 16,9 1 0-16,0-2 5 15,22-4-24-15,22-5 19 16,22-8-87-16,5-11-37 16,3-7-122-16,10-17-159 15</inkml:trace>
-  <inkml:trace contextRef="#ctx0" brushRef="#br1" timeOffset="1.26115E6">7266 652 601 0,'0'0'253'15,"0"0"-232"-15,0 0 66 16,0 0-48-16,0 0-35 16,0 0 22-16,228-18-22 15,-153 8 12-15,-18 1-16 16,0 3 6-16,-21-2-22 0,-14 4-76 15,-22-2-61 1,0-3 12-16,0 3-380 0</inkml:trace>
-  <inkml:trace contextRef="#ctx0" brushRef="#br1" timeOffset="1.2613E6">7547 506 237 0,'0'0'281'0,"0"0"-140"15,0 0 16-15,0 0-24 0,0 0-56 16,0 0 15-16,-44-43-49 15,44 43-30-15,0 0-13 16,0 21 4-16,0 19-4 16,0 15 0-16,0 0 4 15,0 4-10-15,0 4 6 16,0-10-61-16,0-1-185 16</inkml:trace>
-  <inkml:trace contextRef="#ctx0" brushRef="#br1" timeOffset="1.26187E6">8193 403 795 0,'0'0'190'0,"0"0"-50"15,0 0-48-15,0 0 31 16,0 0-122-16,0 0-1 15,0-14-1-15,0 58-6 0,0 14 7 16,0 1 0-16,0-8 5 16,0-7-6-16,0-11 1 15,0-11 0-15,0-15-1 16,0-3 19-16,0-4-18 16,0 0 33-16,-8 0 83 15,-1-23 8-15,-22-13-115 16,13-7-6-16,1-10-1 15,8 0 19-15,9-6-21 16,0 4 0-16,0 0 4 16,18 12-14-16,17 6 10 15,13 11 0-15,1 12-3 16,-10 10 12-16,5 4-17 0,-4 0 8 16,-10 0-14-16,-21 22-1 15,0 10 6-15,-9 1 9 16,0 0-10-16,0 4 22 15,-9-4-12-15,-22 0 0 16,23-3 1-16,-1-9-15 16,9 1 15-16,0 0-1 15,0-8 0-15,0 0 13 16,39 2-13-16,-3-1 0 16,21-1 1-16,0-3-16 15,18 1-16-15,-1-2-56 16,-3-2-19-16,3-8-100 0,-8 0-24 15,-9 0-146 1</inkml:trace>
-  <inkml:trace contextRef="#ctx0" brushRef="#br1" timeOffset="1.26229E6">9200 389 673 0,'0'0'192'16,"0"0"-56"-16,0 0 19 15,0 0-55-15,0 0-22 16,0-186 19-16,-13 168-47 16,-14-1 0-16,1 3-17 15,-13 6-23-15,-1 7-1 16,-8 3-9-16,12 0 0 16,6 0-15-16,3 29 10 0,10 11 5 15,17 0 0-15,0 1 11 16,0-1-18-16,9 0 7 15,26-7 0-15,13 0-6 16,-8-3 12-16,8-2-6 16,-4 5 0-16,-13-1 12 15,-5-1-19-15,-17-6 7 16,4-3 0-16,-13-7-11 16,0-1 13-16,0-7-2 15,0-2 0-15,-40 2 11 0,-25-4-11 16,-23 0 0-1,4 5 0-15,1-4-8 0,-5-4 8 16,30 0-51-16,23 0-73 16,27 0-45-16,8-15 75 15,8-15-118-15,67-6-17 16</inkml:trace>
-  <inkml:trace contextRef="#ctx0" brushRef="#br1" timeOffset="1.2624E6">9200 389 529 0</inkml:trace>
-  <inkml:trace contextRef="#ctx0" brushRef="#br1" timeOffset="1.26275E6">9200 389 529 0,'75'52'173'0,"-93"-57"-32"16,5 5 12-16,13-3-51 0,0 3-47 15,0 0-41-15,13 0 34 0,40-3-41 16,17-1-2-16,14-4 4 15,-9 1 3-15,-1-1-7 16,5 2-5-16,-21 2 10 16,-1-4-4-16,-31 8-6 15,-8-3 0-15,-10 3-4 16,-8 0 17-16,0 0-13 16,0 0 0-16,0 0 2 15,-26 0-14-15,0 0 12 16,-14 0 0-16,23 0-8 0,-5 0 16 15,13 0-11 1,-9 0 3-16,9 15 0 0,-21 10-10 16,21 11 10-16,-18 6 0 15,14 0-9-15,-4 3 27 16,8 2-18-16,9-6 0 16,-9 2 9-16,9-5-2 15,0-15-7-15,0 4 0 16,0-12 2-16,0-1-2 15,0-7-38-15,0-7-189 16,0 0-261-16</inkml:trace>
-  <inkml:trace contextRef="#ctx0" brushRef="#br1" timeOffset="1.26661E6">4422 4545 474 0,'0'0'193'15,"0"0"-67"-15,0 0 17 16,74-256-35-16,-34 183-2 16,-22-4 14-16,12 1-35 15,-21 6 20-15,0 8-33 16,-9 7 2-16,0 8 2 15,-9 10-55-15,-30 7 15 0,-19 13-6 16,-8 10-24-16,-17 7 15 16,-23 0-21-16,-17 24 2 15,-17 32-5-15,-5 17 3 16,22 15 0-16,13 9-1 16,22 18 17-16,31 6-16 15,30 10 0-15,27 15 0 16,0-3-10-16,66-8 11 15,40-11-1-15,17-21 0 16,17-16 14-16,10-18-15 16,4-25 1-16,8-22 0 15,5-22-6-15,22 0 9 16,-8-40-3-16,12-22 2 0,-13-11 17 16,-30-7-13-16,-27-8 12 15,-26-11-11-15,-31-4 34 16,-31-6-37-16,-27 3 1 15,-8-4 12-15,-17 1 0 16,-58 3-6-16,-30 3-11 16,-10 12 0-16,-34 11-14 15,-14 17 17-15,-8 16-3 16,-9 21 0-16,21 15 11 16,14 11-16-16,22 0 5 15,13 33 0-15,22 33-22 16,5 22 23-16,17 18-1 15,18 15 0-15,17 3 14 0,22 4-20 16,9 4 6-16,9 3 0 16,70-19-17-16,4-10 19 15,32-18-2-15,-1-26 0 16,27-18 13-16,21-26-19 16,10-18 6-16,8 0 0 15,-4-51-1-15,17-22 4 16,-13-24-3-16,-21-18 3 15,-27-13 16-15,-27-12-11 16,-30-2-8-16,-36-4 0 16,-21 0 0-16,-18 7 9 15,-57 8-9-15,-57 21 0 16,-45 15 2-16,-30 22-15 16,-31 22 13-16,14 26-37 0,17 25 2 15,17 0-73-15,49 36-82 16,57 27-90-16,36-9-169 15</inkml:trace>
-  <inkml:trace contextRef="#ctx0" brushRef="#br1" timeOffset="1.26775E6">4800 3533 624 0,'0'0'155'0,"0"0"-98"16,0 0 69-16,0 0 1 15,0 0-11-15,0 0 40 16,0 7-38-16,0-37 17 16,0-13-100-16,9-12-26 15,4-14 63-15,13-16-46 16,5-17-19-16,-14-15 12 16,10-4-9-16,-5-10 0 15,-13 3-1-15,-1 3 0 16,-8 12 3-16,0 11-12 0,0 11 0 15,0 10 2 1,0 1 10-16,0 4-12 0,0-2 0 16,9-2 10-16,9 7-19 15,-18 14 9-15,13 15 0 16,-13 18-7-16,0 8 28 16,0 8-21-16,0 2 0 15,0 1 7-15,0 4-5 16,0-5-2-16,0 4 0 15,0 1-3-15,0-1 15 16,0 4-12-16,0 0 0 16,0-3 5-16,0-5-12 15,0 1 7-15,0-4 0 16,-13 1-8-16,-5-5 22 16,9 0-14-16,1 0 0 0,8-3 5 15,-18 3-14-15,18 1 9 16,-13-9 0-16,13 2-10 15,0-16 24-15,0-3-14 16,0-8 0-16,0 4 9 16,0 12-23-16,0 9 14 15,0 9 0-15,0 7-5 16,0 3 19-16,0 1-14 16,0-2 0-16,0 2 0 15,0 3-19-15,0 0 19 16,-18 0 0-16,-8 0-12 15,-31 8 22-15,-22 28-10 0,21 9 0 16,-16 8 4-16,-1 7-16 16,18-6 12-16,8-10 0 15,23-11-5-15,4-15 17 16,22-11-12-16,0-7 0 16,0 0 2-16,0 0-12 15,0 0 10-15,13 0 0 16,44-40-3-16,18-18 18 15,9-5-15-15,4 5 0 16,-22 3 0-16,-9 7-8 16,0 8 8-16,-31 15 0 15,-8 7-6-15,-5 7 19 16,5 11-16-16,-1 0 3 16,23 11-1-16,8 32-18 0,-4 12 19 15,4 3 0-15,1 1-9 16,-1-4-2-16,-4 0-50 15,-4-5-79-15,8-9-131 16,0-14-158-16</inkml:trace>
+  <inkml:trace contextRef="#ctx0" brushRef="#br1" timeOffset="-39793.73">30265 652 264 0,'0'0'160'0,"0"0"-5"0,0 0-40 16,0 0 2-16,0 0 18 15,0 0-54-15,84-91 21 16,-84 86-6 0,0 5-5-16,0 0 5 0,0 0-64 15,0 0 3-15,0 0 9 16,0 0-37-16,0 0 44 15,0 0-27-15,-35 0-14 16,-71 0 7-16,-39 0-10 16,-4 0-7-16,-14 0 0 15,13 0 16-15,-3 0-19 16,-14 0 3-16,-53 0 0 16,-44 0-6-16,-31 0 9 15,1 0-3-15,-1 0 0 0,10 0 4 16,-19 0-7-16,14 0 3 15,13 0 0-15,62 0-14 16,52 0 19-16,49 0-5 16,30-10 0-16,27 3 16 15,0-8-22-15,0 4 6 16,0 1 0-16,-9-2-6 16,-9 5 11-16,-4 7-5 15,-35 0 0-15,-9 0 6 16,-18 0-12-16,-22 11 6 15,5 15 0-15,-13-1-5 16,-18-2 11-16,-9-1-6 16,-22-1 0-16,-17-3 11 0,8 1-19 15,14-5 8 1,-5 1 0-16,22 0-12 0,9-1 15 16,0 2-3-16,9 1 0 15,8 4 11-15,-8 2-18 16,9 7 7-16,-18 3 0 15,-9 7-6-15,-22 7 12 16,5-3-6-16,4-4 0 16,22-5 6-16,26-8-14 15,31-5 8-15,0-3 0 16,-9-6-10-16,-21 6 17 16,-18 7-7-16,-27 7 0 0,-22 10-14 15,1 8-2-15,-18 4 11 16,17 4 2-16,-4-1-18 15,5 4 22-15,30-7-1 16,26-7 0-16,40-9 12 16,18-4-19-16,9-7 7 15,-1-3 0-15,-8-2-8 16,4-1 16-16,-13-1-8 16,17 6 0-16,10 1 11 15,3 5-18-15,14 11 7 16,-4 7 0-16,-1 4-8 15,5 7 15-15,26 4-7 16,5 3 0-16,17 12 10 16,-4 3-21-16,4 14 11 15,-4 16 0-15,-13 14 9 0,-1 14 6 16,1 12-11-16,-18 11 11 16,18 2-4-16,-18 2 23 15,31-4-27-15,-5-15-5 16,22-8 23-16,10-7-15 15,8-6 1-15,0-2 5 16,0 2-2-16,0 1 9 16,0 17-22-16,0 9-1 15,0-1 10-15,0-2 6 16,0-11-16-16,0-8 0 0,0 14 8 16,0-4-1-1,0-3-7-15,-14-6 0 0,-3-11 1 16,-10 0 19-16,-12-10-20 15,-1-4 0-15,5-8 9 16,-4-4-11-16,12 1 2 16,-4 0 0-16,14-7-4 15,17-12 15-15,0-11-11 16,0-11 0-16,0-3 3 16,0-4-12-16,0 1 9 15,17 2 0-15,1-2-2 16,-5-1 13-16,5-15-11 15,-9-10 0-15,-1-4 0 16,1 0-7-16,13 3 7 16,-4-2 0-16,-1 6-2 0,-3 0 13 15,3 1-11-15,1-2 0 16,-10-2 2-16,23 3-12 16,-13-3 10-16,13 3 0 15,4-3-2-15,4-1 10 16,18-2-8-16,-21-5 0 15,12 4 2-15,9-8-11 16,9-3 9-16,31-8 0 16,26-3-5-16,48 0 19 15,18 0-15-15,18 0 1 16,-9-7 0-16,13 7-4 16,-22 0 4-16,-9 4 0 0,-9 25-2 15,10-3 14 1,-23-4-12-16,5 0 0 0,-1-4 3 15,5-7-8-15,14-7 6 16,30-4-1-16,26 0 0 16,35-15 12-16,5-14-12 15,5 0 0-15,-5 3 1 16,-31 4-17-16,-9 14 16 16,-21 1 0-16,-14 7-2 15,-22 0 10-15,9 0-8 16,18-3 0-16,30-15 6 15,27-8-14-15,39-7 8 16,14-4 0-16,4 8 1 0,-18 11 10 16,-31 7-11-1,-25 11 0-15,-28 0 7 0,-30 0-22 16,9 2 15-16,22 14 0 16,9-8-8-16,26-1 11 15,8 0-3-15,5-7 0 16,-21 0 5-16,-32 0-11 15,-4 0 6-15,-44 4 0 16,-4 0-7-16,-23 3 17 16,5 4-10-16,-13-4 0 15,31 1 9-15,17 2-20 16,18-6 11-16,9 0 0 0,4-4-6 16,-14 0 13-1,-8 0-7-15,-26 0 0 0,4-8 4 16,-13 5-18-16,9 3 14 15,-5 0 0-15,22 0-10 16,-17 0 22-16,8 0-12 16,-30 0 0-16,-9 3 6 15,-9-3-17-15,-9 4 11 16,-8 0 0-16,-23-1-7 16,-17 1 18-16,-9 4-11 15,-17-5 0-15,-14 1 6 16,-17-4-15-16,4 0 9 15,-13 0 0-15,0 0-7 16,0 0 20-16,9 0-13 16,-9 0 0-16,18 0 8 0,-1-12-16 15,5-13 8-15,5-4 0 16,12-15-6-16,-4-7 16 16,5-15-10-16,-1-8 0 15,-30-6 7-15,0 0-13 16,-9-1 6-16,0-2 0 15,0-1-6-15,-40-5 15 16,23 2-9-16,8-8 0 16,9-3 8-16,0-12-18 15,0-3 10-15,48-5 0 16,-21-2-8-16,4-7 23 16,-23-5-15-16,1-4 0 0,-9 0 4 15,0 2-14-15,-48 2 10 16,21 0 0-16,-21 5-4 15,30-2 16-15,5 2-12 16,13-1 0-16,0 10 5 16,0 9-14-16,0 6 9 15,0 8 0-15,13-3-5 16,-4-1 17-16,-9 0-12 16,0-2 0-16,0-2 7 15,0 0-17-15,0 1 10 16,0 7 0-16,9 0-6 15,0 3 20-15,0 1-14 16,21-7 0-16,-30-8 6 16,9-8-15-16,0 4 9 15,0 1 0-15,-9 6-5 0,0 2 18 16,0 2-13 0,0 4 0-16,0-1 5 0,0 5-13 15,-9 0 8-15,-9 3 0 16,-21 5-7-16,-1 2 23 15,23 3-16-15,-1 10 0 16,9-2 2-16,9 4-12 16,0 8 10-16,0-1 0 15,0 1-8-15,0-5 20 16,0-10-12-16,0 0 0 0,0-3 8 16,9-9-20-1,-9 9 12-15,9-8 0 0,-9-1-4 16,0 9 17-16,0-1-13 15,0 11 0-15,-18 8 2 16,-30 7-18-16,-18 3 16 16,-40 5 0-16,-17 2-9 15,-26 9 13-15,-14 2-6 16,9 12 2-16,23 3-44 16,38 9-1-16,-3-3-152 15,38-9-221-15</inkml:trace>
+  <inkml:trace contextRef="#ctx0" brushRef="#br1" timeOffset="-38823.73">31676 685 714 0,'0'0'194'16,"0"0"-69"-16,0 0 9 15,0 0-22-15,0 0-28 16,0 0-2-16,0 0-39 16,-96 0 36-16,109 0-35 15,13 0-21-15,14-22 32 16,-5-4-44-16,-4 1 18 16,-14 7 9-16,1 0-38 15,4-2 37-15,-22 14-32 0,9 6-4 16,-9 0 13-16,0 0-8 15,0 0-6-15,0 0 0 16,0 0-4-16,8 4-6 16,-8 24 10-16,9 14 0 15,-9 9-9-15,0 7 12 16,0 3-3-16,0-1 0 16,0-2 12-16,0-8-20 15,0-5 8-15,0-9 0 16,0-6-6-16,0-12 11 15,0-11-5-15,0 1 0 16,0-5 5-16,-9 1-14 16,-8-1 9-16,-32-3 0 0,10 0 2 15,21 0 5 1,1 0-7-16,17 0 0 0,0 0 17 16,0 0-23-16,0 0 6 15,0 0 0-15,0 0-9 16,44-7 14-16,35-11-5 15,-13 0 0-15,8-2 6 16,1 0-22-16,13-3-15 16,-31-6-91-16,9 0-137 15,-22 4-102-15,-13 4-448 16</inkml:trace>
+  <inkml:trace contextRef="#ctx0" brushRef="#br1" timeOffset="-38294.73">32252 312 210 0,'0'0'576'0,"0"0"-384"16,0 0-61-16,-132-227 48 16,97 195-61-16,-22 6-35 15,-9 11 10-15,9 8-61 16,-22 7 7-16,4 0-15 15,-17 22-14-15,4 26 5 16,-5 14-15-16,-21 19 0 0,17 13 5 16,23 16 10-1,25 7-15-15,23 4 0 16,17-5 9-16,9 5-5 0,0-8-4 16,0-7 0-16,44-2-3 15,-4-13 12-15,8-11-9 16,0-14 0-16,18-11 10 15,0-12-15-15,18-7 5 16,13-14 0-16,-5-11 10 16,13-11 2-16,-21 0 1 15,-5 0 24-15,-4-33-18 16,-9-10 45-16,-9-8-44 16,0-11 0-16,-9-19 38 15,9-20-58-15,-4-10 28 0,-13-13-24 16,-23 0 12-16,-17 3-16 15,0 3 0-15,-66 9 0 16,-26 14 0-16,-40 7 0 16,-22 16 0-16,5 24 0 15,-14 23 0-15,23 25 0 16,25 0-8-16,27 58-55 16,31 29-5-16,22 31-90 15,-4 2-229-15</inkml:trace>
+  <inkml:trace contextRef="#ctx0" brushRef="#br1" timeOffset="-35323.73">22616 10131 402 0,'0'0'175'0,"0"0"-49"15,0 0-25-15,0 0 15 16,0 0 17-16,0 0-69 0,18-78 18 15,-18 71 9 1,0-1-40-16,0-2 15 16,0-5-38-16,-18 4-6 0,-39-4 24 15,-9 1-42-15,-26 6 20 16,-36 1-23-16,-21 4 6 16,-14 3-6-16,-17-4-1 15,-9-3 0-15,-9-5-1 16,0-1 11-16,-4-7-10 15,26 2 0-15,23-7 2 16,29 4-5-16,19-1 3 16,13-5 0-16,-5 6 0 15,5 2 10-15,-45 1-10 16,-12 10 0-16,-49 8 0 16,-22 0-8-16,-8 0 6 0,21 0 2 15,9 0-2 1,18 0 11-16,0 0-12 0,17 5 3 15,14-5 0-15,4 7-2 16,13 7 5-16,-9 5-3 16,-4 6 0-16,-4 4 13 15,8-3-14-15,18-4 1 16,9-3 0-16,-1-6 1 16,10-1 0-16,12-4-1 15,-12-8 1-15,8 3 10 16,5-3-14-16,-22 4 3 15,-10 7 0-15,-21 3-3 0,-13 0 5 16,-31 5-2-16,0-5 0 16,-13 1 8-1,44 0-13-15,26 0 5 0,35-5 0 16,40-2-6-16,17-1 6 16,23-7 0-16,8 0 0 15,9 3 7-15,-9-3-9 16,9 4 2-16,-22 3-1 15,5 12-4-15,-41 6-2 16,1 12 7-16,-17-1 0 16,8-6 10-16,0-1-13 15,9-3 3-15,-1 0 0 16,10-1-5-16,0-5 8 16,-5 8-3-16,5-3 0 15,8-10 3-15,14-1-3 0,4 4 0 16,-13 8 0-16,-14 10-5 15,-17 16 8-15,-8 7-3 16,-6 9 0-16,6 10 5 16,-10 2-7-16,-4 4 2 15,13-2 0-15,18-3-6 16,0-6 9-16,9-4-3 16,4-3 0-16,-4 0 5 15,-1-1-6-15,10 2 1 16,-5 9 0-16,-13-3-4 15,8 11 8-15,-8 1-4 16,17-9 0-16,5-3 3 0,4-7-7 16,23 4 4-16,-10-4 0 15,9 7-2-15,-13-8 7 16,5 4-5-16,8 2 0 16,-9-3 6-16,-4 5-8 15,5 0 2-15,-10 5 0 16,-12 3 2-16,-9 2 4 15,8-2-3-15,5 2 1 16,-5 5-3-16,5 0 14 16,4 3-14-16,5 5 5 15,4-2-2-15,13 6-2 16,0-6 3-16,1 5-5 16,-1-10 2-16,-13 2-4 0,4-4 4 15,1-4-2-15,-14 3 0 16,4-3 8-16,19-3-8 15,-14-2 0-15,4 1 0 16,18 2 5-16,-9-1-5 16,9-3 0-16,0 3-1 15,0-7 7-15,0 0-9 16,0-7 3-16,-8-11 0 16,-1-4 2-16,9-6-2 15,0-13 0-15,0-6-1 16,0-8 6-16,0-3-6 15,0-8 1-15,0 0 0 0,26-4-4 16,14 5 6 0,4-8-2-16,35 0 5 15,22 0-1-15,44-8-1 0,44-32-3 16,26-7 0-16,36-12 0 16,4 9 0-16,-9 2 0 15,-31 8 2-15,-12 14 5 16,-36 1-9-16,-13 2 2 15,-5 5 0-15,14-12 1 16,17 2-1-16,27-9 0 16,21 1 2-16,27-1 0 15,4 12-4-15,-26 5 2 16,-4 7 0-16,-18-2-9 0,-13 4 9 16,-9-6 0-1,9 1 0-15,-9-13 4 0,22 3-4 16,-5-7 0-16,14 8 1 15,-22 3 1-15,0 4-2 16,-18 3 0-16,-9 4-1 16,-8-4 6-16,17 2-5 15,27-6 0-15,48-4 0 16,39 2 4-16,32 2-4 16,12 10 0-16,5-3-6 15,-13 8 11-15,-27 4-6 16,-26 0 1-16,-22 0 0 15,-18 0-5-15,-8-4 5 16,-5-3 0-16,5-15 5 16,8 4 2-16,9-15-7 0,9 6 0 15,0 4 7-15,5 0-4 16,-36 1-3-16,-22 4 0 16,-35 3-5-16,-44 4 11 15,-17 4-6-15,-23-4 0 16,-13 4 3-16,-26 2-1 15,-4 2-2-15,-22-4 0 16,4 7 9-16,-14 0-2 16,-8-8 2-16,0 8-2 15,0-7-5-15,0-4 33 16,0-3-21-16,0-12 1 16,0-14-2-16,0-8-7 0,0-10 7 15,-8-15-13 1,-32-15 6-16,-8-3 6 0,-1-15-12 15,-8 0 0-15,13 3 5 16,-22 4 4-16,18 8-9 16,-9-5 0-16,17 5 2 15,5 0-4-15,13-11 2 16,4 0 0-16,10-9 1 16,-1-4 9-16,0-3-10 15,-4-2 0-15,4-1 1 16,0 3-2-16,-8-6 1 15,8 11 0-15,-4 7-1 16,4 18 10-16,0 9-9 0,0 9 0 16,-8 4 1-1,-5 0-7-15,-5 1 6 0,-3-1 0 16,3-7-1-16,-21-1 11 16,13-3-10-16,4 4 0 15,5 19 2-15,-5-1-12 16,22 22 10-16,0 8 0 15,0-5 0-15,1 6 11 16,8-7-12-16,0-6 1 16,-14-2 0-16,6-2-7 15,-10 1 7-15,0 0 0 16,-12 4-4-16,12 3 17 0,-13 7-13 16,-4 4 0-1,-13 7 0-15,-9 2-13 0,-27-6 13 16,-4 5 0-16,-4 2-8 15,-14-3 17-15,-8 5-10 16,22 2 1-16,-14 1 0 16,-8 1-18-16,0 6 16 15,-27 0-62-15,-22 0-99 16,-34 0-315-16</inkml:trace>
+  <inkml:trace contextRef="#ctx0" brushRef="#br1" timeOffset="-34709.73">22959 9067 679 0,'0'0'214'0,"0"0"-10"15,0 0-51-15,0 0-44 16,0 0-1-16,0 0-61 16,0 0-9-16,44-106-7 15,-4 98-28-15,-1 8 24 16,-4 0-21-16,-4 0 2 16,-4 8 1-16,-5 21-9 15,-14 4 0-15,-8 3 0 16,0 8 14-16,0 3-14 15,-66 8 0-15,-30 4 7 0,12-12-6 16,-4-14-1 0,44-11 0-16,14-14 1 15,30-8 13-15,0 0-14 0,0 0 24 16,0 0-1-16,48 0 23 16,9-22-37-16,18-1 1 15,21 9 4-15,-3 0-2 16,12 6-6-16,1 1-6 15,-14 7 4-15,-4 0-8 16,-22 0 4-16,-31 0-14 16,-4 3-26-16,-13 13-139 15,-18-2-131-15,0-4-99 16</inkml:trace>
+  <inkml:trace contextRef="#ctx0" brushRef="#br1" timeOffset="-34197.73">23838 8767 739 0,'0'0'178'0,"0"0"-24"16,0 0-5-16,-171-220-20 16,114 192-36-16,-9 5 16 15,9 1-60-15,-9 6 7 16,9 7-14-16,-1 9-35 15,-7 0 39-15,-19 0-46 16,0 40 0-16,-12 18 6 0,-19 26 13 16,-8 16-19-16,9 16 0 15,13 5 5 1,13-4-9-16,40-4 4 0,21-3 0 16,27-8-2-16,0-7 14 15,27-4-12-15,52-7 0 16,4-14 0-16,40-7 0 15,9-24 1-15,31-20-1 16,17-19 7-16,9 0 3 16,9-30 1-16,0-21 20 15,-5-4-13-15,-34-10 30 16,-14-12-33-16,-35-8 16 16,-5-16 10-16,-39-13-36 0,-35-17 27 15,-22-15-22-15,-9-1-10 16,-88 9 0-16,-53 13 0 15,-66 38 0-15,-39 26 0 16,-22 38 0-16,22 23 0 16,39 23 0-16,45 59-71 15,38 27-2-15,32 13-88 16,26-6-256-16</inkml:trace>
+  <inkml:trace contextRef="#ctx0" brushRef="#br1" timeOffset="-77180.189">25148 10788 916 0,'0'0'173'0,"0"0"3"15,0 0-41-15,0 0-16 16,0 0-35-16,0 0-42 16,0 0 16-16,0-80-28 15,0 80-15-15,-8 0-3 0,-14 25-8 16,-5 16-4-16,-12 10 0 16,12 7 8-16,14 0-9 15,13-3 1-15,0-4 0 16,0-3-5-16,13-8 5 15,22-8 0-15,23-6 0 16,-1-7 3-16,39-12-3 16,19-3 0-16,8-4-29 15,0 0-27-15,-13 0-82 16,-31-11-69-16,-22-11-62 16,-22-1-167-16</inkml:trace>
+  <inkml:trace contextRef="#ctx0" brushRef="#br1" timeOffset="-76760.19">26115 10825 229 0,'0'0'524'15,"0"0"-366"-15,0 0-12 16,0 0-17-16,0 0-36 16,0 0-16-16,9-169-21 15,-9 166-21-15,0 3-6 16,0 0-28-16,-22 0-1 15,-4 29 0-15,-14 4 4 16,14 0-6-16,8-4 2 16,5 1 0-16,4-8-3 0,9 3 2 15,0-4 1-15,0 2 0 16,40 2 3-16,17-3-4 16,-9 0 1-16,5-4 0 15,-4 1 0-15,-1 3 2 16,-9-5-2-16,-12 2 0 15,-18-1 2-15,-1-3-4 16,-8 1 2-16,0-7 0 16,-17-1 4-16,-49-1-3 15,-18 2 7-15,-12-9-8 16,3 0 3-16,14 0-8 16,22 0-30-16,22 0-68 15,26-12-10-15,9-13-29 16,0-6-30-16,27-2-45 0,30 1-157 15</inkml:trace>
+  <inkml:trace contextRef="#ctx0" brushRef="#br1" timeOffset="-76700.19">26115 10825 363 0</inkml:trace>
+  <inkml:trace contextRef="#ctx0" brushRef="#br1" timeOffset="-76320.189">26115 10825 363 0,'264'-59'227'0,"-255"45"-84"0,-9 0-19 0,9-2 16 15,0 9-43-15,-9 3-7 16,13 4-12-16,-4 0-27 15,8 0-9-15,23-3-30 16,-5 3-10-16,31-3 1 16,22 3 0-16,-5 0-3 15,23 0 0-15,-23 0-2 0,-26 0-10 16,-17 0-49-16,-31 0-34 16,-9 0 5-16,0 0-33 15,0 0-17-15,-18 3 52 16,-48-3-31-16,9 0-134 15,0 0 61-15,0 0 192 16,17 0 33-16,23-3 147 16,8-6 17-16,0 6-80 15,9-1-10-15,0 1-5 16,-13 3-9-16,13 0-46 16,0 0-17-16,0 15-11 15,0 22 47-15,0 6-33 0,0 5-5 16,0 3-2-16,0 7-18 15,0 5-7-15,0 2 6 16,0-6-4-16,0-9-3 16,0-6 0-16,0-7-91 15,13-12-169-15,5-2-193 16</inkml:trace>
+  <inkml:trace contextRef="#ctx0" brushRef="#br1" timeOffset="-76100.19">27091 11099 645 0,'0'0'169'0,"0"0"-54"16,0 0-6-16,0 0-58 16,0 0-21-16,0 0-21 15,225-37-9-15,-138 37 4 16,28 0-3-16,-14 0-1 15,-22 0 0-15,-13 0-67 16,-40 0-160-16,-26 7-259 16</inkml:trace>
+  <inkml:trace contextRef="#ctx0" brushRef="#br1" timeOffset="-75890.189">27364 10832 244 0,'0'0'466'0,"0"0"-302"0,0 0-18 16,0 0-63-16,0 0-51 16,0 0-22-16,-18-3-9 15,36 46 10-15,13 5 7 16,-14 10-16-16,10 4 12 16,3 5-14-16,-21 6 0 15,9-4-2-15,-9-4-9 16,-9-6-134-16,0-7-265 15</inkml:trace>
+  <inkml:trace contextRef="#ctx0" brushRef="#br1" timeOffset="-75290.19">27962 11004 274 0,'0'0'482'16,"0"0"-301"-16,0 0-30 15,0 0-19-15,0 0-35 16,0 0-40-16,39-165-21 16,-39 169-36-16,0 33 0 15,0 17-2-15,0 5 10 16,0 3-3-16,0 0-3 16,0-7-1-16,0-8 7 15,0-13-8-15,0-13 0 0,0-14 1 16,0-7 2-16,0 0 6 15,0 0 7-15,0-18 57 16,0-26-36-16,0-10-23 16,18-12 6-16,-1-4 11 15,-17-3-16-15,9 0 9 16,-9 11-11-16,0 15-8 16,0 21 20-16,0 16-18 15,0 10-2-15,9 0-5 16,-9 17-8-16,22 35 6 15,-13 6 2-15,17 5 0 16,-4-6-4-16,5-5 8 16,12-9-4-16,-13-10 0 0,23-7-1 15,-10-12 1 1,5-2 0-16,5-10 2 0,8-2-3 16,0 0 7-16,0-17-6 15,-8-22 2-15,-14-13 3 16,-13-14 7-16,-14-7-6 15,-8-12-3-15,0 5 3 16,0 7-2-16,0 14-4 16,-8 19 0-16,-14 22 1 15,13 18-6-15,0 4-55 16,-17 58-56-16,26 26-26 16,-31 7-113-16,22-1-58 15,9-9-432-15</inkml:trace>
+  <inkml:trace contextRef="#ctx0" brushRef="#br1" timeOffset="-74930.19">28946 11253 336 0,'0'0'475'0,"0"0"-324"16,0 0-28-16,0 0-21 15,0 0-15-15,0 0-32 16,-48-166-21-16,30 166-19 15,-8 0-15-15,-13 15 5 16,8 27-5-16,4-3 0 16,10 4 2-16,8 2-4 15,9-17 2-15,0 2 0 0,0-15-2 16,9-5 4-16,35-10-2 16,13 0 3-16,-9 0-3 15,9-10 14-15,-8-20 5 16,-23-3 12-16,-4-7 2 15,-22-3-29-15,0-2 6 16,0 5-10-16,-31 7-7 16,-17 15-6-16,13 15-56 15,-14 3-43-15,10 3-78 16,21 34-102-16,10 8-393 16</inkml:trace>
+  <inkml:trace contextRef="#ctx0" brushRef="#br1" timeOffset="-74220.189">29448 11318 702 0,'0'0'184'0,"0"0"-23"16,0 0-58-16,0 0 25 15,0 0-65-15,-36-205-17 16,-3 179-1-16,-10 8-22 15,14 8 7-15,5 10-24 16,-6 0-3-16,-3 21-4 16,-1 27 1-16,5 4 0 0,4 6 0 15,23-7 6 1,8-4-12-16,0-10 6 0,17-8 0 16,31-14 2-16,10-12 2 15,-1-3-3-15,9 0 4 16,0-25 1-16,-9-16 4 15,-9-6 26-15,-8-11 10 16,-5-8 7-16,-4-10-22 16,-23-5-6-16,-8-4 0 15,0 1-20-15,0 19 20 16,0 11-14-16,-17 21-7 16,-5 17 18-16,22 16-22 0,0 0 0 15,0 12 0 1,0 42-2-16,-9 20 0 0,9 13 2 15,-9 1 0-15,9 0-3 16,0-15 3-16,0-8 0 16,18-9-2-16,30-16-10 15,18-15 10-15,0-11-3 16,22-14 5-16,-4 0-4 16,-1 0 7-16,-4-33-3 15,-13-3 0-15,-9-4 8 16,-22-8-6-16,-13 5-2 15,-22-5 1-15,0 11 9 16,0 9-7-16,-22 13-2 16,-4 15-1-16,-14 0-5 15,5 25 5-15,-13 33 0 0,8 5 0 16,14 3-2-16,26-4 3 16,0-4-1-16,0-10 0 15,18-5-6-15,39-13 5 16,9-9-23-16,-9-9-46 15,9-12-23-15,0 0-106 16,-27-18-21-16,-12-45-99 16</inkml:trace>
+  <inkml:trace contextRef="#ctx0" brushRef="#br1" timeOffset="-72850.19">32151 2779 717 0,'0'0'235'15,"0"0"-73"-15,0 0-54 16,0 0 9-16,0 0-53 16,0 0-38-16,0 0 28 15,-145 60-49-15,127 1 9 16,18 5 9-16,-8 7-17 15,8 0 25-15,0-12-31 16,0-9 3-16,0-12-3 16,0-17 4-16,0-11-4 0,0-12 7 15,0 0 3 1,0 0 38-16,0-16 42 0,0-25-75 16,0-13 16-16,8-8-20 15,23-16-5-15,4-13-6 16,14-10 18-16,-1-2-12 15,-13 12-6-15,-4 21 0 16,-13 26-10-16,-10 22 22 16,-8 16-12-16,0 6 0 15,9 0-7-15,4 28-4 16,5 31 11-16,21 18 0 16,-12 14-13-16,21 4 21 0,18 0-8 15,0-12 0 1,0-15 12-16,0-21-21 0,-18-22 9 15,-8-17 0-15,-5-8-11 16,-4 0 21-16,-5-41-10 16,-8-18 0-16,-5-7 19 15,-13-10-25-15,0-4 6 16,0-1 0-16,-13 15-8 16,-14 11 17-16,10 22-9 15,-14 15 0-15,5 18-7 16,4 0-9-16,-13 11-36 15,4 41-63-15,22 17 16 16,9 12-103-16,0-4-33 16,0-8-115-16</inkml:trace>
+  <inkml:trace contextRef="#ctx0" brushRef="#br1" timeOffset="-72480.189">33096 3117 566 0,'0'0'192'15,"0"0"-28"-15,0 0-45 16,0 0-28-16,0 0-11 16,0 0-39-16,31-114 15 15,-31 114-56-15,0 0 6 16,0 0-16-16,0 15 15 16,0 10-5-16,0 4 0 15,0 0 5-15,0-3-14 0,0-3 9 16,26-9 0-1,-4-8-5-15,5-6 17 0,12 0-12 16,-30 0 9-16,9-10-4 16,-1-20 44-16,5-3-26 15,-22-5-11-15,0 0 17 16,0 5-14-16,-9 8-15 16,-21 6 0-16,12 8 8 15,-13 11-25-15,14 0-15 16,-10 0-64-16,5 11-3 15,5 26-62-15,17 3-53 16,0 0-154-16</inkml:trace>
+  <inkml:trace contextRef="#ctx0" brushRef="#br1" timeOffset="-72420.189">33096 3117 551 0</inkml:trace>
+  <inkml:trace contextRef="#ctx0" brushRef="#br1" timeOffset="-71840.189">33096 3117 551 0,'361'17'190'0,"-361"-39"-71"0,0-3-9 0,0 2-35 15,0 2-19-15,0 2-2 16,-18 5-16-16,9 3 15 16,-13 3-48-16,13 8-4 15,1 0-1-15,-1 0 2 16,0 12-2-16,0 16 0 16,9 0 5-16,0-8-17 15,0 2 12-15,0-11 0 16,0 1-12-16,18-9 4 0,-1-3 8 15,23 0 0-15,-14 0 11 16,5-18-6-16,-22-12-5 16,0-3 0-16,-9-3 23 15,0-4-14-15,0 0 8 16,0-1 5-16,0 9-9 16,-9-1 33-16,0 7-34 15,0 11-1-15,9 11-4 16,-22 1 11-16,22 3-18 15,0 0 0-15,-8 11-4 16,-1 29-11-16,9 4 15 16,0 7 0-16,0 0-8 15,9-3 7-15,30-8-6 0,-4-7-12 16,5-8-23-16,8-10 39 16,1-8-18-16,-23-7 21 15,14 0-11-15,-14 0 22 16,5-4-11-16,-23-21 0 15,1-5 10-15,-9-3 16 16,0 2-24-16,0 1 11 16,0 5 9-16,0 10-10 15,-9 7 0-15,1 8-12 16,8 0-2-16,-22 10-5 16,22 28-3-16,0 5 10 15,0 2-4-15,0-2 19 0,22 2-15 16,22-9 0-16,-5 5-37 15,10-12 33-15,-1-4-74 16,-22-4-94-16,-8-9-56 16,-5-8-274-16</inkml:trace>
+  <inkml:trace contextRef="#ctx0" brushRef="#br1" timeOffset="-70160.189">32177 3979 116 0,'0'0'662'15,"0"0"-540"-15,0 0 9 16,0 0-65-16,0 0 17 0,0 0-43 15,-149-146-3-15,101 146-16 16,8 0-10-16,-4 7-5 16,-13 29-6-16,17 12 0 15,1 3-7-15,12 4 9 16,27-4-2-16,0-7 0 16,0-11 10-16,0-8-11 15,18-10 1-15,22-7 0 16,8-8-10-16,-4 0 17 15,13 0-7-15,0-33 3 16,-8-8 11-16,-10-6-6 16,-21-8 11-16,-10-4 17 15,1-6 23-15,-9-1-52 0,0 11 19 16,0 8-16-16,0 17 3 16,-17 16-9-16,-23 9-4 15,5 5 0-15,-5 0-15 16,1 38 12-16,4 12 3 15,4 16 0-15,5 4 9 16,17-4-18-16,9-5 9 16,0-9 0-16,0-12-11 15,17-11 13-15,23-7-2 16,-5-14 0-16,-4-5 8 16,17-3-7-16,-4 0-1 15,4 0 0-15,1-18 3 0,-1-8 7 16,-21 4-10-16,3 0 0 15,-3 1 10-15,-19 2-10 16,14 8 0-16,-13 9 0 16,-9 2-8-16,9 0 5 15,0 0-3-15,0 13 1 16,-1 13 7-16,-8 0-15 16,9 0 13-16,-9-5 0 15,13-7-6-15,-13-2 16 16,9-9-10-16,-9-3 0 15,9 0 8-15,0 0-11 16,8 0 3-16,-3 0 0 16,12-3 1-16,13-15 11 0,-12-5-12 15,4 5 0 1,-5-1 10-16,-17 9-18 0,-9 7 8 16,9 3 0-16,13 0-10 15,-22 0-5-15,0 6 15 16,8 24 0-16,10-5 1 15,-9 0-20-15,13-2 19 16,-5-8-13-16,10-8 4 16,-5-3-17-16,13-4 26 15,4 0 0-15,1-8 9 16,-5-25-11-16,5-7 6 16,-14-3-4-16,5-9 46 0,-14-3-46 15,-17-3 33 1,0 6-10-16,0 5-20 0,-8 10 26 15,-32 15-29-15,14 11 0 16,17 11-3-16,-39 0-3 16,17 20 6-16,13 30 0 15,1 9 8-15,8 6-18 16,9-3 10-16,0-3 0 16,0-7-9-16,26-13-28 15,14-13 14-15,-5-8-5 16,13-7-23-16,-8-7 50 15,17-4-29-15,-39 0 30 16,8 0-13-16,5-18 24 16,-5 3-11-16,5-3 0 15,-14 3 7-15,14 6-16 0,-31 3 9 16,9 3 0-16,-9 3-8 16,18 0 8-16,-10 0 0 15,1 0 0-15,22 0 1 16,-5 0-11-16,23 0 10 15,8 0 0-15,26 0 1 16,14 0 12-16,9-14-13 16,-14-5 23-16,-4 0-19 15,-31 1 66-15,-31 0-38 16,-8-4 14-16,-18 7 25 16,0 2-60-16,0 0 18 15,0 6-29-15,0 7 20 0,-18 0-41 16,-8 22 16-16,-22 29 5 15,-18 22-11-15,8 12 26 16,1 10-15-16,0 28 0 16,40 32 7-16,-5 20-13 15,22 15 6-15,22-7 0 16,35-26-3-16,9-18 20 16,-31-26-17-16,-13-28 0 15,-13-27 6-15,-9-22-13 16,0-24 7-16,0-12 0 15,-88 0 27-15,-35-41-13 16,-58-14 11-16,-34-10-25 16,4-8 11-16,22-5-14 0,31 9 3 15,61 7 0-15,40 0-10 16,39 3-23-16,18 1-19 16,49 3-93-16,74 8-144 15,35 2-137-15</inkml:trace>
+  <inkml:trace contextRef="#ctx0" brushRef="#br2" timeOffset="-67500.19">3257 11482 734 0,'0'0'259'0,"0"0"-112"0,0 0-9 16,0 0-3-16,0 0-40 15,0 0 6-15,0 0-49 16,39-102-8-16,-39 95 6 15,0 3-46-15,0 0 26 16,0 1-20-16,0 3 4 16,0 0-13-16,0 0-1 15,0 0 0-15,0 3-12 16,0 19 25-16,0 8-14 16,9-5 1-16,17 8 0 15,23 3-8-15,8-3 8 0,9 4 0 16,0-10-5-16,-9-3 18 15,-9-2-13-15,-12 1 0 16,-6-5 6-16,-12-4-13 16,-9 0 7-16,-9-2 0 15,0-5-5-15,0 1 2 16,-44-5-1-16,-35 4 4 16,4-7-46-16,-9 0-5 15,5 0-58-15,13 0-42 16,31-28-22-16,26-14-53 15,9-12 45-15,0-11-516 16</inkml:trace>
+  <inkml:trace contextRef="#ctx0" brushRef="#br2" timeOffset="-67440.189">3257 11482 574 0</inkml:trace>
+  <inkml:trace contextRef="#ctx0" brushRef="#br2" timeOffset="-67320.19">3257 11482 574 0,'140'-266'174'0,"-140"255"-16"15,0 4-36-15,0-1-51 0,22 4 21 16,-4 4-55-16,30 0-6 15,10 0-11-15,25 0-18 16,14 0 16-16,4 0-18 16,-13 12 0-16,-14 9-1 15,-8 9-114-15,-17-1-136 16,8 0-284-16</inkml:trace>
+  <inkml:trace contextRef="#ctx0" brushRef="#br2" timeOffset="-66940.189">4536 11365 806 0,'0'0'167'15,"0"0"-35"-15,0 0-34 16,0 0-20-16,0 0-8 16,0 0-67-16,-97-47 0 15,62 69-3-15,4 15 12 16,23-1-12-16,8 9 0 15,0 2 0-15,0 0 0 16,30-7 4-16,14-7-4 16,27-11 0-16,-5-11 13 15,8-11-8-15,-8 0-4 0,0 0 1 16,-9-26 37-16,-8-14 0 16,-23-3 13-16,-26-8 23 15,0-1-61-15,0 4 15 16,-57 4-29-16,-18 16 10 15,-22 9-23-15,14 11 13 16,-1 8-5-16,27 0-24 16,26 30-108-16,14 14 4 15,17 0-106-15,0 4-168 16</inkml:trace>
+  <inkml:trace contextRef="#ctx0" brushRef="#br2" timeOffset="-66600.19">5314 11508 678 0,'0'0'183'16,"0"0"-31"-16,0 0-65 0,0 0-25 16,0 0-17-16,0 0-40 15,-57-37 16-15,39 37-21 16,18 27 1-16,0 1-4 15,0-5 9-15,9-6-6 16,35-2 2-16,13-15 4 16,22 0 16-16,-22 0-9 0,-4 0 5 15,-13 0 31 1,-9-32-21-16,-5 2 32 0,-26-3-2 16,0-4-37-16,0 5 27 15,-9 2-40-15,-48 8 0 16,-9 15-8-16,-9 7 0 15,-4 0-3-15,-4 4-13 16,8 32-166-16,-4 8-64 16,4 12-332-16</inkml:trace>
+  <inkml:trace contextRef="#ctx0" brushRef="#br2" timeOffset="-66110.189">3797 11972 775 0,'0'0'245'0,"0"0"-102"16,0 0 16-16,0 0-37 0,0 0-70 16,0 0-8-1,0-29-44-15,0 29 2 0,-17 26 21 16,-40 10-7-16,-22 8 39 16,-5 0-25-16,-21 7-18 15,3 4 24-15,6-4-34 16,12 0 12-16,5-11-4 15,22-7 1-15,31-14 2 16,8-8-13-16,5-8 3 16,13-3 7-16,0 0-3 15,0 0-2-15,0 0 20 16,0 0-18-16,0 0 17 16,0 0-24-16,0 0 4 15,0 0-11-15,0 0 5 0,0 0-34 16,0 0-35-16,0 13-108 15,0 3-44-15,13 10-131 16,-13-1-400-16</inkml:trace>
+  <inkml:trace contextRef="#ctx0" brushRef="#br2" timeOffset="-65860.19">1626 12835 651 0,'0'0'203'0,"0"0"-66"0,0 0 16 16,0 0-41-16,0 0-69 16,0 0-3-16,75 0-25 15,-27 0 23-15,-8 0-24 16,8 0-7-16,9 0-10 15,-4 0 3-15,-5 0-105 16,0 7-198-16,-8 11-399 16</inkml:trace>
+  <inkml:trace contextRef="#ctx0" brushRef="#br2" timeOffset="-65500.19">2470 12736 800 0,'0'0'138'16,"0"0"-35"-16,0 0-23 15,0 0-10-15,0 0-39 16,0 0 3-16,286-22 6 16,-260 30-30-16,5 10 16 15,-5 7-15-15,-17 12-10 16,-9-4 11-16,0 7-12 15,-18-4 0-15,-30 4 6 16,0-2 4-16,4-10-10 16,22-9 0-16,13-8 1 15,9-4-5-15,0-7 4 0,0 0 0 16,0 0 23-16,57 0-23 16,18 3 44-16,22-3-12 15,26 0-29-15,8 0-4 16,10 0 1-16,13 0-127 15,9 0-121-15,17-3-438 16</inkml:trace>
+  <inkml:trace contextRef="#ctx0" brushRef="#br2" timeOffset="-64830.19">5464 11907 730 0,'0'0'207'0,"0"0"-68"16,0 0 6-16,0 0-28 16,0 0-45-16,0 0 18 15,-190-74-58-15,190 74-12 16,18 33-1-16,61 15-6 0,14 17 32 15,38 12-11-15,23 8-17 16,-4 3 17-16,12 6-29 16,-8-6 3-16,4-7-4 15,14-13 11-15,-9-5-12 16,-5-23-3-16,-13-7 1 16,-35-11 5-16,-31-8 1 15,-31-10-7-15,-30 0 0 16,-9-4 12-16,-9 0-9 15,0 0-3-15,0 0-3 16,-9 0-1-16,-48 7-70 16,-9 15-49-16,0 11-119 15,9 3-130-15,8 4-371 0</inkml:trace>
+  <inkml:trace contextRef="#ctx0" brushRef="#br2" timeOffset="-64550.19">6945 12901 880 0,'0'0'207'16,"0"0"-55"-16,0 0-6 16,0 0-38-16,0 0-38 15,0 0-11-15,-57-99-44 0,57 99 9 16,0 0-24-1,-13 0-1-15,4 33-9 0,9 14 15 16,0 12-5-16,0-1 0 16,0 7-8-16,0-2 3 15,0 3-94-15,0-11-126 16,31-4-114-16,-5-18-578 16</inkml:trace>
+  <inkml:trace contextRef="#ctx0" brushRef="#br2" timeOffset="-64220.189">7292 12996 873 0,'0'0'155'0,"0"0"-67"0,0 0 6 16,0 0-27-16,0 0-65 15,0 0 1-15,-9-23-3 16,9 53 0-16,0 3 0 15,0 0 5-15,49-3-5 16,-1-9 0-16,-4-14 8 16,26-7-6-16,-26 0 1 15,5-4 9-15,-10-24 62 16,-21-10 2-16,-9-2 14 16,-9-6-9-16,0 1-58 0,-9 5 12 15,-31 12-32 1,5 8 2-16,-4 17-10 0,3 3-1 15,-3 0 2-15,-18 33-32 16,17 16-138-16,5 5-45 16,13 11-157-16</inkml:trace>
+  <inkml:trace contextRef="#ctx0" brushRef="#br2" timeOffset="-63900.19">7283 13566 918 0,'0'0'123'0,"0"0"24"0,0 0-17 15,0 0-47-15,0 0-37 16,0 0-28-16,-17-15 5 15,100 15-2-15,23 23 34 16,26 2 5-16,8 0-41 16,5 1-8-16,-21-1 1 15,-19 5-9-15,-30-5-3 16,-27-7 0-16,-21 8-12 16,-27 4-33-16,0-5-135 15,0 8-88-15,-58 4-148 0</inkml:trace>
+  <inkml:trace contextRef="#ctx0" brushRef="#br2" timeOffset="-63630.19">8325 13829 915 0,'0'0'213'15,"0"0"-47"-15,0 0-28 16,0 0-16-16,0 0-73 16,0 0-21-16,22-36-23 0,-22 54-1 15,18 23-4 1,-1 9 0-16,14-2 8 0,-4 4-6 16,-10-6-2-16,14-5 0 15,-22-9 6-15,-9-2-13 16,0-4-70-16,8-8-158 15,14-11-149-15</inkml:trace>
+  <inkml:trace contextRef="#ctx0" brushRef="#br2" timeOffset="-63280.189">8923 13859 877 0,'0'0'219'0,"0"0"-91"15,0 0-5-15,0 0-12 16,0 0-32-16,0 0-53 16,0-40 8-16,0 40-30 15,0 0 6-15,9 7-17 16,13 19 10-16,4 6-3 16,1 1 2-16,12 3 11 15,1-3-13-15,-5-4 0 16,-13-3 3-16,4-1-9 15,5-2 8-15,-22-9-2 16,0 4 0-16,-9-7 6 16,0 4-9-16,0 0 3 15,0-8-6-15,-49 1 3 0,-17 2-51 16,0-2-116-16,0-8-33 16,1 0-78-16,16 0-181 15</inkml:trace>
+  <inkml:trace contextRef="#ctx0" brushRef="#br2" timeOffset="-63150.19">8866 13911 638 0,'0'0'196'0,"0"0"-40"15,0 0-9-15,0 0-47 16,0 0-22-16,277-191-65 16,-194 187-5-16,14 4-13 15,-22 0 5-15,-9 0-100 0,-40 22-204 16</inkml:trace>
+  <inkml:trace contextRef="#ctx0" brushRef="#br1" timeOffset="-59380.189">8897 11460 492 0,'0'0'150'16,"0"0"-105"-16,0 0 8 0,0 0 0 16,0 0-13-16,0 0 46 15,0 0-16-15,74-69 10 16,-74 58-13-16,0-4-30 16,0 1 23-16,-8-5-15 15,-32 1-25-15,-8 0 23 16,-27-4-30-16,-22 4 10 15,-13 0 13-15,-43 3-33 16,-19 0 18-16,-8 5-16 16,-9-2 1-16,0 6-2 15,9-2 1-15,-9 1-5 16,-9-8 0-16,-13 4 13 16,-5 0-13-16,-12 3 0 0,21 5 0 15,-13-1-13 1,14 4 15-16,-5 0-2 0,13 0 0 15,9 0 9-15,17 0-11 16,10 0 2-16,12 0 0 16,18-6-5-16,9-6 5 15,0 1 0-15,-13 3-3 16,-5 1 16-16,1 7-15 16,-23 0 2-16,22 0 0 15,-4 0-7-15,22 0 7 16,13 0 0-16,5 0-1 15,8 0 11-15,5 0-11 16,4 0 1-16,13 0 0 16,0 0-8-16,9 0 8 0,9-3 0 15,-9-8 0-15,18 3 15 16,-9-2-18-16,17 6 3 16,5 0 0-16,-4 1-11 15,3 3 11-15,6 0 0 16,-10 0-1-16,-4 0 7 15,5 0-8-15,-1 0 2 16,14 0 0-16,-5 0-8 16,13 3 8-16,1 5 0 15,-14 7-1-15,-4 9 5 0,-14 17-8 16,-8 9 4 0,9 2 0-16,4 7-7 0,-4-1 7 15,8 4 0-15,0 5-2 16,14-2 13-16,0 4-15 15,4-4 4-15,4 6 0 16,1-2-9-16,-5 8 10 16,13-1-1-16,9 5 0 15,0 0 11-15,-9 2-12 16,9 2 1-16,-9 6 0 16,9 7 14-16,-9-14-7 15,1 4 0-15,-14-7 7 16,22-1-5-16,0-3 19 15,0 0-22-15,0-8-1 16,22 4 16-16,4-3-13 0,-8 6-8 16,12 12 4-16,-21 0 8 15,-9 7-5-15,0 7-7 16,0-3 1-16,0-3 4 16,0-4-5-16,0-10 0 15,0-1 0-15,0-1 17 16,0 4-12-16,0 1-3 15,0 0 1-15,9-6 12 16,0 2-10-16,13-13-5 16,-5-5 2-16,1-7 11 15,13-6-8-15,-14-2-5 16,23-1 0-16,-14-3 0 16,5-4 4-16,-5-7-4 0,1-15 0 15,3 4 6-15,10-4-6 16,4-3 0-16,13 3 2 15,9-3 3-15,31-15 4 16,17 0-9-16,44 0 8 16,23 0 1-16,38 0-3 15,-12-11-6-15,22-4 0 16,-1-3-3-16,1 7 4 16,-14 8-1-16,14 3 0 15,-23-8 9-15,-3 8-12 16,-6-7 3-16,-8 7 0 15,0 0 1-15,9 0 1 0,22 0-2 16,9 0 0 0,-5 0 14-16,13 0-9 0,9 0-5 15,1 0 1-15,12-8-1 16,-22 5 0-16,-30 3 0 16,-9 0-2-16,-1 0 6 15,14-7-6-15,27-1 2 16,17 1 0-16,9-11-5 15,-5 3 7-15,-13 0-2 16,-39 5 0-16,-27-5 9 16,-48 0-9-16,-18 8 0 15,-39-4 0-15,-27 5 0 16,-8 1 2-16,-14 1-2 16,-8 1 0-16,13 3 5 0,-14-4-5 15,-8 0 0-15,4 4 0 16,-13-7-3-1,0 7 7-15,0 0-4 0,9 0 0 16,-9-8 11-16,17 1-10 16,14-8-1-16,-4 5 0 15,12-12-4-15,-12-4 11 16,3-7-7-16,5-10 5 16,-17-5 0-16,13-7 6 15,-31-14-2-15,0-9 1 16,0-13 4-16,0-14-8 0,-31-9-4 15,-4 1-2 1,-5-4 3-16,23 7-6 0,-14-3 3 16,22 8 0-1,0-5-2-15,1-1 11 0,8 2-9 16,-9 3 4-16,0 0-2 16,-13-4 16-16,13 1-18 15,0-4 0-15,9 3 1 16,-8 4 5-16,-1 14-6 15,0 12 0-15,-4 11 6 16,4 6-11-16,0 2 5 16,1-2 0-16,-10-1-4 15,5-4 10-15,-5 6-6 16,1 1 0-16,17 6 4 16,-9 7-5-16,0 0 1 0,-4 8 0 15,4-8-7-15,0-2 17 16,-8-2-10-16,-5-2 0 15,13 3 2-15,-9 3-6 16,1 0 4-16,-14 8 0 16,-4 1-8-16,-5 4 19 15,1 12-12-15,-5 7 1 16,-27 16-12-16,-21 0 3 16,-49 0 2-16,-61 33 4 15,-13 8-3-15,4-2-47 16,39 1-19-16,49-7-101 15,57-15-281-15</inkml:trace>
+  <inkml:trace contextRef="#ctx0" brushRef="#br1" timeOffset="-51780.189">3674 15075 597 0,'0'0'281'0,"0"0"-155"16,0 0-3-16,0 0 18 16,0 0-52-16,0 0-22 15,-48 0-5-15,48 0 12 16,0 0-31-16,0 0-9 15,0 0 16-15,0 0-29 16,0 0 6-16,0 0-15 16,0 0-5-16,0 0-2 0,0 0-5 15,0 0 0-15,-9 0-7 16,-22 0-30-16,14 15-66 16,8 25-110-16,9 1-104 15,0 9-180-15</inkml:trace>
+  <inkml:trace contextRef="#ctx0" brushRef="#br1" timeOffset="-51090.19">3437 15375 863 0,'0'0'210'0,"0"0"-88"0,0 0 29 16,0 0-38-16,0 0-34 15,0 0-14-15,-132-55-38 16,132 55-2-16,0 0 0 16,0 0-21-16,0 0 11 15,0 12-12-15,0 31 6 16,0 8 29-16,0 4-28 15,0-7 1-15,0 3-4 16,0-4-3-16,0-6 3 0,0-16-7 16,0-7 0-16,0-6-2 15,0-9 6-15,0-3-4 16,0 0 9-16,0 0-9 16,0 0 25-16,0-26 16 15,-9-21-35-15,-4-4-6 16,13-12-4-16,0-6 4 15,0 7-1-15,22-3 6 16,4 13-10-16,5 15 5 16,-4 19-8-16,3 3 6 15,-3 15-8-15,4 0 10 16,4 8-1-16,-18 22-14 0,14 2 11 16,-22 1 1-1,-9 7-5-15,0 4 7 0,0-4-14 16,-40 0 15-16,5 1 0 15,-4-16-13-15,21-7 9 16,-13-3 1-16,22-8 3 16,1 1-6-16,8-5 6 15,0 1-2-15,0-1 1 16,0 5-8-16,30-1 5 16,28 1-3-16,16-1 7 15,1-7 0-15,9 0 2 16,-5 0-2-16,-5 0 0 15,-8 0-3-15,-17 0 1 16,-14 0-121-16,-22 6-87 16,-4 6-85-16,-9 3-102 0</inkml:trace>
+  <inkml:trace contextRef="#ctx0" brushRef="#br1" timeOffset="-50670.19">4215 15426 581 0,'0'0'280'16,"0"0"-85"-16,0 0-62 16,0 0-28-16,0 0-26 15,0 0-15-15,0-167 12 16,0 167-2-16,0-5-29 16,-22 5-19-16,-4 0-22 0,-5 0-3 15,13 0-1-15,-8 0 0 16,-5 21-1-16,22 6-7 15,9-5 9-15,0 7-1 16,0 1 0-16,0-11-4 16,31 5 3-16,4-2 1 15,14-7 0-15,8 3-2 16,0-3 5-16,-9-8-3 16,-12 4 0-16,-6 4 2 15,-12-8-4-15,-1 4 2 16,-17 4 0-16,0-8 0 15,0-4 0-15,0 5 0 16,0 6-2-16,-17-3-2 0,-31 11 4 16,-10-4 3-16,-8 5-3 15,18-5-20-15,4 4-96 16,22-14-89-16,22-1-81 16,0-7-213-16</inkml:trace>
+  <inkml:trace contextRef="#ctx0" brushRef="#br1" timeOffset="-50220.189">4699 15402 382 0,'0'0'224'0,"0"0"-94"16,0 0-6-1,0 0-16-15,0 0-36 0,0 0-13 16,-181-9-13-16,181 6 6 15,0 3-7-15,36-7-25 16,43-1-5-16,4 0-2 16,1-2 8-16,4 3 6 15,-22 0-21-15,-9-1 2 16,-22 0 1-16,-13 8-7 16,-13-3 3-16,-9 3-1 15,0 0-4-15,0 0-1 16,-31 0-28-16,5 0 20 15,-5 0-8-15,13 0-10 0,9 3 21 16,-8 5 1 0,8 0 5-16,9-1-4 0,-13 7 7 15,4 5-3-15,9 0 13 16,-9 5 0-16,0 6 14 16,9 2-10-16,0-6-9 15,0 4 8-15,0-2-14 16,0 9 0-16,0-4-2 15,0-7 7-15,0 6-14 16,0-9-30-16,0 3-215 16,0-3-224-16</inkml:trace>
+  <inkml:trace contextRef="#ctx0" brushRef="#br1" timeOffset="-49970.19">5349 15635 851 0,'0'0'144'16,"0"0"-18"-16,0 0-55 16,0 0-36-16,0 0-14 15,0 0-14-15,97-26 10 16,-49 19-10-16,-4 7-2 15,13 0-3-15,-8-8-2 16,-10 8-18-16,-12 0-74 0,-5 0-100 16,-22 0-78-16</inkml:trace>
+  <inkml:trace contextRef="#ctx0" brushRef="#br1" timeOffset="-49740.189">5349 15635 700 0,'97'-147'203'16,"-115"133"-20"-16,18 3-72 16,-13 4-1-16,13 7-37 15,0 0-35-15,0 0-14 16,0 0-24-16,0 7 0 16,31 26 0-16,-13 0 3 0,12 7-3 15,-3 0 0-15,-19-1 0 16,1-1-9-16,4 2-139 15,-4-10-82-15,0-2-340 16</inkml:trace>
+  <inkml:trace contextRef="#ctx0" brushRef="#br1" timeOffset="-49160.19">5978 15503 802 0,'0'0'210'16,"0"0"-72"-16,0 0 2 16,0 0-46-16,0 0-63 0,0 0-21 15,0-40-10-15,0 58 0 16,9 15-1-16,-9 0 7 16,8-4-6-16,1 0 0 15,0-7 3-15,0-4-5 16,4-3 2-16,-13-15 0 15,9 0 6-15,0 0-6 16,-9 0 20-16,0-18 73 16,0-19-66-16,0-6 15 15,0-5-1-15,0-3-14 16,0-10 13-16,0 2-28 16,0 11 1-16,0 15-4 15,0 18-5-15,0 12 4 0,0 3-8 16,0 0-3-16,0 18-1 15,8 30-6-15,32-1 10 16,-14 11 0-16,14-7-6 16,-5-3-1-16,5 0-13 15,-1-16-10-15,5-9 26 16,4-13-13-16,1-10 17 16,-1 0-2-16,-13 0 5 15,5-33 4-15,-23-14-4 16,5-4 16-16,-22 3 28 15,0-7-31-15,0 12 7 16,0-5-7-16,-39 21-16 0,-1 4 0 16,-4 15-1-1,5 8-7-15,12 0-16 0,-3 15-62 16,30 36-25-16,0-4-58 16,0 11-89-16,30-10-19 15,6-5-301-15</inkml:trace>
+  <inkml:trace contextRef="#ctx0" brushRef="#br1" timeOffset="-48810.189">6708 15529 632 0,'0'0'239'16,"0"0"-50"-16,0 0-39 16,0 0-29-16,0 0-25 0,0 0-42 15,8-63-16-15,-8 63-20 16,0 0-18-16,0 0-10 15,0 15 3-15,0 18 7 16,0-3-5-16,9-2 1 16,9 2-16-16,21-5 2 15,1-10-18-15,-5-12 11 16,13-3 24-16,-8 0 1 16,-14 0 1-16,1-3 0 15,-14-22 15-15,-13-5 41 16,0-3-18-16,0 0-6 15,-40 0-7-15,-8 8-25 16,-18 0 6-16,9 13-7 0,0 12-8 16,22 0-19-16,4 4-113 15,31 36-68-15,0 4-73 16,0 4-346-16</inkml:trace>
+  <inkml:trace contextRef="#ctx0" brushRef="#br1" timeOffset="-48140.189">7437 15620 831 0,'0'0'227'16,"0"0"-71"-16,0 0 6 16,0 0-52-16,0 0-42 0,0 0-6 15,-202-164-35-15,176 164-2 16,17 0-19-16,0 0-4 15,9 0-4-15,-13 32-2 16,13 1 4-16,0 0 0 16,0 7-12-16,13-7 4 15,22-7-1-15,14-4-22 16,-10-11 25-16,5-4-6 16,-4-7 1-16,-1 0 11 15,-12-7 0-15,-19-19 6 16,14-14 3-16,-22-8 22 15,9-3 12-15,-9-7-22 16,0-12-2-16,0 9 12 0,-9 9-15 16,-21 19 5-1,3 15-7-15,5 10-8 0,22 8 1 16,-17 0-7-16,17 15 0 16,-9 24-8-16,9 21 11 15,0 7-8-15,17 1 4 16,41 1-11-16,8 1 10 15,-9-4-25-15,9-15-3 16,0-5 4-16,-9-22-10 16,9-6 17-16,-18-18 3 15,0 0 16-15,1 0-2 16,-23-33 5-16,-8-7-3 0,4-8 24 16,-22-3-8-16,0 3 13 15,0 8-10-15,-31 0-4 16,5 14 17-16,-5 12-32 15,13 6 11-15,18 8-11 16,-9 0 0-16,9 22-2 16,0 19 2-16,0-1 0 15,0 0-6-15,27-7 3 16,12 0-2-16,27-15-11 16,9-3-39-16,13-15-22 15,26 0-115-15,-4 0-38 16,-13 0-98-16</inkml:trace>
+  <inkml:trace contextRef="#ctx0" brushRef="#br1" timeOffset="-47090.19">10840 11841 662 0,'0'0'221'0,"0"0"-71"16,0 0-31-16,0 0-25 15,0 0-41-15,0 0-20 16,110-66-17-16,-31 59-2 16,4 3 21-16,-8 4-26 15,-9 0 11-15,-27 0-6 16,-12 0-6-16,-14 0-2 15,-13 0-6-15,0 7 0 0,-13 18 0 16,-53 12 12-16,-9 4-2 16,0-1-10-16,1-4 8 15,17-7-11-15,17-3 3 16,22-8 0-16,-4-10 0 16,22-1 2-16,0-7-2 15,0 8 0-15,0-8 2 16,49 3-2-16,26 8 1 15,4-3-1-15,13 5 7 16,-13 7-5-16,13 1-2 16,-26 8 0-16,0 1 2 15,-9 6-6-15,-26-3 4 16,-13-3 0-16,-18-2-3 16,0-8 5-16,-27-3-2 0,-52-6 9 15,-13 4-5-15,-22-15-8 16,-1 0-27-16,10 0-36 15,30 0-27-15,27 0-31 16,21-26 2-16,27-11-77 16,0-10-45-16,27-18-342 15</inkml:trace>
+  <inkml:trace contextRef="#ctx0" brushRef="#br1" timeOffset="-46610.19">11521 11428 534 0,'0'0'266'0,"0"0"-64"16,0 0-81-16,0 0 26 0,0 0-33 15,0 0-19-15,-352-135-26 16,278 146-47-16,-23 36-5 16,22 15 9-16,18 11-13 15,-9 12 19-15,0 8-21 16,18 14-7-16,8 10 1 15,14 11 2-15,26 4-7 16,0 3 0-16,9-4 5 16,57 5 0-16,30-15-5 15,19-20 0-15,17-20-5 16,8-26 9-16,14-37-4 0,-13-18 0 16,-18 0 5-1,0-18 3-15,-18-44 25 0,-21-15 21 16,4-18 3-16,-22-14-24 15,-9-12 7-15,-40-18 6 16,1-15-27-16,-18-7 8 16,0-10-20-16,-75-7-5 15,-30 8 6-15,-45 25-3 16,-39 31-5-16,-39 46 0 16,-10 35-2-16,19 33-9 15,52 0 6-15,30 50-12 16,36 34-11-16,35 22-49 15,9 18-1-15,26 9-55 0,31-3-168 16,-8-2-336 0</inkml:trace>
+  <inkml:trace contextRef="#ctx0" brushRef="#br1" timeOffset="-41400.19">11851 1512 677 0,'0'0'235'0,"0"0"-117"0,0 0-51 16,0 0-45-16,-304-187 64 15,190 150-24-15,-18 4-52 16,-17-7 52-16,-14 0-54 16,-35-4 14-16,-21 4 7 15,-36 7-5-15,-22 8-15 16,-35 2-9-16,-9 10 13 15,0 8-15-15,-22 5 2 16,4 0 0-16,-4 0-1 16,23 22 29-16,16 11-28 15,27 4 0-15,22-5 9 16,27 5-28-16,30 0 19 0,18 10 0 16,17 8-4-1,-26 14 26-15,-9 19-22 0,-22 11 0 16,-4 10 0-16,-4 8-19 15,-10 0 19-15,-8 1 0 16,-9-9-1-16,0-6 25 16,5-9-27-16,25-9 3 15,36-9 0-15,36-10-11 16,38-4 13-16,14-7-2 16,4-3 0-16,23-5 16 15,-14 1-21-15,13 3 5 16,-8 4 0-16,-5 10-13 15,-5 1 13-15,-3 3 0 16,12-8 0-16,9-1 16 16,5-9-19-16,13-3 3 0,13-8 0 15,4-3-18-15,1-9 26 16,12-5-8-16,1 2 0 16,-5 5 14-16,-8 6-20 15,-5 8 6-15,-22 10 0 16,-5 9-14-16,-3-1 21 15,-1 7-7-15,-9-3 0 16,5 0 16-16,13-4-23 16,9-7 7-16,13-8 0 15,5 5-10-15,-1-5 16 16,5 4-6-16,-5 4 0 16,1 7 15-16,-18 8-19 0,22 14 4 15,-23 11 0-15,1 11 0 16,0 7 17-16,0 1-17 15,9-8 8-15,12-15 9 16,-3-8-4-16,13-9-13 16,4-1 0-16,4-3 6 15,0-1 8-15,-4 4-14 16,5 7 0-16,-1 8 10 16,-4-4-15-16,5 1 5 15,8-6 0-15,0-6-3 16,0 1 12-16,1-5-9 15,-6-5 0-15,14-8 14 16,-8-4-24-16,8-13 10 0,-9-1 0 16,9-5-6-16,0 7 14 15,-9 0-8-15,9 7 0 16,-9 5 9-16,0-1-17 16,-4 0 8-16,4 0 0 15,1 4-8-15,8 3 21 16,-9 2-13-16,0-2 0 15,0 0 6-15,0-3-11 16,9-1 5-16,-13 1 0 16,13 4-9-16,-17-7 23 15,17 2-14-15,-9-2 0 16,0-1 4-16,0-1-13 0,-4 1 9 16,4 10 0-16,1 3-8 15,8 9 20-15,-18 1-12 16,9-1 0-16,-4-4 4 15,4-7-10-15,0-7 6 16,9-1 0-16,-8-2-10 16,8 2 27-16,0 1-17 15,0-3 0-15,0 2 3 16,0 1-12-16,0 8 9 16,0 3 0-16,0 7-5 15,-9 3 19-15,9 5-14 16,-9-5 0-16,0-10 3 15,9-7-12-15,0-7 9 0,0-10 0 16,0 3-5 0,0-2 17-16,0-3-12 0,0 5 0 15,0 6 2-15,0 3-12 16,0 5 10-16,0 7 0 16,0-12-4-16,9-2 17 15,9-9-17-15,-1-6 4 16,14-1 0-16,-5-6-13 15,5 3 13-15,4 0 0 16,-4 3-2-16,-5 0 17 16,5 5-15-16,-4 0 0 15,-5-1 1-15,4-3-9 16,0-1 8-16,14-11 0 0,-1 1-3 16,19-4 16-16,-1-4-13 15,17-3 0-15,1-5 0 16,9-6-2-16,4 0 2 15,4-1 0-15,-4 1 0 16,-13 4 15-16,-1-5-19 16,-8 4 4-16,22-4 0 15,18-3-5-15,17 0 5 16,26 0 0-16,5 0 0 16,22-6 14-16,-5 2-14 15,-8 4 0-15,0 0 1 16,-40 0-13-16,0 0 12 15,-9 0 0-15,-13 0-6 16,22 4 17-16,9-4-12 16,22 0 1-16,9 0 0 0,4 0-10 15,-5 0 10-15,1 0 0 16,-31 0-1-16,-9 0 12 16,-9 0-12-16,-21 0 1 15,-6 0 0-15,6 0-5 16,4 0 5-16,17 0 0 15,18 0 0-15,0 0 12 16,-1-4-14-16,1-4 2 16,-17-2 0-16,-10 6-6 15,-21 0 6-15,-5-1 0 16,-13 5 0-16,0 0 9 0,0 0-9 16,-1 0 0-16,10 0 2 15,22 0-10-15,8 0 8 16,5 0 0-16,-13 0-1 15,-5 5 15-15,-4 10-14 16,-22 0 0-16,0-1 0 16,-9 5-14-16,-17-5 14 15,-5 4 0-15,5 4-1 16,8 0 10-16,18 4-9 16,0 4 0-16,-9-9 1 15,9 1-10-15,0 0 9 16,0-7 0-16,0-3-2 15,0-3 16-15,-9-5-14 16,9 0 0-16,0 0 0 16,0-2-8-16,-9-2 8 0,9 5 0 15,-9-5 0-15,0 0 11 16,0 0-11-16,9 0 0 16,22 0 0-16,4-11 1 15,14-11 3-15,-9 3-4 16,-14 4 0-16,-17 5 13 15,0 7-13-15,-26 3 0 16,-5 0 1-16,-5 0-8 16,-12-5 7-16,22 2 0 15,17-5 0-15,9-6 14 16,8 4-16-16,10-10 2 16,-5 10 0-16,-22 2-7 0,0 5 7 15,-13 3 0-15,-13 0 0 16,-5 0 10-16,-17 0-12 15,4 0 2-15,-4 0 0 16,9 0-8-16,-1 0 8 16,32 0 0-16,-1 0-1 15,9 0 12-15,0 0-13 16,-8 3 2-16,-23 3 0 16,-8-4-9-16,4 2 11 15,-22-1-2-15,0-3 0 16,0 0 10-16,0 0-11 15,0 0 1-15,0 0 0 16,17 0-9-16,10 0 9 0,21 0 0 16,18 0-2-16,0 0 15 15,-9 0-13-15,9 0 0 16,-18-3 2-16,-8-3-11 16,-14 0 9-16,-17 3 0 15,13-1 0-15,-22 1 14 16,9-2-14-16,0-1 0 15,-1-9 6-15,14-2 2 16,-13-10-5-16,18 1-3 16,-10 1 0-16,5-6 16 15,-13 4-17-15,8-2 1 16,-8-8 0-16,4 0-6 0,5-7 13 16,-9-6-7-16,0-2 0 15,13-10 15-15,-5 7-15 16,1 4 0-16,-1-2 1 15,5 3-8-15,-4-1 9 16,0-4-2-16,3-4 0 16,-3-2 12-16,0-13-19 15,4-9 7-15,-14-8 0 16,19-8-8-16,-18-1 14 16,21 2-6-16,-12 4 0 15,22-5 12-15,8 7-18 16,9-7 6-16,9 4 0 15,0-5-10-15,0-5 12 16,0-8-2-16,0-14 0 0,0-5 11 16,-9-2-16-16,-18 5 5 15,-3 12 0-15,-6 11-13 16,-12 11 16-16,-9 7-3 16,8 4 0-16,-4 8 12 15,5 2-25-15,0 12 13 16,12 13 0-16,-21 17-16 15,9 3 21-15,-9 11-5 16,13 0 0-16,4 1 8 16,13-7-19-16,10-1 11 15,4 0 0-15,26-8-16 16,13-8 17-16,14-3-1 16,-1-3 0-16,-4 7 5 0,-22-8-14 15,-4-4 9-15,-9-6 0 16,-9-8-12-16,0 1 23 15,-8-8-11-15,-5 0 0 16,26-4 9-16,5 0-17 16,26 4 8-16,35 0 0 15,22 4-11-15,14-4 23 16,-1 7-12-16,-30 0 0 16,-18 4 10-16,-18 2-17 15,-21-4 7-15,-18-2 0 16,4-7-7-16,-35-6 15 15,-4-3-8-15,-5 1 0 16,-8-7 13-16,-5 1-20 0,-4-1 7 16,0 0 0-16,-9 1 0 15,0-5 17-15,0-3-17 16,-18-4 0-16,-21-8 16 16,-18 3-18-16,-1 1 2 15,10 1 0-15,22 6-5 16,-5 9 26-16,22 3-21 15,0-4 0-15,1-6 24 16,-1-2-25-16,0-2 1 16,-4-5 0-16,-5 4 5 15,1-2 10-15,-14-5-15 16,-4 3 0-16,-5-3 18 0,0 7-17 16,5 1-1-1,-4 3 0-15,4 4-7 0,-14 6 22 16,1-2-15-16,-9 1 0 15,-18 3 15-15,-13-1-24 16,-44 12 9-16,-17-2 0 16,-23 4-19-16,-17 9 36 15,-9-2-17-15,9 8 0 16,18 7 13-16,26 13-40 16,13 9 27-16,0 22-71 15,-17 4-36-15,-31 40-138 16,-14 23-140-16</inkml:trace>
+  <inkml:trace contextRef="#ctx0" brushRef="#br1" timeOffset="-39360.19">5692 3942 637 0,'0'0'131'0,"0"0"-52"16,0 0 6-16,0 0 30 15,0 0-55-15,0 0-46 16,0 0 50-16,-171-190-45 16,96 172-18-16,0 6 19 15,-39 9-18-15,0 3-2 16,-27 0 0-16,-22 0 17 16,-8 3-17-16,-1 23 0 15,-17 3 0-15,9 7-7 16,-18 4 7-16,9 1 0 15,18 4 0-15,21-2 14 0,27-5-18 16,9 1 4 0,17-3 0-16,14 5-9 0,-14 2 9 15,-8-3 0-15,12 0 0 16,10-2 12-16,4-9-12 16,21-7 0-16,1 0 0 15,13-1-14-15,-22 1 18 16,-4 4-4-16,4-4 0 15,0-1 8-15,9 6-9 16,0 4 1-16,-9 14 0 16,-18 11-10-16,10 6 10 15,-23 11 0-15,14 0-1 16,-14-4 15-16,13-4-18 16,-4 1 4-16,-4 0 0 0,-5 4-5 15,-4 6 6-15,-4 5-1 16,-1 3 0-16,1-7 18 15,21-1-17-15,9-6-1 16,18 0 0-16,9-1-1 16,22-4 3-16,-5 1-2 15,4 4 0-15,5-4 13 16,5-1-13-16,8-2 0 16,-22-2 3-16,5 9-9 15,8-1 7-15,-12 1-1 16,3-8 0-16,5-3 15 15,5-8-16-15,-1 0 1 16,-4-4 0-16,5-3-7 16,8 0 7-16,-9-12 0 0,5 5 0 15,-5 0 12-15,10-1-13 16,-1 5 1-16,9-4 0 16,0 6-11-16,0 9 11 15,0-1 0-15,0 3-6 16,35 1 23-16,5-4-18 15,-1-3 1-15,9-4 0 16,-12-11-5-16,12 0 7 16,27-4-2-16,21-7 0 15,36 0 13-15,49-7-7 16,34-1-6-16,22-7 4 0,23-3-5 16,3 4 5-16,-8-1-4 15,9 0 0-15,-18 4 19 16,-17 0-23-16,-18 4 4 15,-31-5 0-15,9 1-16 16,0-4 18-16,9 1-2 16,13-4 0-16,4-1 13 15,5 1-15-15,-13 5 2 16,-9 0 0-16,-18-1-10 16,-18-2 16-16,1-2-6 15,-22 2 0-15,-1-4 16 16,-16 5-18-16,12-4 2 15,-13 5 0-15,18-5 9 16,8-3-1-16,44 0-5 16,14-3 5-16,22-17 2 0,17-4-1 15,-22 6-9-15,-13-1 0 16,4 1 3-16,-12-4 9 16,-14-3-12-16,0-4 11 15,-18-4-4-15,-21 0 12 16,-19 4-14-16,15 0-2 15,-23-4 25-15,8-1-26 16,-16 9 12-16,-10-4 2 16,-12 10-9-16,-19-1 23 15,5 1-23-15,-4-3-6 0,-9-5 18 16,0-5-8 0,-9-5-9-16,0-6 12 0,-17-5-7 15,-14 0 17-15,1 1-24 16,3 3 4-16,-12-3 22 15,13-9-19-15,-5-2 3 16,14-4-10-16,-14-4 12 16,5-7-10-16,-5 0-2 15,-17-4 0-15,13-5 5 16,-22-11 8-16,0-9-13 16,0-4 0-16,-22-4 17 15,-35 0-5-15,-18 1-12 16,-17 2 0-16,-22 1-1 15,-18 0 14-15,-22-3-13 16,-9-8 0-16,-17-3 6 0,-18-5-15 16,-17 5 9-16,-31-1 0 15,-49 4-12-15,-17 11 27 16,-40 7-15-16,-39 5 0 16,-13 6 10-16,-5 3-20 15,0 12 10-15,48 7 0 16,71 8-21-16,62 10 5 15,96 16 15-15,66 13-64 16,26 12-150-16,23-4-91 16</inkml:trace>
+  <inkml:trace contextRef="#ctx0" brushRef="#br1" timeOffset="-36850.19">3340 3616 718 0,'0'0'82'15,"0"0"-44"-15,0 0 85 16,0 0 70-16,0 0-22 16,0 0-101-16,22-91 37 15,-44 44-20-15,-13-1-55 16,-4-6 35-16,-19-9-31 0,-8-2-25 16,-8-16 19-16,-14-7-21 15,-13-21 4-15,-5-12-13 16,1-7 12-16,-10-4-11 15,14 4-1-15,-4 12 0 16,21 9-8-16,18 25 13 16,-4 22-5-16,35 24 0 15,-5 13 10-15,31 13-19 16,1 7 9-16,8 3 0 16,0 0-6-16,0 0 15 15,0 0-9-15,0 0 0 16,0 0-7-16,-9 18-10 15,0 32 12-15,-13 24 5 16,5 17-13-16,-23-8 26 16,14-2-13-16,-5-18 0 0,13-8 6 15,18-23-12 1,-9-14 6-16,9-7 0 0,0-11-9 16,0 0 28-16,0 0-19 15,0 0 2-15,0-33 6 16,0-21-1-16,0-23-7 15,0-7 0-15,0-14-2 16,0-9 16-16,9 5-14 16,9 13 0-16,-5 33 2 15,-4 21-12-15,-9 28 10 16,9 7 0-16,8 0-5 16,32 0-11-16,25 26 16 0,23 14 0 15,17 0 9-15,9-3-18 16,0-1 9-16,18-13-48 15,-18-9-35-15,9-14-99 16,-44 0-84-16,-62 0-227 16</inkml:trace>
+  <inkml:trace contextRef="#ctx0" brushRef="#br1" timeOffset="-35320.189">747 776 644 0,'0'0'235'0,"0"0"-44"16,0 0-58-16,0 0 36 15,0 0-52-15,0 0-36 16,-31-101 21-16,31 96-60 0,0 5-4 16,0 0-12-1,0 0-8-15,0 0-16 0,0 0-2 16,0 15 2-16,0 15-19 15,0 6 17-15,0 1 0 16,0 3-2-16,0-4 18 16,0 6-16-16,0 0 0 15,0-2 2-15,0-3-10 16,0-11 8-16,0-8 0 16,0-11-6-16,0-3 19 15,0-4-13-15,0 0 0 16,0 0-6-16,0 0-6 0,22 0-7 15,22 0 17 1,13-11-14-16,-9-7 31 16,1 0-16-16,-14-1 1 0,-13 2 0 15,13-2-8-15,-4 1 8 16,-5-1 0-16,-17 5-3 16,4 2 17-16,-13 3-14 15,0-7 0-15,0 5 4 16,0-1 22-16,0 6-22 15,0 2 7-15,0 4 6 16,0 0-3-16,0 0 6 16,0 0-20-16,0 0 7 15,0 0-17-15,0 0 10 16,0 7 0-16,0 26-7 16,0 11 19-16,-13 0-14 0,13 1 2 15,0 1 0-15,0 2-10 16,0-5 10-16,0-6 0 15,0-4-2-15,0-10-58 16,0-10-13-16,0-5-71 16,0-8-85-16,0 0 5 15,0-8 0-15,0-35-597 16</inkml:trace>
+  <inkml:trace contextRef="#ctx0" brushRef="#br1" timeOffset="-34880.189">1217 524 690 0,'0'0'153'16,"0"0"6"-16,0 0-31 16,0 0-20-16,0 0-4 0,0 0-74 15,-303-172-2-15,228 198-16 16,0 22 0-16,1 10 6 16,16 8-6-16,1-1-10 15,18 8 21-15,12 12-18 16,5 6 3-16,22 7 4 15,0 6-4-15,0-3 6 16,49-8-14-16,17-9 2 16,22-23 1-16,4-14 2 15,13-17-5-15,10-23 9 16,8-7-2-16,0-14 30 0,0-45 22 16,-9-18-5-1,-21-7 20-15,-14-11-58 0,-13 1 19 16,-18-10 3-16,-30-1-36 15,-18-5 42-15,0 0-43 16,-18 6 0-16,-39 4 10 16,-14 17-4-16,6 20-7 15,-10 30 0-15,0 25 0 16,-8 8-15-16,-14 26 15 16,0 40-13-16,14 18 4 15,17 15-60-15,26 4-13 16,31-2-55-16,9-2-128 15,18-15-112-15</inkml:trace>
+  <inkml:trace contextRef="#ctx0" brushRef="#br1" timeOffset="-34480.189">2725 663 500 0,'0'0'356'0,"0"0"-204"16,0 0 9-16,0 0-49 15,0 0-19-15,0 0-41 0,22-18-43 16,-22 18 30-16,0 0-39 15,0 10 1-15,0 20 20 16,-13 3-17-16,-5 5 14 16,0-6-18-16,18 4 3 15,0-11-5-15,0 1 2 16,0-7 0-16,0-5 1 16,0 1 15-16,36-8-16 15,12 1 0-15,9-8 11 16,9 0-26-16,-9 0-24 15,9 0-54-15,0-30-64 0,-9-7-118 16,-8-6-171-16</inkml:trace>
+  <inkml:trace contextRef="#ctx0" brushRef="#br1" timeOffset="-34080.189">3389 444 663 0,'0'0'176'0,"0"0"-8"15,0 0-15-15,0 0-32 16,0 0-19-16,0 0-23 16,0-70-21-16,0 70 10 15,0 0-65-15,-9 0 1 16,9 0-4-16,-27 8-5 16,-3 19 5-16,3 8 0 0,5-3 6 15,14 1-15-15,8-6 9 16,0-2 0-16,0-4-7 15,0-2 18-15,8-1-11 16,23-3 0-16,4-4 2 16,14-1-10-16,-10-2 8 15,-4 4 0-15,-4-2-4 16,-4 1 12-16,-19-4-8 16,-8 5 0-16,0-2-3 15,0 1-13-15,0 0 16 16,0 3 0-16,-17-2-2 15,-18 3 16-15,-5-4-28 16,0-8-5-16,5 1-112 16,-4-4 14-16,21 0-97 0,9 0-68 15,9-33-489-15</inkml:trace>
+  <inkml:trace contextRef="#ctx0" brushRef="#br1" timeOffset="-33990.189">3389 444 456 0</inkml:trace>
+  <inkml:trace contextRef="#ctx0" brushRef="#br1" timeOffset="-33670.19">3389 444 456 0,'255'-11'240'0,"-255"11"-131"15,0-3 3-15,0 3 24 0,0-4-92 16,8 4 7-16,23 0-42 16,18 0-1-16,16-8 18 0,10 5-9 15,-9-9 13-15,-9 2-11 16,-17 2-5-16,-14 1-14 15,-17 3 0-15,-9 0 2 16,0 4 0-16,0-3-2 16,0-4-3-16,-9 4 0 15,-8 3-33-15,-1 0 35 16,-4 0-5-16,4 0 5 16,10 0-16-16,-1 3 17 15,9 11 0-15,-13 9-3 16,4-2 8-16,9 9-5 15,0 6 0-15,0 1 3 0,0 3 5 16,0 4-1-16,0 3-7 16,0-3 3-16,0 3 10 15,0 1-13-15,0-4 0 16,0-4-93-16,0-9-162 16,0-10-416-16</inkml:trace>
+  <inkml:trace contextRef="#ctx0" brushRef="#br1" timeOffset="-29370.19">4307 524 641 0,'0'0'167'15,"0"0"-58"-15,0 0 11 16,0 0-1-16,0 0-54 16,0 0 17-16,40-3-16 15,-31 3-4-15,0 0 14 16,-9 0-53-16,0 0 4 15,0 0 11-15,0 0-34 16,0 0 24-16,17-4-11 16,14-4-10-16,17 2 1 15,9-2-8-15,1 4 0 0,-1 1-5 16,-5-1 18 0,-12 4-13-16,-9 0 0 0,-22 0-27 15,-9 0-4-15,0 0-99 16,0 0-32-16,0 0-13 15,-22 0-164-15,-5 0-143 16</inkml:trace>
+  <inkml:trace contextRef="#ctx0" brushRef="#br1" timeOffset="-29280.189">4307 524 555 0</inkml:trace>
+  <inkml:trace contextRef="#ctx0" brushRef="#br1" timeOffset="-29120.19">4307 524 555 0,'132'-194'168'0,"-141"176"-21"0,9 8-8 15,0 2-43-15,0 8 21 0,0 0-45 16,0 0-41-16,0 0 2 16,0 0-33-16,0 15 0 15,0 17-5-15,9 20 22 16,13 3-7-16,-13 3-3 16,9 5 4-16,-10 2-3 15,-8 1-8-15,0 0 0 16,0-8-2-16,0-11-187 15,0-12-201-15</inkml:trace>
+  <inkml:trace contextRef="#ctx0" brushRef="#br1" timeOffset="-28570.19">4896 612 663 0,'0'0'141'0,"0"0"14"15,0 0-26-15,0 0-81 16,0 0-38-16,0 0 2 16,9 43-12-16,-9 2 50 15,0-5-26-15,0 4 32 16,0-7-31-16,0-1-22 16,0-11 12-16,0-13-13 15,9-5-2-15,-9-7 17 16,0 0-12-16,9 0 142 15,4-34-28-15,5-16-116 16,-1-9 5-16,1-3-1 0,-5 3-7 16,5 4 8-16,-1 6 12 15,-8 11-19-15,4 13-1 16,-4 13 0-16,-9 12-11 16,0 0 11-16,9 0-7 15,-1 18 0-15,10 23-6 16,13 6 13-16,-5 1 0 15,14-5 0-15,-1-10-12 16,-12-6 16-16,-1-13-4 16,5-3 0-16,-14-11 16 15,14 0-8-15,4 0-8 16,5-25 4-16,8-12 9 16,-13-7-1-16,5 1 4 0,-31-2 17 15,-9-1-29 1,0 1 25-16,0 8-29 0,0 12 3 15,-40 10-16-15,5 11 3 16,-13 4-30-16,-9 4-40 16,8 36-110-16,23 18 19 15,8 8-54-15,18-3-42 16</inkml:trace>
+  <inkml:trace contextRef="#ctx0" brushRef="#br1" timeOffset="-28220.189">5806 751 659 0,'0'0'145'0,"0"0"-27"15,0 0 17-15,0 0-20 16,0 0-70-16,0 0 42 16,0-76-31-16,0 76-42 15,0 0 6-15,-8 0-20 16,8 3-8-16,0 22-8 15,0 5 23-15,0-5-7 16,0-7 0-16,8-3 8 16,41-7 2-16,-14-8-10 15,13 0 0-15,-8 0 9 16,-14-11 5-16,-8-11-12 0,-5-4 15 16,-13-3-14-16,0 0 28 15,0 2-31-15,-22 6 0 16,-26 6-9-16,-5 11-7 15,5 4-50-15,8 0-77 16,14 19-61-16,4 10-10 16,13-4-182-16</inkml:trace>
+  <inkml:trace contextRef="#ctx0" brushRef="#br1" timeOffset="-28140.189">5806 751 114 0</inkml:trace>
+  <inkml:trace contextRef="#ctx0" brushRef="#br1" timeOffset="-27590.189">5806 751 114 0,'255'-40'560'0,"-246"25"-406"0,-9 1-15 0,0-1 23 0,0 3-96 16,0 2-8-16,0 2 4 15,-9 5-56-15,1 3 32 16,-10 0-38-16,-4 0 7 16,4 11-21-16,10 22 14 15,8 4 0-15,0-1-10 16,0-11 24-16,0-2-15 15,0-13 1-15,17-10-13 16,14 0 5-16,-5 0 9 16,14-18-1-16,-5-17 4 15,-4-3 18-15,-5-5-22 16,-17-5 31-16,4 3-16 16,-13-1 57-16,0 1-58 0,0 5 18 15,0 11-2-15,0 7-12 16,-13 11-12-16,4 11-6 15,0 0 6-15,9 0-19 16,-8 8-15-16,-1 31 28 16,9 13-24-16,0 6 42 15,0-7-18-15,0-3 0 16,26-5 7-16,14-13-11 16,-5-5 4-16,13-10 0 15,9-12-4-15,1-3 10 0,-1 0-6 16,0 0 0-1,0-21 6-15,-17-8-7 0,-14-4 1 16,-17-3 0-16,-9-5 3 16,0 4 16-16,0 1-6 15,0 14-13-15,0 7 9 16,-18 12 0-16,1 3-9 16,-14 0-4-16,13 29-7 15,-4 18 8-15,13 8 3 16,9 1 0-16,0-2 5 15,22-4-24-15,22-5 19 16,22-8-87-16,5-11-37 16,3-7-122-16,10-17-159 15</inkml:trace>
+  <inkml:trace contextRef="#ctx0" brushRef="#br1" timeOffset="-27340.189">7266 652 601 0,'0'0'253'15,"0"0"-232"-15,0 0 66 16,0 0-48-16,0 0-35 16,0 0 22-16,228-18-22 15,-153 8 12-15,-18 1-16 16,0 3 6-16,-21-2-22 0,-14 4-76 15,-22-2-61 1,0-3 12-16,0 3-380 0</inkml:trace>
+  <inkml:trace contextRef="#ctx0" brushRef="#br1" timeOffset="-27190.19">7547 506 237 0,'0'0'281'0,"0"0"-140"15,0 0 16-15,0 0-24 0,0 0-56 16,0 0 15-16,-44-43-49 15,44 43-30-15,0 0-13 16,0 21 4-16,0 19-4 16,0 15 0-16,0 0 4 15,0 4-10-15,0 4 6 16,0-10-61-16,0-1-185 16</inkml:trace>
+  <inkml:trace contextRef="#ctx0" brushRef="#br1" timeOffset="-26620.19">8193 403 795 0,'0'0'190'0,"0"0"-50"15,0 0-48-15,0 0 31 16,0 0-122-16,0 0-1 15,0-14-1-15,0 58-6 0,0 14 7 16,0 1 0-16,0-8 5 16,0-7-6-16,0-11 1 15,0-11 0-15,0-15-1 16,0-3 19-16,0-4-18 16,0 0 33-16,-8 0 83 15,-1-23 8-15,-22-13-115 16,13-7-6-16,1-10-1 15,8 0 19-15,9-6-21 16,0 4 0-16,0 0 4 16,18 12-14-16,17 6 10 15,13 11 0-15,1 12-3 16,-10 10 12-16,5 4-17 0,-4 0 8 16,-10 0-14-16,-21 22-1 15,0 10 6-15,-9 1 9 16,0 0-10-16,0 4 22 15,-9-4-12-15,-22 0 0 16,23-3 1-16,-1-9-15 16,9 1 15-16,0 0-1 15,0-8 0-15,0 0 13 16,39 2-13-16,-3-1 0 16,21-1 1-16,0-3-16 15,18 1-16-15,-1-2-56 16,-3-2-19-16,3-8-100 0,-8 0-24 15,-9 0-146 1</inkml:trace>
+  <inkml:trace contextRef="#ctx0" brushRef="#br1" timeOffset="-26200.189">9200 389 673 0,'0'0'192'16,"0"0"-56"-16,0 0 19 15,0 0-55-15,0 0-22 16,0-186 19-16,-13 168-47 16,-14-1 0-16,1 3-17 15,-13 6-23-15,-1 7-1 16,-8 3-9-16,12 0 0 16,6 0-15-16,3 29 10 0,10 11 5 15,17 0 0-15,0 1 11 16,0-1-18-16,9 0 7 15,26-7 0-15,13 0-6 16,-8-3 12-16,8-2-6 16,-4 5 0-16,-13-1 12 15,-5-1-19-15,-17-6 7 16,4-3 0-16,-13-7-11 16,0-1 13-16,0-7-2 15,0-2 0-15,-40 2 11 0,-25-4-11 16,-23 0 0-1,4 5 0-15,1-4-8 0,-5-4 8 16,30 0-51-16,23 0-73 16,27 0-45-16,8-15 75 15,8-15-118-15,67-6-17 16</inkml:trace>
+  <inkml:trace contextRef="#ctx0" brushRef="#br1" timeOffset="-26090.189">9200 389 529 0</inkml:trace>
+  <inkml:trace contextRef="#ctx0" brushRef="#br1" timeOffset="-25740.189">9200 389 529 0,'75'52'173'0,"-93"-57"-32"16,5 5 12-16,13-3-51 0,0 3-47 15,0 0-41-15,13 0 34 0,40-3-41 16,17-1-2-16,14-4 4 15,-9 1 3-15,-1-1-7 16,5 2-5-16,-21 2 10 16,-1-4-4-16,-31 8-6 15,-8-3 0-15,-10 3-4 16,-8 0 17-16,0 0-13 16,0 0 0-16,0 0 2 15,-26 0-14-15,0 0 12 16,-14 0 0-16,23 0-8 0,-5 0 16 15,13 0-11 1,-9 0 3-16,9 15 0 0,-21 10-10 16,21 11 10-16,-18 6 0 15,14 0-9-15,-4 3 27 16,8 2-18-16,9-6 0 16,-9 2 9-16,9-5-2 15,0-15-7-15,0 4 0 16,0-12 2-16,0-1-2 15,0-7-38-15,0-7-189 16,0 0-261-16</inkml:trace>
+  <inkml:trace contextRef="#ctx0" brushRef="#br1" timeOffset="-21880.189">4422 4545 474 0,'0'0'193'15,"0"0"-67"-15,0 0 17 16,74-256-35-16,-34 183-2 16,-22-4 14-16,12 1-35 15,-21 6 20-15,0 8-33 16,-9 7 2-16,0 8 2 15,-9 10-55-15,-30 7 15 0,-19 13-6 16,-8 10-24-16,-17 7 15 16,-23 0-21-16,-17 24 2 15,-17 32-5-15,-5 17 3 16,22 15 0-16,13 9-1 16,22 18 17-16,31 6-16 15,30 10 0-15,27 15 0 16,0-3-10-16,66-8 11 15,40-11-1-15,17-21 0 16,17-16 14-16,10-18-15 16,4-25 1-16,8-22 0 15,5-22-6-15,22 0 9 16,-8-40-3-16,12-22 2 0,-13-11 17 16,-30-7-13-16,-27-8 12 15,-26-11-11-15,-31-4 34 16,-31-6-37-16,-27 3 1 15,-8-4 12-15,-17 1 0 16,-58 3-6-16,-30 3-11 16,-10 12 0-16,-34 11-14 15,-14 17 17-15,-8 16-3 16,-9 21 0-16,21 15 11 16,14 11-16-16,22 0 5 15,13 33 0-15,22 33-22 16,5 22 23-16,17 18-1 15,18 15 0-15,17 3 14 0,22 4-20 16,9 4 6-16,9 3 0 16,70-19-17-16,4-10 19 15,32-18-2-15,-1-26 0 16,27-18 13-16,21-26-19 16,10-18 6-16,8 0 0 15,-4-51-1-15,17-22 4 16,-13-24-3-16,-21-18 3 15,-27-13 16-15,-27-12-11 16,-30-2-8-16,-36-4 0 16,-21 0 0-16,-18 7 9 15,-57 8-9-15,-57 21 0 16,-45 15 2-16,-30 22-15 16,-31 22 13-16,14 26-37 0,17 25 2 15,17 0-73-15,49 36-82 16,57 27-90-16,36-9-169 15</inkml:trace>
+  <inkml:trace contextRef="#ctx0" brushRef="#br1" timeOffset="-20740.189">4800 3533 624 0,'0'0'155'0,"0"0"-98"16,0 0 69-16,0 0 1 15,0 0-11-15,0 0 40 16,0 7-38-16,0-37 17 16,0-13-100-16,9-12-26 15,4-14 63-15,13-16-46 16,5-17-19-16,-14-15 12 16,10-4-9-16,-5-10 0 15,-13 3-1-15,-1 3 0 16,-8 12 3-16,0 11-12 0,0 11 0 15,0 10 2 1,0 1 10-16,0 4-12 0,0-2 0 16,9-2 10-16,9 7-19 15,-18 14 9-15,13 15 0 16,-13 18-7-16,0 8 28 16,0 8-21-16,0 2 0 15,0 1 7-15,0 4-5 16,0-5-2-16,0 4 0 15,0 1-3-15,0-1 15 16,0 4-12-16,0 0 0 16,0-3 5-16,0-5-12 15,0 1 7-15,0-4 0 16,-13 1-8-16,-5-5 22 16,9 0-14-16,1 0 0 0,8-3 5 15,-18 3-14-15,18 1 9 16,-13-9 0-16,13 2-10 15,0-16 24-15,0-3-14 16,0-8 0-16,0 4 9 16,0 12-23-16,0 9 14 15,0 9 0-15,0 7-5 16,0 3 19-16,0 1-14 16,0-2 0-16,0 2 0 15,0 3-19-15,0 0 19 16,-18 0 0-16,-8 0-12 15,-31 8 22-15,-22 28-10 0,21 9 0 16,-16 8 4-16,-1 7-16 16,18-6 12-16,8-10 0 15,23-11-5-15,4-15 17 16,22-11-12-16,0-7 0 16,0 0 2-16,0 0-12 15,0 0 10-15,13 0 0 16,44-40-3-16,18-18 18 15,9-5-15-15,4 5 0 16,-22 3 0-16,-9 7-8 16,0 8 8-16,-31 15 0 15,-8 7-6-15,-5 7 19 16,5 11-16-16,-1 0 3 16,23 11-1-16,8 32-18 0,-4 12 19 15,4 3 0-15,1 1-9 16,-1-4-2-16,-4 0-50 15,-4-5-79-15,8-9-131 16,0-14-158-16</inkml:trace>
 </inkml:ink>
 </file>
 
@@ -3363,12 +3363,12 @@
   <inkml:trace contextRef="#ctx0" brushRef="#br0" timeOffset="42448">1231 4364 957 0,'0'0'169'16,"0"0"10"-16,0 0-28 16,0 0-46-16,0 0-49 15,0 0-30-15,-27-42-21 16,27 42-3-16,0 0-2 15,35 17 0-15,23 26 0 16,-1 23 2-16,0 19 3 16,9 13-1-16,-9 8-2 15,-9 3 4-15,-8 2-3 16,-40-2-2-16,0 12-1 16,-57-5-142-16,-49 2-185 15,9-12-488-15</inkml:trace>
   <inkml:trace contextRef="#ctx0" brushRef="#br0" timeOffset="43348">804 7219 717 0,'0'0'196'0,"0"0"-80"15,0 0-26-15,0 0 16 16,0 0-4-16,0 0-53 15,-75-44-22-15,106 33-24 16,13-4 0-16,5 0-2 0,8 9 0 16,-9 6 2-1,-22 0 0-15,5 0 0 0,-13 0-6 16,-9 0 2-16,-1 14 0 16,-8 12-1-16,0 3 1 15,0 4 1-15,0 0 2 16,-35 4 0-16,-13-4-1 15,-1-6-1-15,14-7 0 16,13-9-1-16,14-7 1 16,8-4 0-16,0 0 6 15,0 0-6-15,0 0 0 16,39-8-7-16,-4-6 6 0,14 1-2 16,-1 7 2-1,0 6 0-15,-12 0 0 0,21 0-4 16,-9 0 5-16,-8 22-4 15,-5 3 1-15,-13 5 1 16,-13 3-3 0,-9-4 5-16,0 0-3 0,-9 0 6 15,-62-3-1-15,-3 0-1 16,-10-4 0-16,-13-8-1 16,14-7-28-16,8-7-77 15,36 0-7-15,21 0-50 16,18-25-69-16,0-36-487 15</inkml:trace>
   <inkml:trace contextRef="#ctx0" brushRef="#br0" timeOffset="43617">1310 6652 860 0,'0'0'223'0,"0"0"-109"15,0 0 52-15,0 0-55 16,0 0-60-16,0 0-15 16,0-15-33-16,17 38-3 15,18 28 0-15,23 22 7 16,-1 15 11-16,0 3-7 16,-9 12 3-16,-8-1 1 0,-23-7-7 15,-17-7 0 1,0-8-6-16,-26-7-2 0,-71 11-4 15,-35 0-138-15,-30 8-214 16</inkml:trace>
-  <inkml:trace contextRef="#ctx0" brushRef="#br2" timeOffset="441467">9011 8977 62 0,'0'0'776'15,"0"0"-650"-15,0 0-18 0,0 0 7 16,0 0-51 0,0 0-33-16,181-7-12 0,-173 17-8 15,-8 16 17-15,0 7 0 16,-8 7 9-16,-50 5 6 16,-16 2-17-16,-10-3-2 15,-4-4-7-15,22-7-14 16,18-11 8-16,39-4-11 15,9-7 1-15,0 3 1 16,18 5 0-16,78-8 3 16,28-8 10-16,25-3-9 15,-13 0 2-15,-35 0-6 16,-35 0 0-16,-35 0-4 16,-13 0-15-16,-18 11-90 0,0 4-79 15,0 7-139 1,-27 3-200-16</inkml:trace>
-  <inkml:trace contextRef="#ctx0" brushRef="#br2" timeOffset="441697">9143 9580 805 0,'0'0'203'15,"0"0"-54"-15,0 0 12 16,0 0-34-16,0 0-60 15,0 0-26-15,-123 0-19 16,57 33-5-16,-17 11 4 0,-5 7-7 16,4 8 3-16,-12 2-7 15,12 2-8-15,0 0-4 16,19-13-2-16,16 1-78 16,18-11-175-16,5-3-185 15</inkml:trace>
-  <inkml:trace contextRef="#ctx0" brushRef="#br2" timeOffset="442200">7750 10224 943 0,'0'0'131'0,"0"0"-36"16,0 0-16-16,0 0 7 16,0 0-64-16,0 0-18 15,193-70 7-15,-175 70-10 16,-1 0 1-16,-8 6 1 16,-9 17 1-16,0 3-4 15,0 7 0-15,0 4-2 16,-17 3-1-16,-23 1 3 15,5-9 0-15,4-3 0 16,22-7 0-16,9-4-11 0,0-4-8 16,0-6-2-16,0 0 10 15,0-5 2-15,0 1 7 16,18 3-1-16,4-2 6 16,4 1 0-16,5 1 0 15,-5 4-2-15,14 4 6 16,-14-5 2-16,-4 2 2 15,-4 2 3-15,-18 5-10 16,0-1 11-16,0 7-15 16,-31 8 4-16,-44-3-3 15,-8 3-1-15,-14-8 0 16,22-4-24-16,27-9-119 16,22-5-9-16,26-7-117 0,57-7-518 15</inkml:trace>
-  <inkml:trace contextRef="#ctx0" brushRef="#br2" timeOffset="442509">9447 9782 1048 0,'0'0'165'16,"0"0"-6"-16,0 0-60 0,0 0-25 16,0 0-36-16,0 0-19 15,57 3-9-15,9 34 5 16,22 6 29-16,13 5-22 16,-5 0-15-16,1 4 6 15,-22-13-13-15,-9-3 0 16,-18-3 4-16,-4 0-4 15,-13 4-21-15,-22 0-74 16,-1 2-145-16,-8 1-186 16</inkml:trace>
-  <inkml:trace contextRef="#ctx0" brushRef="#br2" timeOffset="442926">10436 10475 1015 0,'0'0'152'0,"0"0"4"0,0 0-17 16,0 0-26-16,0 0-59 15,0 0-21-15,8-14-7 16,-8 14-21-16,9 0-1 15,-9 4-4-15,18 25-3 16,-1 8 3-16,14 3 0 16,-4-4 5-16,-6-6-2 0,6-5-3 15,4 1 0-15,-14-4 1 16,10-1-1-16,3 1 0 16,-12-4 2-16,13 0 0 15,-22-3-2-15,-1 0 0 16,-8-7 0-16,0-1-1 15,0 0-1-15,0 4-8 16,-48 4 10-16,-27-1 4 16,-21-3-4-16,3 4-41 15,-12-15-96-15,30 3-74 16,18-3-142-16,26 0-289 16</inkml:trace>
-  <inkml:trace contextRef="#ctx0" brushRef="#br2" timeOffset="443117">10378 10534 685 0,'0'0'330'0,"0"0"-242"16,0 0 55-16,0 0-35 16,0 0-84-16,0 0-10 15,216-73-14-15,-141 73 1 16,-9 0-2-16,-18 4-51 15,-39 29-152-15,-9 7-193 16</inkml:trace>
+  <inkml:trace contextRef="#ctx0" brushRef="#br2" timeOffset="11970.27">9011 8977 62 0,'0'0'776'15,"0"0"-650"-15,0 0-18 0,0 0 7 16,0 0-51 0,0 0-33-16,181-7-12 0,-173 17-8 15,-8 16 17-15,0 7 0 16,-8 7 9-16,-50 5 6 16,-16 2-17-16,-10-3-2 15,-4-4-7-15,22-7-14 16,18-11 8-16,39-4-11 15,9-7 1-15,0 3 1 16,18 5 0-16,78-8 3 16,28-8 10-16,25-3-9 15,-13 0 2-15,-35 0-6 16,-35 0 0-16,-35 0-4 16,-13 0-15-16,-18 11-90 0,0 4-79 15,0 7-139 1,-27 3-200-16</inkml:trace>
+  <inkml:trace contextRef="#ctx0" brushRef="#br2" timeOffset="12200.27">9143 9580 805 0,'0'0'203'15,"0"0"-54"-15,0 0 12 16,0 0-34-16,0 0-60 15,0 0-26-15,-123 0-19 16,57 33-5-16,-17 11 4 0,-5 7-7 16,4 8 3-16,-12 2-7 15,12 2-8-15,0 0-4 16,19-13-2-16,16 1-78 16,18-11-175-16,5-3-185 15</inkml:trace>
+  <inkml:trace contextRef="#ctx0" brushRef="#br2" timeOffset="12703.27">7750 10224 943 0,'0'0'131'0,"0"0"-36"16,0 0-16-16,0 0 7 16,0 0-64-16,0 0-18 15,193-70 7-15,-175 70-10 16,-1 0 1-16,-8 6 1 16,-9 17 1-16,0 3-4 15,0 7 0-15,0 4-2 16,-17 3-1-16,-23 1 3 15,5-9 0-15,4-3 0 16,22-7 0-16,9-4-11 0,0-4-8 16,0-6-2-16,0 0 10 15,0-5 2-15,0 1 7 16,18 3-1-16,4-2 6 16,4 1 0-16,5 1 0 15,-5 4-2-15,14 4 6 16,-14-5 2-16,-4 2 2 15,-4 2 3-15,-18 5-10 16,0-1 11-16,0 7-15 16,-31 8 4-16,-44-3-3 15,-8 3-1-15,-14-8 0 16,22-4-24-16,27-9-119 16,22-5-9-16,26-7-117 0,57-7-518 15</inkml:trace>
+  <inkml:trace contextRef="#ctx0" brushRef="#br2" timeOffset="13012.27">9447 9782 1048 0,'0'0'165'16,"0"0"-6"-16,0 0-60 0,0 0-25 16,0 0-36-16,0 0-19 15,57 3-9-15,9 34 5 16,22 6 29-16,13 5-22 16,-5 0-15-16,1 4 6 15,-22-13-13-15,-9-3 0 16,-18-3 4-16,-4 0-4 15,-13 4-21-15,-22 0-74 16,-1 2-145-16,-8 1-186 16</inkml:trace>
+  <inkml:trace contextRef="#ctx0" brushRef="#br2" timeOffset="13429.27">10436 10475 1015 0,'0'0'152'0,"0"0"4"0,0 0-17 16,0 0-26-16,0 0-59 15,0 0-21-15,8-14-7 16,-8 14-21-16,9 0-1 15,-9 4-4-15,18 25-3 16,-1 8 3-16,14 3 0 16,-4-4 5-16,-6-6-2 0,6-5-3 15,4 1 0-15,-14-4 1 16,10-1-1-16,3 1 0 16,-12-4 2-16,13 0 0 15,-22-3-2-15,-1 0 0 16,-8-7 0-16,0-1-1 15,0 0-1-15,0 4-8 16,-48 4 10-16,-27-1 4 16,-21-3-4-16,3 4-41 15,-12-15-96-15,30 3-74 16,18-3-142-16,26 0-289 16</inkml:trace>
+  <inkml:trace contextRef="#ctx0" brushRef="#br2" timeOffset="13620.27">10378 10534 685 0,'0'0'330'0,"0"0"-242"16,0 0 55-16,0 0-35 16,0 0-84-16,0 0-10 15,216-73-14-15,-141 73 1 16,-9 0-2-16,-18 4-51 15,-39 29-152-15,-9 7-193 16</inkml:trace>
 </inkml:ink>
 </file>
 
@@ -3486,7 +3486,7 @@
           <a:p>
             <a:fld id="{BC859255-6DFA-43EF-88B6-2E6996FDF2B1}" type="datetimeFigureOut">
               <a:rPr lang="en-IN" smtClean="0"/>
-              <a:t>27-05-2022</a:t>
+              <a:t>30-05-2022</a:t>
             </a:fld>
             <a:endParaRPr lang="en-IN"/>
           </a:p>
@@ -4369,7 +4369,7 @@
           <a:p>
             <a:fld id="{4C158068-7E1F-4B26-8461-C73B0177DC30}" type="datetimeFigureOut">
               <a:rPr lang="en-IN" smtClean="0"/>
-              <a:t>27-05-2022</a:t>
+              <a:t>30-05-2022</a:t>
             </a:fld>
             <a:endParaRPr lang="en-IN"/>
           </a:p>
@@ -4626,7 +4626,7 @@
           <a:p>
             <a:fld id="{4C158068-7E1F-4B26-8461-C73B0177DC30}" type="datetimeFigureOut">
               <a:rPr lang="en-IN" smtClean="0"/>
-              <a:t>27-05-2022</a:t>
+              <a:t>30-05-2022</a:t>
             </a:fld>
             <a:endParaRPr lang="en-IN"/>
           </a:p>
@@ -5345,7 +5345,7 @@
           <a:p>
             <a:fld id="{4C158068-7E1F-4B26-8461-C73B0177DC30}" type="datetimeFigureOut">
               <a:rPr lang="en-IN" smtClean="0"/>
-              <a:t>27-05-2022</a:t>
+              <a:t>30-05-2022</a:t>
             </a:fld>
             <a:endParaRPr lang="en-IN"/>
           </a:p>
@@ -5519,7 +5519,7 @@
           <a:p>
             <a:fld id="{4C158068-7E1F-4B26-8461-C73B0177DC30}" type="datetimeFigureOut">
               <a:rPr lang="en-IN" smtClean="0"/>
-              <a:t>27-05-2022</a:t>
+              <a:t>30-05-2022</a:t>
             </a:fld>
             <a:endParaRPr lang="en-IN"/>
           </a:p>
@@ -5644,7 +5644,7 @@
           <a:p>
             <a:fld id="{B9760F35-3678-4552-9658-E80C85BE3232}" type="datetimeFigureOut">
               <a:rPr lang="en-IN" smtClean="0"/>
-              <a:t>27-05-2022</a:t>
+              <a:t>30-05-2022</a:t>
             </a:fld>
             <a:endParaRPr lang="en-IN"/>
           </a:p>
@@ -5808,7 +5808,7 @@
           <a:p>
             <a:fld id="{4C158068-7E1F-4B26-8461-C73B0177DC30}" type="datetimeFigureOut">
               <a:rPr lang="en-IN" smtClean="0"/>
-              <a:t>27-05-2022</a:t>
+              <a:t>30-05-2022</a:t>
             </a:fld>
             <a:endParaRPr lang="en-IN"/>
           </a:p>
@@ -6165,7 +6165,7 @@
           <a:p>
             <a:fld id="{4C158068-7E1F-4B26-8461-C73B0177DC30}" type="datetimeFigureOut">
               <a:rPr lang="en-IN" smtClean="0"/>
-              <a:t>27-05-2022</a:t>
+              <a:t>30-05-2022</a:t>
             </a:fld>
             <a:endParaRPr lang="en-IN"/>
           </a:p>
@@ -6564,7 +6564,7 @@
           <a:p>
             <a:fld id="{4C158068-7E1F-4B26-8461-C73B0177DC30}" type="datetimeFigureOut">
               <a:rPr lang="en-IN" smtClean="0"/>
-              <a:t>27-05-2022</a:t>
+              <a:t>30-05-2022</a:t>
             </a:fld>
             <a:endParaRPr lang="en-IN"/>
           </a:p>
@@ -7000,7 +7000,7 @@
           <a:p>
             <a:fld id="{4C158068-7E1F-4B26-8461-C73B0177DC30}" type="datetimeFigureOut">
               <a:rPr lang="en-IN" smtClean="0"/>
-              <a:t>27-05-2022</a:t>
+              <a:t>30-05-2022</a:t>
             </a:fld>
             <a:endParaRPr lang="en-IN"/>
           </a:p>
@@ -7095,7 +7095,7 @@
           <a:p>
             <a:fld id="{4C158068-7E1F-4B26-8461-C73B0177DC30}" type="datetimeFigureOut">
               <a:rPr lang="en-IN" smtClean="0"/>
-              <a:t>27-05-2022</a:t>
+              <a:t>30-05-2022</a:t>
             </a:fld>
             <a:endParaRPr lang="en-IN"/>
           </a:p>
@@ -7207,7 +7207,7 @@
           <a:p>
             <a:fld id="{4C158068-7E1F-4B26-8461-C73B0177DC30}" type="datetimeFigureOut">
               <a:rPr lang="en-IN" smtClean="0"/>
-              <a:t>27-05-2022</a:t>
+              <a:t>30-05-2022</a:t>
             </a:fld>
             <a:endParaRPr lang="en-IN"/>
           </a:p>
@@ -7474,7 +7474,7 @@
           <a:p>
             <a:fld id="{4C158068-7E1F-4B26-8461-C73B0177DC30}" type="datetimeFigureOut">
               <a:rPr lang="en-IN" smtClean="0"/>
-              <a:t>27-05-2022</a:t>
+              <a:t>30-05-2022</a:t>
             </a:fld>
             <a:endParaRPr lang="en-IN"/>
           </a:p>
@@ -8011,7 +8011,7 @@
             <a:fld id="{B61BEF0D-F0BB-DE4B-95CE-6DB70DBA9567}" type="datetimeFigureOut">
               <a:rPr lang="en-US" smtClean="0"/>
               <a:pPr/>
-              <a:t>5/27/2022</a:t>
+              <a:t>5/30/2022</a:t>
             </a:fld>
             <a:endParaRPr lang="en-US" dirty="0"/>
           </a:p>
@@ -8574,7 +8574,7 @@
         <p:spPr>
           <a:xfrm>
             <a:off x="418298" y="1083332"/>
-            <a:ext cx="9718479" cy="1754286"/>
+            <a:ext cx="9718479" cy="2308284"/>
           </a:xfrm>
           <a:prstGeom prst="rect">
             <a:avLst/>
@@ -8683,6 +8683,41 @@
                 <a:hlinkClick r:id="rId4" action="ppaction://hlinksldjump"/>
               </a:rPr>
               <a:t>Max Path Sum</a:t>
+            </a:r>
+            <a:endParaRPr lang="en-US" sz="2400" dirty="0">
+              <a:solidFill>
+                <a:schemeClr val="dk1"/>
+              </a:solidFill>
+              <a:latin typeface="Arial" pitchFamily="34" charset="0"/>
+              <a:ea typeface="Montserrat"/>
+              <a:cs typeface="Arial" pitchFamily="34" charset="0"/>
+              <a:sym typeface="Montserrat"/>
+            </a:endParaRPr>
+          </a:p>
+          <a:p>
+            <a:pPr marL="285750" indent="-285750">
+              <a:lnSpc>
+                <a:spcPct val="150000"/>
+              </a:lnSpc>
+              <a:buClr>
+                <a:schemeClr val="dk1"/>
+              </a:buClr>
+              <a:buSzPts val="3200"/>
+              <a:buFont typeface="Wingdings" panose="05000000000000000000" pitchFamily="2" charset="2"/>
+              <a:buChar char="Ø"/>
+            </a:pPr>
+            <a:r>
+              <a:rPr lang="en-US" sz="2400">
+                <a:solidFill>
+                  <a:schemeClr val="dk1"/>
+                </a:solidFill>
+                <a:latin typeface="Arial" pitchFamily="34" charset="0"/>
+                <a:ea typeface="Montserrat"/>
+                <a:cs typeface="Arial" pitchFamily="34" charset="0"/>
+                <a:sym typeface="Montserrat"/>
+                <a:hlinkClick r:id="rId5" action="ppaction://hlinksldjump"/>
+              </a:rPr>
+              <a:t>Diameter of a Binary Tree</a:t>
             </a:r>
             <a:endParaRPr lang="en-US" sz="2400" dirty="0">
               <a:solidFill>
@@ -8798,8 +8833,8 @@
           </a:p>
         </p:txBody>
       </p:sp>
-      <mc:AlternateContent xmlns:mc="http://schemas.openxmlformats.org/markup-compatibility/2006">
-        <mc:Choice xmlns:p14="http://schemas.microsoft.com/office/powerpoint/2010/main" Requires="p14">
+      <mc:AlternateContent xmlns:mc="http://schemas.openxmlformats.org/markup-compatibility/2006" xmlns:p14="http://schemas.microsoft.com/office/powerpoint/2010/main">
+        <mc:Choice Requires="p14">
           <p:contentPart p14:bwMode="auto" r:id="rId3">
             <p14:nvContentPartPr>
               <p14:cNvPr id="38" name="Ink 37">
@@ -8818,7 +8853,7 @@
             </p14:xfrm>
           </p:contentPart>
         </mc:Choice>
-        <mc:Fallback>
+        <mc:Fallback xmlns="">
           <p:pic>
             <p:nvPicPr>
               <p:cNvPr id="38" name="Ink 37">
@@ -8849,8 +8884,8 @@
           </p:pic>
         </mc:Fallback>
       </mc:AlternateContent>
-      <mc:AlternateContent xmlns:mc="http://schemas.openxmlformats.org/markup-compatibility/2006">
-        <mc:Choice xmlns:p14="http://schemas.microsoft.com/office/powerpoint/2010/main" Requires="p14">
+      <mc:AlternateContent xmlns:mc="http://schemas.openxmlformats.org/markup-compatibility/2006" xmlns:p14="http://schemas.microsoft.com/office/powerpoint/2010/main">
+        <mc:Choice Requires="p14">
           <p:contentPart p14:bwMode="auto" r:id="rId5">
             <p14:nvContentPartPr>
               <p14:cNvPr id="39" name="Ink 38">
@@ -8869,7 +8904,7 @@
             </p14:xfrm>
           </p:contentPart>
         </mc:Choice>
-        <mc:Fallback>
+        <mc:Fallback xmlns="">
           <p:pic>
             <p:nvPicPr>
               <p:cNvPr id="39" name="Ink 38">
@@ -8900,8 +8935,8 @@
           </p:pic>
         </mc:Fallback>
       </mc:AlternateContent>
-      <mc:AlternateContent xmlns:mc="http://schemas.openxmlformats.org/markup-compatibility/2006">
-        <mc:Choice xmlns:p14="http://schemas.microsoft.com/office/powerpoint/2010/main" Requires="p14">
+      <mc:AlternateContent xmlns:mc="http://schemas.openxmlformats.org/markup-compatibility/2006" xmlns:p14="http://schemas.microsoft.com/office/powerpoint/2010/main">
+        <mc:Choice Requires="p14">
           <p:contentPart p14:bwMode="auto" r:id="rId7">
             <p14:nvContentPartPr>
               <p14:cNvPr id="48" name="Ink 47">
@@ -8920,7 +8955,7 @@
             </p14:xfrm>
           </p:contentPart>
         </mc:Choice>
-        <mc:Fallback>
+        <mc:Fallback xmlns="">
           <p:pic>
             <p:nvPicPr>
               <p:cNvPr id="48" name="Ink 47">
@@ -8951,8 +8986,8 @@
           </p:pic>
         </mc:Fallback>
       </mc:AlternateContent>
-      <mc:AlternateContent xmlns:mc="http://schemas.openxmlformats.org/markup-compatibility/2006">
-        <mc:Choice xmlns:p14="http://schemas.microsoft.com/office/powerpoint/2010/main" Requires="p14">
+      <mc:AlternateContent xmlns:mc="http://schemas.openxmlformats.org/markup-compatibility/2006" xmlns:p14="http://schemas.microsoft.com/office/powerpoint/2010/main">
+        <mc:Choice Requires="p14">
           <p:contentPart p14:bwMode="auto" r:id="rId9">
             <p14:nvContentPartPr>
               <p14:cNvPr id="52" name="Ink 51">
@@ -8971,7 +9006,7 @@
             </p14:xfrm>
           </p:contentPart>
         </mc:Choice>
-        <mc:Fallback>
+        <mc:Fallback xmlns="">
           <p:pic>
             <p:nvPicPr>
               <p:cNvPr id="52" name="Ink 51">
@@ -9002,8 +9037,8 @@
           </p:pic>
         </mc:Fallback>
       </mc:AlternateContent>
-      <mc:AlternateContent xmlns:mc="http://schemas.openxmlformats.org/markup-compatibility/2006">
-        <mc:Choice xmlns:p14="http://schemas.microsoft.com/office/powerpoint/2010/main" Requires="p14">
+      <mc:AlternateContent xmlns:mc="http://schemas.openxmlformats.org/markup-compatibility/2006" xmlns:p14="http://schemas.microsoft.com/office/powerpoint/2010/main">
+        <mc:Choice Requires="p14">
           <p:contentPart p14:bwMode="auto" r:id="rId11">
             <p14:nvContentPartPr>
               <p14:cNvPr id="53" name="Ink 52">
@@ -9022,7 +9057,7 @@
             </p14:xfrm>
           </p:contentPart>
         </mc:Choice>
-        <mc:Fallback>
+        <mc:Fallback xmlns="">
           <p:pic>
             <p:nvPicPr>
               <p:cNvPr id="53" name="Ink 52">
@@ -9053,8 +9088,8 @@
           </p:pic>
         </mc:Fallback>
       </mc:AlternateContent>
-      <mc:AlternateContent xmlns:mc="http://schemas.openxmlformats.org/markup-compatibility/2006">
-        <mc:Choice xmlns:p14="http://schemas.microsoft.com/office/powerpoint/2010/main" Requires="p14">
+      <mc:AlternateContent xmlns:mc="http://schemas.openxmlformats.org/markup-compatibility/2006" xmlns:p14="http://schemas.microsoft.com/office/powerpoint/2010/main">
+        <mc:Choice Requires="p14">
           <p:contentPart p14:bwMode="auto" r:id="rId13">
             <p14:nvContentPartPr>
               <p14:cNvPr id="59" name="Ink 58">
@@ -9073,7 +9108,7 @@
             </p14:xfrm>
           </p:contentPart>
         </mc:Choice>
-        <mc:Fallback>
+        <mc:Fallback xmlns="">
           <p:pic>
             <p:nvPicPr>
               <p:cNvPr id="59" name="Ink 58">
@@ -9104,8 +9139,8 @@
           </p:pic>
         </mc:Fallback>
       </mc:AlternateContent>
-      <mc:AlternateContent xmlns:mc="http://schemas.openxmlformats.org/markup-compatibility/2006">
-        <mc:Choice xmlns:p14="http://schemas.microsoft.com/office/powerpoint/2010/main" Requires="p14">
+      <mc:AlternateContent xmlns:mc="http://schemas.openxmlformats.org/markup-compatibility/2006" xmlns:p14="http://schemas.microsoft.com/office/powerpoint/2010/main">
+        <mc:Choice Requires="p14">
           <p:contentPart p14:bwMode="auto" r:id="rId15">
             <p14:nvContentPartPr>
               <p14:cNvPr id="60" name="Ink 59">
@@ -9124,7 +9159,7 @@
             </p14:xfrm>
           </p:contentPart>
         </mc:Choice>
-        <mc:Fallback>
+        <mc:Fallback xmlns="">
           <p:pic>
             <p:nvPicPr>
               <p:cNvPr id="60" name="Ink 59">
@@ -9155,8 +9190,8 @@
           </p:pic>
         </mc:Fallback>
       </mc:AlternateContent>
-      <mc:AlternateContent xmlns:mc="http://schemas.openxmlformats.org/markup-compatibility/2006">
-        <mc:Choice xmlns:p14="http://schemas.microsoft.com/office/powerpoint/2010/main" Requires="p14">
+      <mc:AlternateContent xmlns:mc="http://schemas.openxmlformats.org/markup-compatibility/2006" xmlns:p14="http://schemas.microsoft.com/office/powerpoint/2010/main">
+        <mc:Choice Requires="p14">
           <p:contentPart p14:bwMode="auto" r:id="rId17">
             <p14:nvContentPartPr>
               <p14:cNvPr id="61" name="Ink 60">
@@ -9175,7 +9210,7 @@
             </p14:xfrm>
           </p:contentPart>
         </mc:Choice>
-        <mc:Fallback>
+        <mc:Fallback xmlns="">
           <p:pic>
             <p:nvPicPr>
               <p:cNvPr id="61" name="Ink 60">
@@ -9206,8 +9241,8 @@
           </p:pic>
         </mc:Fallback>
       </mc:AlternateContent>
-      <mc:AlternateContent xmlns:mc="http://schemas.openxmlformats.org/markup-compatibility/2006">
-        <mc:Choice xmlns:p14="http://schemas.microsoft.com/office/powerpoint/2010/main" Requires="p14">
+      <mc:AlternateContent xmlns:mc="http://schemas.openxmlformats.org/markup-compatibility/2006" xmlns:p14="http://schemas.microsoft.com/office/powerpoint/2010/main">
+        <mc:Choice Requires="p14">
           <p:contentPart p14:bwMode="auto" r:id="rId19">
             <p14:nvContentPartPr>
               <p14:cNvPr id="64" name="Ink 63">
@@ -9226,7 +9261,7 @@
             </p14:xfrm>
           </p:contentPart>
         </mc:Choice>
-        <mc:Fallback>
+        <mc:Fallback xmlns="">
           <p:pic>
             <p:nvPicPr>
               <p:cNvPr id="64" name="Ink 63">
@@ -9257,8 +9292,8 @@
           </p:pic>
         </mc:Fallback>
       </mc:AlternateContent>
-      <mc:AlternateContent xmlns:mc="http://schemas.openxmlformats.org/markup-compatibility/2006">
-        <mc:Choice xmlns:p14="http://schemas.microsoft.com/office/powerpoint/2010/main" Requires="p14">
+      <mc:AlternateContent xmlns:mc="http://schemas.openxmlformats.org/markup-compatibility/2006" xmlns:p14="http://schemas.microsoft.com/office/powerpoint/2010/main">
+        <mc:Choice Requires="p14">
           <p:contentPart p14:bwMode="auto" r:id="rId21">
             <p14:nvContentPartPr>
               <p14:cNvPr id="67" name="Ink 66">
@@ -9277,7 +9312,7 @@
             </p14:xfrm>
           </p:contentPart>
         </mc:Choice>
-        <mc:Fallback>
+        <mc:Fallback xmlns="">
           <p:pic>
             <p:nvPicPr>
               <p:cNvPr id="67" name="Ink 66">
@@ -9308,8 +9343,8 @@
           </p:pic>
         </mc:Fallback>
       </mc:AlternateContent>
-      <mc:AlternateContent xmlns:mc="http://schemas.openxmlformats.org/markup-compatibility/2006">
-        <mc:Choice xmlns:p14="http://schemas.microsoft.com/office/powerpoint/2010/main" Requires="p14">
+      <mc:AlternateContent xmlns:mc="http://schemas.openxmlformats.org/markup-compatibility/2006" xmlns:p14="http://schemas.microsoft.com/office/powerpoint/2010/main">
+        <mc:Choice Requires="p14">
           <p:contentPart p14:bwMode="auto" r:id="rId23">
             <p14:nvContentPartPr>
               <p14:cNvPr id="68" name="Ink 67">
@@ -9328,7 +9363,7 @@
             </p14:xfrm>
           </p:contentPart>
         </mc:Choice>
-        <mc:Fallback>
+        <mc:Fallback xmlns="">
           <p:pic>
             <p:nvPicPr>
               <p:cNvPr id="68" name="Ink 67">
@@ -9359,8 +9394,8 @@
           </p:pic>
         </mc:Fallback>
       </mc:AlternateContent>
-      <mc:AlternateContent xmlns:mc="http://schemas.openxmlformats.org/markup-compatibility/2006">
-        <mc:Choice xmlns:p14="http://schemas.microsoft.com/office/powerpoint/2010/main" Requires="p14">
+      <mc:AlternateContent xmlns:mc="http://schemas.openxmlformats.org/markup-compatibility/2006" xmlns:p14="http://schemas.microsoft.com/office/powerpoint/2010/main">
+        <mc:Choice Requires="p14">
           <p:contentPart p14:bwMode="auto" r:id="rId25">
             <p14:nvContentPartPr>
               <p14:cNvPr id="69" name="Ink 68">
@@ -9379,7 +9414,7 @@
             </p14:xfrm>
           </p:contentPart>
         </mc:Choice>
-        <mc:Fallback>
+        <mc:Fallback xmlns="">
           <p:pic>
             <p:nvPicPr>
               <p:cNvPr id="69" name="Ink 68">
@@ -9410,8 +9445,8 @@
           </p:pic>
         </mc:Fallback>
       </mc:AlternateContent>
-      <mc:AlternateContent xmlns:mc="http://schemas.openxmlformats.org/markup-compatibility/2006">
-        <mc:Choice xmlns:p14="http://schemas.microsoft.com/office/powerpoint/2010/main" Requires="p14">
+      <mc:AlternateContent xmlns:mc="http://schemas.openxmlformats.org/markup-compatibility/2006" xmlns:p14="http://schemas.microsoft.com/office/powerpoint/2010/main">
+        <mc:Choice Requires="p14">
           <p:contentPart p14:bwMode="auto" r:id="rId27">
             <p14:nvContentPartPr>
               <p14:cNvPr id="70" name="Ink 69">
@@ -9430,7 +9465,7 @@
             </p14:xfrm>
           </p:contentPart>
         </mc:Choice>
-        <mc:Fallback>
+        <mc:Fallback xmlns="">
           <p:pic>
             <p:nvPicPr>
               <p:cNvPr id="70" name="Ink 69">
@@ -9461,8 +9496,8 @@
           </p:pic>
         </mc:Fallback>
       </mc:AlternateContent>
-      <mc:AlternateContent xmlns:mc="http://schemas.openxmlformats.org/markup-compatibility/2006">
-        <mc:Choice xmlns:p14="http://schemas.microsoft.com/office/powerpoint/2010/main" Requires="p14">
+      <mc:AlternateContent xmlns:mc="http://schemas.openxmlformats.org/markup-compatibility/2006" xmlns:p14="http://schemas.microsoft.com/office/powerpoint/2010/main">
+        <mc:Choice Requires="p14">
           <p:contentPart p14:bwMode="auto" r:id="rId29">
             <p14:nvContentPartPr>
               <p14:cNvPr id="132" name="Ink 131">
@@ -9481,7 +9516,7 @@
             </p14:xfrm>
           </p:contentPart>
         </mc:Choice>
-        <mc:Fallback>
+        <mc:Fallback xmlns="">
           <p:pic>
             <p:nvPicPr>
               <p:cNvPr id="132" name="Ink 131">
@@ -9512,8 +9547,8 @@
           </p:pic>
         </mc:Fallback>
       </mc:AlternateContent>
-      <mc:AlternateContent xmlns:mc="http://schemas.openxmlformats.org/markup-compatibility/2006">
-        <mc:Choice xmlns:p14="http://schemas.microsoft.com/office/powerpoint/2010/main" Requires="p14">
+      <mc:AlternateContent xmlns:mc="http://schemas.openxmlformats.org/markup-compatibility/2006" xmlns:p14="http://schemas.microsoft.com/office/powerpoint/2010/main">
+        <mc:Choice Requires="p14">
           <p:contentPart p14:bwMode="auto" r:id="rId31">
             <p14:nvContentPartPr>
               <p14:cNvPr id="133" name="Ink 132">
@@ -9532,7 +9567,7 @@
             </p14:xfrm>
           </p:contentPart>
         </mc:Choice>
-        <mc:Fallback>
+        <mc:Fallback xmlns="">
           <p:pic>
             <p:nvPicPr>
               <p:cNvPr id="133" name="Ink 132">
@@ -9563,8 +9598,8 @@
           </p:pic>
         </mc:Fallback>
       </mc:AlternateContent>
-      <mc:AlternateContent xmlns:mc="http://schemas.openxmlformats.org/markup-compatibility/2006">
-        <mc:Choice xmlns:p14="http://schemas.microsoft.com/office/powerpoint/2010/main" Requires="p14">
+      <mc:AlternateContent xmlns:mc="http://schemas.openxmlformats.org/markup-compatibility/2006" xmlns:p14="http://schemas.microsoft.com/office/powerpoint/2010/main">
+        <mc:Choice Requires="p14">
           <p:contentPart p14:bwMode="auto" r:id="rId33">
             <p14:nvContentPartPr>
               <p14:cNvPr id="138" name="Ink 137">
@@ -9583,7 +9618,7 @@
             </p14:xfrm>
           </p:contentPart>
         </mc:Choice>
-        <mc:Fallback>
+        <mc:Fallback xmlns="">
           <p:pic>
             <p:nvPicPr>
               <p:cNvPr id="138" name="Ink 137">
@@ -9614,8 +9649,8 @@
           </p:pic>
         </mc:Fallback>
       </mc:AlternateContent>
-      <mc:AlternateContent xmlns:mc="http://schemas.openxmlformats.org/markup-compatibility/2006">
-        <mc:Choice xmlns:p14="http://schemas.microsoft.com/office/powerpoint/2010/main" Requires="p14">
+      <mc:AlternateContent xmlns:mc="http://schemas.openxmlformats.org/markup-compatibility/2006" xmlns:p14="http://schemas.microsoft.com/office/powerpoint/2010/main">
+        <mc:Choice Requires="p14">
           <p:contentPart p14:bwMode="auto" r:id="rId35">
             <p14:nvContentPartPr>
               <p14:cNvPr id="142" name="Ink 141">
@@ -9634,7 +9669,7 @@
             </p14:xfrm>
           </p:contentPart>
         </mc:Choice>
-        <mc:Fallback>
+        <mc:Fallback xmlns="">
           <p:pic>
             <p:nvPicPr>
               <p:cNvPr id="142" name="Ink 141">
@@ -9665,8 +9700,8 @@
           </p:pic>
         </mc:Fallback>
       </mc:AlternateContent>
-      <mc:AlternateContent xmlns:mc="http://schemas.openxmlformats.org/markup-compatibility/2006">
-        <mc:Choice xmlns:p14="http://schemas.microsoft.com/office/powerpoint/2010/main" Requires="p14">
+      <mc:AlternateContent xmlns:mc="http://schemas.openxmlformats.org/markup-compatibility/2006" xmlns:p14="http://schemas.microsoft.com/office/powerpoint/2010/main">
+        <mc:Choice Requires="p14">
           <p:contentPart p14:bwMode="auto" r:id="rId37">
             <p14:nvContentPartPr>
               <p14:cNvPr id="145" name="Ink 144">
@@ -9685,7 +9720,7 @@
             </p14:xfrm>
           </p:contentPart>
         </mc:Choice>
-        <mc:Fallback>
+        <mc:Fallback xmlns="">
           <p:pic>
             <p:nvPicPr>
               <p:cNvPr id="145" name="Ink 144">
@@ -9716,8 +9751,8 @@
           </p:pic>
         </mc:Fallback>
       </mc:AlternateContent>
-      <mc:AlternateContent xmlns:mc="http://schemas.openxmlformats.org/markup-compatibility/2006">
-        <mc:Choice xmlns:p14="http://schemas.microsoft.com/office/powerpoint/2010/main" Requires="p14">
+      <mc:AlternateContent xmlns:mc="http://schemas.openxmlformats.org/markup-compatibility/2006" xmlns:p14="http://schemas.microsoft.com/office/powerpoint/2010/main">
+        <mc:Choice Requires="p14">
           <p:contentPart p14:bwMode="auto" r:id="rId39">
             <p14:nvContentPartPr>
               <p14:cNvPr id="148" name="Ink 147">
@@ -9736,7 +9771,7 @@
             </p14:xfrm>
           </p:contentPart>
         </mc:Choice>
-        <mc:Fallback>
+        <mc:Fallback xmlns="">
           <p:pic>
             <p:nvPicPr>
               <p:cNvPr id="148" name="Ink 147">
@@ -9767,8 +9802,8 @@
           </p:pic>
         </mc:Fallback>
       </mc:AlternateContent>
-      <mc:AlternateContent xmlns:mc="http://schemas.openxmlformats.org/markup-compatibility/2006">
-        <mc:Choice xmlns:p14="http://schemas.microsoft.com/office/powerpoint/2010/main" Requires="p14">
+      <mc:AlternateContent xmlns:mc="http://schemas.openxmlformats.org/markup-compatibility/2006" xmlns:p14="http://schemas.microsoft.com/office/powerpoint/2010/main">
+        <mc:Choice Requires="p14">
           <p:contentPart p14:bwMode="auto" r:id="rId41">
             <p14:nvContentPartPr>
               <p14:cNvPr id="149" name="Ink 148">
@@ -9787,7 +9822,7 @@
             </p14:xfrm>
           </p:contentPart>
         </mc:Choice>
-        <mc:Fallback>
+        <mc:Fallback xmlns="">
           <p:pic>
             <p:nvPicPr>
               <p:cNvPr id="149" name="Ink 148">
@@ -9818,8 +9853,8 @@
           </p:pic>
         </mc:Fallback>
       </mc:AlternateContent>
-      <mc:AlternateContent xmlns:mc="http://schemas.openxmlformats.org/markup-compatibility/2006">
-        <mc:Choice xmlns:p14="http://schemas.microsoft.com/office/powerpoint/2010/main" Requires="p14">
+      <mc:AlternateContent xmlns:mc="http://schemas.openxmlformats.org/markup-compatibility/2006" xmlns:p14="http://schemas.microsoft.com/office/powerpoint/2010/main">
+        <mc:Choice Requires="p14">
           <p:contentPart p14:bwMode="auto" r:id="rId43">
             <p14:nvContentPartPr>
               <p14:cNvPr id="150" name="Ink 149">
@@ -9838,7 +9873,7 @@
             </p14:xfrm>
           </p:contentPart>
         </mc:Choice>
-        <mc:Fallback>
+        <mc:Fallback xmlns="">
           <p:pic>
             <p:nvPicPr>
               <p:cNvPr id="150" name="Ink 149">
@@ -9869,8 +9904,8 @@
           </p:pic>
         </mc:Fallback>
       </mc:AlternateContent>
-      <mc:AlternateContent xmlns:mc="http://schemas.openxmlformats.org/markup-compatibility/2006">
-        <mc:Choice xmlns:p14="http://schemas.microsoft.com/office/powerpoint/2010/main" Requires="p14">
+      <mc:AlternateContent xmlns:mc="http://schemas.openxmlformats.org/markup-compatibility/2006" xmlns:p14="http://schemas.microsoft.com/office/powerpoint/2010/main">
+        <mc:Choice Requires="p14">
           <p:contentPart p14:bwMode="auto" r:id="rId45">
             <p14:nvContentPartPr>
               <p14:cNvPr id="154" name="Ink 153">
@@ -9889,7 +9924,7 @@
             </p14:xfrm>
           </p:contentPart>
         </mc:Choice>
-        <mc:Fallback>
+        <mc:Fallback xmlns="">
           <p:pic>
             <p:nvPicPr>
               <p:cNvPr id="154" name="Ink 153">
@@ -10023,8 +10058,8 @@
           </a:p>
         </p:txBody>
       </p:sp>
-      <mc:AlternateContent xmlns:mc="http://schemas.openxmlformats.org/markup-compatibility/2006">
-        <mc:Choice xmlns:p14="http://schemas.microsoft.com/office/powerpoint/2010/main" Requires="p14">
+      <mc:AlternateContent xmlns:mc="http://schemas.openxmlformats.org/markup-compatibility/2006" xmlns:p14="http://schemas.microsoft.com/office/powerpoint/2010/main">
+        <mc:Choice Requires="p14">
           <p:contentPart p14:bwMode="auto" r:id="rId3">
             <p14:nvContentPartPr>
               <p14:cNvPr id="6" name="Ink 5">
@@ -10043,7 +10078,7 @@
             </p14:xfrm>
           </p:contentPart>
         </mc:Choice>
-        <mc:Fallback>
+        <mc:Fallback xmlns="">
           <p:pic>
             <p:nvPicPr>
               <p:cNvPr id="6" name="Ink 5">
@@ -10074,8 +10109,8 @@
           </p:pic>
         </mc:Fallback>
       </mc:AlternateContent>
-      <mc:AlternateContent xmlns:mc="http://schemas.openxmlformats.org/markup-compatibility/2006">
-        <mc:Choice xmlns:p14="http://schemas.microsoft.com/office/powerpoint/2010/main" Requires="p14">
+      <mc:AlternateContent xmlns:mc="http://schemas.openxmlformats.org/markup-compatibility/2006" xmlns:p14="http://schemas.microsoft.com/office/powerpoint/2010/main">
+        <mc:Choice Requires="p14">
           <p:contentPart p14:bwMode="auto" r:id="rId5">
             <p14:nvContentPartPr>
               <p14:cNvPr id="42" name="Ink 41">
@@ -10094,7 +10129,7 @@
             </p14:xfrm>
           </p:contentPart>
         </mc:Choice>
-        <mc:Fallback>
+        <mc:Fallback xmlns="">
           <p:pic>
             <p:nvPicPr>
               <p:cNvPr id="42" name="Ink 41">
@@ -10125,8 +10160,8 @@
           </p:pic>
         </mc:Fallback>
       </mc:AlternateContent>
-      <mc:AlternateContent xmlns:mc="http://schemas.openxmlformats.org/markup-compatibility/2006">
-        <mc:Choice xmlns:p14="http://schemas.microsoft.com/office/powerpoint/2010/main" Requires="p14">
+      <mc:AlternateContent xmlns:mc="http://schemas.openxmlformats.org/markup-compatibility/2006" xmlns:p14="http://schemas.microsoft.com/office/powerpoint/2010/main">
+        <mc:Choice Requires="p14">
           <p:contentPart p14:bwMode="auto" r:id="rId7">
             <p14:nvContentPartPr>
               <p14:cNvPr id="46" name="Ink 45">
@@ -10145,7 +10180,7 @@
             </p14:xfrm>
           </p:contentPart>
         </mc:Choice>
-        <mc:Fallback>
+        <mc:Fallback xmlns="">
           <p:pic>
             <p:nvPicPr>
               <p:cNvPr id="46" name="Ink 45">
@@ -10176,8 +10211,8 @@
           </p:pic>
         </mc:Fallback>
       </mc:AlternateContent>
-      <mc:AlternateContent xmlns:mc="http://schemas.openxmlformats.org/markup-compatibility/2006">
-        <mc:Choice xmlns:p14="http://schemas.microsoft.com/office/powerpoint/2010/main" Requires="p14">
+      <mc:AlternateContent xmlns:mc="http://schemas.openxmlformats.org/markup-compatibility/2006" xmlns:p14="http://schemas.microsoft.com/office/powerpoint/2010/main">
+        <mc:Choice Requires="p14">
           <p:contentPart p14:bwMode="auto" r:id="rId9">
             <p14:nvContentPartPr>
               <p14:cNvPr id="47" name="Ink 46">
@@ -10196,7 +10231,7 @@
             </p14:xfrm>
           </p:contentPart>
         </mc:Choice>
-        <mc:Fallback>
+        <mc:Fallback xmlns="">
           <p:pic>
             <p:nvPicPr>
               <p:cNvPr id="47" name="Ink 46">
@@ -10227,8 +10262,8 @@
           </p:pic>
         </mc:Fallback>
       </mc:AlternateContent>
-      <mc:AlternateContent xmlns:mc="http://schemas.openxmlformats.org/markup-compatibility/2006">
-        <mc:Choice xmlns:p14="http://schemas.microsoft.com/office/powerpoint/2010/main" Requires="p14">
+      <mc:AlternateContent xmlns:mc="http://schemas.openxmlformats.org/markup-compatibility/2006" xmlns:p14="http://schemas.microsoft.com/office/powerpoint/2010/main">
+        <mc:Choice Requires="p14">
           <p:contentPart p14:bwMode="auto" r:id="rId11">
             <p14:nvContentPartPr>
               <p14:cNvPr id="48" name="Ink 47">
@@ -10247,7 +10282,7 @@
             </p14:xfrm>
           </p:contentPart>
         </mc:Choice>
-        <mc:Fallback>
+        <mc:Fallback xmlns="">
           <p:pic>
             <p:nvPicPr>
               <p:cNvPr id="48" name="Ink 47">
@@ -10278,8 +10313,8 @@
           </p:pic>
         </mc:Fallback>
       </mc:AlternateContent>
-      <mc:AlternateContent xmlns:mc="http://schemas.openxmlformats.org/markup-compatibility/2006">
-        <mc:Choice xmlns:p14="http://schemas.microsoft.com/office/powerpoint/2010/main" Requires="p14">
+      <mc:AlternateContent xmlns:mc="http://schemas.openxmlformats.org/markup-compatibility/2006" xmlns:p14="http://schemas.microsoft.com/office/powerpoint/2010/main">
+        <mc:Choice Requires="p14">
           <p:contentPart p14:bwMode="auto" r:id="rId13">
             <p14:nvContentPartPr>
               <p14:cNvPr id="74" name="Ink 73">
@@ -10298,7 +10333,7 @@
             </p14:xfrm>
           </p:contentPart>
         </mc:Choice>
-        <mc:Fallback>
+        <mc:Fallback xmlns="">
           <p:pic>
             <p:nvPicPr>
               <p:cNvPr id="74" name="Ink 73">
@@ -10329,8 +10364,8 @@
           </p:pic>
         </mc:Fallback>
       </mc:AlternateContent>
-      <mc:AlternateContent xmlns:mc="http://schemas.openxmlformats.org/markup-compatibility/2006">
-        <mc:Choice xmlns:p14="http://schemas.microsoft.com/office/powerpoint/2010/main" Requires="p14">
+      <mc:AlternateContent xmlns:mc="http://schemas.openxmlformats.org/markup-compatibility/2006" xmlns:p14="http://schemas.microsoft.com/office/powerpoint/2010/main">
+        <mc:Choice Requires="p14">
           <p:contentPart p14:bwMode="auto" r:id="rId15">
             <p14:nvContentPartPr>
               <p14:cNvPr id="82" name="Ink 81">
@@ -10349,7 +10384,7 @@
             </p14:xfrm>
           </p:contentPart>
         </mc:Choice>
-        <mc:Fallback>
+        <mc:Fallback xmlns="">
           <p:pic>
             <p:nvPicPr>
               <p:cNvPr id="82" name="Ink 81">
@@ -10380,8 +10415,8 @@
           </p:pic>
         </mc:Fallback>
       </mc:AlternateContent>
-      <mc:AlternateContent xmlns:mc="http://schemas.openxmlformats.org/markup-compatibility/2006">
-        <mc:Choice xmlns:p14="http://schemas.microsoft.com/office/powerpoint/2010/main" Requires="p14">
+      <mc:AlternateContent xmlns:mc="http://schemas.openxmlformats.org/markup-compatibility/2006" xmlns:p14="http://schemas.microsoft.com/office/powerpoint/2010/main">
+        <mc:Choice Requires="p14">
           <p:contentPart p14:bwMode="auto" r:id="rId17">
             <p14:nvContentPartPr>
               <p14:cNvPr id="83" name="Ink 82">
@@ -10400,7 +10435,7 @@
             </p14:xfrm>
           </p:contentPart>
         </mc:Choice>
-        <mc:Fallback>
+        <mc:Fallback xmlns="">
           <p:pic>
             <p:nvPicPr>
               <p:cNvPr id="83" name="Ink 82">
@@ -10431,8 +10466,8 @@
           </p:pic>
         </mc:Fallback>
       </mc:AlternateContent>
-      <mc:AlternateContent xmlns:mc="http://schemas.openxmlformats.org/markup-compatibility/2006">
-        <mc:Choice xmlns:p14="http://schemas.microsoft.com/office/powerpoint/2010/main" Requires="p14">
+      <mc:AlternateContent xmlns:mc="http://schemas.openxmlformats.org/markup-compatibility/2006" xmlns:p14="http://schemas.microsoft.com/office/powerpoint/2010/main">
+        <mc:Choice Requires="p14">
           <p:contentPart p14:bwMode="auto" r:id="rId19">
             <p14:nvContentPartPr>
               <p14:cNvPr id="84" name="Ink 83">
@@ -10451,7 +10486,7 @@
             </p14:xfrm>
           </p:contentPart>
         </mc:Choice>
-        <mc:Fallback>
+        <mc:Fallback xmlns="">
           <p:pic>
             <p:nvPicPr>
               <p:cNvPr id="84" name="Ink 83">
@@ -10482,8 +10517,8 @@
           </p:pic>
         </mc:Fallback>
       </mc:AlternateContent>
-      <mc:AlternateContent xmlns:mc="http://schemas.openxmlformats.org/markup-compatibility/2006">
-        <mc:Choice xmlns:p14="http://schemas.microsoft.com/office/powerpoint/2010/main" Requires="p14">
+      <mc:AlternateContent xmlns:mc="http://schemas.openxmlformats.org/markup-compatibility/2006" xmlns:p14="http://schemas.microsoft.com/office/powerpoint/2010/main">
+        <mc:Choice Requires="p14">
           <p:contentPart p14:bwMode="auto" r:id="rId21">
             <p14:nvContentPartPr>
               <p14:cNvPr id="107" name="Ink 106">
@@ -10502,7 +10537,7 @@
             </p14:xfrm>
           </p:contentPart>
         </mc:Choice>
-        <mc:Fallback>
+        <mc:Fallback xmlns="">
           <p:pic>
             <p:nvPicPr>
               <p:cNvPr id="107" name="Ink 106">
@@ -10533,8 +10568,8 @@
           </p:pic>
         </mc:Fallback>
       </mc:AlternateContent>
-      <mc:AlternateContent xmlns:mc="http://schemas.openxmlformats.org/markup-compatibility/2006">
-        <mc:Choice xmlns:p14="http://schemas.microsoft.com/office/powerpoint/2010/main" Requires="p14">
+      <mc:AlternateContent xmlns:mc="http://schemas.openxmlformats.org/markup-compatibility/2006" xmlns:p14="http://schemas.microsoft.com/office/powerpoint/2010/main">
+        <mc:Choice Requires="p14">
           <p:contentPart p14:bwMode="auto" r:id="rId23">
             <p14:nvContentPartPr>
               <p14:cNvPr id="118" name="Ink 117">
@@ -10553,7 +10588,7 @@
             </p14:xfrm>
           </p:contentPart>
         </mc:Choice>
-        <mc:Fallback>
+        <mc:Fallback xmlns="">
           <p:pic>
             <p:nvPicPr>
               <p:cNvPr id="118" name="Ink 117">
@@ -10584,8 +10619,8 @@
           </p:pic>
         </mc:Fallback>
       </mc:AlternateContent>
-      <mc:AlternateContent xmlns:mc="http://schemas.openxmlformats.org/markup-compatibility/2006">
-        <mc:Choice xmlns:p14="http://schemas.microsoft.com/office/powerpoint/2010/main" Requires="p14">
+      <mc:AlternateContent xmlns:mc="http://schemas.openxmlformats.org/markup-compatibility/2006" xmlns:p14="http://schemas.microsoft.com/office/powerpoint/2010/main">
+        <mc:Choice Requires="p14">
           <p:contentPart p14:bwMode="auto" r:id="rId25">
             <p14:nvContentPartPr>
               <p14:cNvPr id="122" name="Ink 121">
@@ -10604,7 +10639,7 @@
             </p14:xfrm>
           </p:contentPart>
         </mc:Choice>
-        <mc:Fallback>
+        <mc:Fallback xmlns="">
           <p:pic>
             <p:nvPicPr>
               <p:cNvPr id="122" name="Ink 121">
@@ -10635,8 +10670,8 @@
           </p:pic>
         </mc:Fallback>
       </mc:AlternateContent>
-      <mc:AlternateContent xmlns:mc="http://schemas.openxmlformats.org/markup-compatibility/2006">
-        <mc:Choice xmlns:p14="http://schemas.microsoft.com/office/powerpoint/2010/main" Requires="p14">
+      <mc:AlternateContent xmlns:mc="http://schemas.openxmlformats.org/markup-compatibility/2006" xmlns:p14="http://schemas.microsoft.com/office/powerpoint/2010/main">
+        <mc:Choice Requires="p14">
           <p:contentPart p14:bwMode="auto" r:id="rId27">
             <p14:nvContentPartPr>
               <p14:cNvPr id="128" name="Ink 127">
@@ -10655,7 +10690,7 @@
             </p14:xfrm>
           </p:contentPart>
         </mc:Choice>
-        <mc:Fallback>
+        <mc:Fallback xmlns="">
           <p:pic>
             <p:nvPicPr>
               <p:cNvPr id="128" name="Ink 127">
@@ -10686,8 +10721,8 @@
           </p:pic>
         </mc:Fallback>
       </mc:AlternateContent>
-      <mc:AlternateContent xmlns:mc="http://schemas.openxmlformats.org/markup-compatibility/2006">
-        <mc:Choice xmlns:p14="http://schemas.microsoft.com/office/powerpoint/2010/main" Requires="p14">
+      <mc:AlternateContent xmlns:mc="http://schemas.openxmlformats.org/markup-compatibility/2006" xmlns:p14="http://schemas.microsoft.com/office/powerpoint/2010/main">
+        <mc:Choice Requires="p14">
           <p:contentPart p14:bwMode="auto" r:id="rId29">
             <p14:nvContentPartPr>
               <p14:cNvPr id="137" name="Ink 136">
@@ -10706,7 +10741,7 @@
             </p14:xfrm>
           </p:contentPart>
         </mc:Choice>
-        <mc:Fallback>
+        <mc:Fallback xmlns="">
           <p:pic>
             <p:nvPicPr>
               <p:cNvPr id="137" name="Ink 136">
@@ -10737,8 +10772,8 @@
           </p:pic>
         </mc:Fallback>
       </mc:AlternateContent>
-      <mc:AlternateContent xmlns:mc="http://schemas.openxmlformats.org/markup-compatibility/2006">
-        <mc:Choice xmlns:p14="http://schemas.microsoft.com/office/powerpoint/2010/main" Requires="p14">
+      <mc:AlternateContent xmlns:mc="http://schemas.openxmlformats.org/markup-compatibility/2006" xmlns:p14="http://schemas.microsoft.com/office/powerpoint/2010/main">
+        <mc:Choice Requires="p14">
           <p:contentPart p14:bwMode="auto" r:id="rId31">
             <p14:nvContentPartPr>
               <p14:cNvPr id="150" name="Ink 149">
@@ -10757,7 +10792,7 @@
             </p14:xfrm>
           </p:contentPart>
         </mc:Choice>
-        <mc:Fallback>
+        <mc:Fallback xmlns="">
           <p:pic>
             <p:nvPicPr>
               <p:cNvPr id="150" name="Ink 149">
@@ -10788,8 +10823,8 @@
           </p:pic>
         </mc:Fallback>
       </mc:AlternateContent>
-      <mc:AlternateContent xmlns:mc="http://schemas.openxmlformats.org/markup-compatibility/2006">
-        <mc:Choice xmlns:p14="http://schemas.microsoft.com/office/powerpoint/2010/main" Requires="p14">
+      <mc:AlternateContent xmlns:mc="http://schemas.openxmlformats.org/markup-compatibility/2006" xmlns:p14="http://schemas.microsoft.com/office/powerpoint/2010/main">
+        <mc:Choice Requires="p14">
           <p:contentPart p14:bwMode="auto" r:id="rId33">
             <p14:nvContentPartPr>
               <p14:cNvPr id="151" name="Ink 150">
@@ -10808,7 +10843,7 @@
             </p14:xfrm>
           </p:contentPart>
         </mc:Choice>
-        <mc:Fallback>
+        <mc:Fallback xmlns="">
           <p:pic>
             <p:nvPicPr>
               <p:cNvPr id="151" name="Ink 150">
@@ -10839,8 +10874,8 @@
           </p:pic>
         </mc:Fallback>
       </mc:AlternateContent>
-      <mc:AlternateContent xmlns:mc="http://schemas.openxmlformats.org/markup-compatibility/2006">
-        <mc:Choice xmlns:p14="http://schemas.microsoft.com/office/powerpoint/2010/main" Requires="p14">
+      <mc:AlternateContent xmlns:mc="http://schemas.openxmlformats.org/markup-compatibility/2006" xmlns:p14="http://schemas.microsoft.com/office/powerpoint/2010/main">
+        <mc:Choice Requires="p14">
           <p:contentPart p14:bwMode="auto" r:id="rId35">
             <p14:nvContentPartPr>
               <p14:cNvPr id="159" name="Ink 158">
@@ -10859,7 +10894,7 @@
             </p14:xfrm>
           </p:contentPart>
         </mc:Choice>
-        <mc:Fallback>
+        <mc:Fallback xmlns="">
           <p:pic>
             <p:nvPicPr>
               <p:cNvPr id="159" name="Ink 158">
@@ -10890,8 +10925,8 @@
           </p:pic>
         </mc:Fallback>
       </mc:AlternateContent>
-      <mc:AlternateContent xmlns:mc="http://schemas.openxmlformats.org/markup-compatibility/2006">
-        <mc:Choice xmlns:p14="http://schemas.microsoft.com/office/powerpoint/2010/main" Requires="p14">
+      <mc:AlternateContent xmlns:mc="http://schemas.openxmlformats.org/markup-compatibility/2006" xmlns:p14="http://schemas.microsoft.com/office/powerpoint/2010/main">
+        <mc:Choice Requires="p14">
           <p:contentPart p14:bwMode="auto" r:id="rId37">
             <p14:nvContentPartPr>
               <p14:cNvPr id="181" name="Ink 180">
@@ -10910,7 +10945,7 @@
             </p14:xfrm>
           </p:contentPart>
         </mc:Choice>
-        <mc:Fallback>
+        <mc:Fallback xmlns="">
           <p:pic>
             <p:nvPicPr>
               <p:cNvPr id="181" name="Ink 180">
@@ -10941,8 +10976,8 @@
           </p:pic>
         </mc:Fallback>
       </mc:AlternateContent>
-      <mc:AlternateContent xmlns:mc="http://schemas.openxmlformats.org/markup-compatibility/2006">
-        <mc:Choice xmlns:p14="http://schemas.microsoft.com/office/powerpoint/2010/main" Requires="p14">
+      <mc:AlternateContent xmlns:mc="http://schemas.openxmlformats.org/markup-compatibility/2006" xmlns:p14="http://schemas.microsoft.com/office/powerpoint/2010/main">
+        <mc:Choice Requires="p14">
           <p:contentPart p14:bwMode="auto" r:id="rId39">
             <p14:nvContentPartPr>
               <p14:cNvPr id="183" name="Ink 182">
@@ -10961,7 +10996,7 @@
             </p14:xfrm>
           </p:contentPart>
         </mc:Choice>
-        <mc:Fallback>
+        <mc:Fallback xmlns="">
           <p:pic>
             <p:nvPicPr>
               <p:cNvPr id="183" name="Ink 182">
@@ -10992,8 +11027,8 @@
           </p:pic>
         </mc:Fallback>
       </mc:AlternateContent>
-      <mc:AlternateContent xmlns:mc="http://schemas.openxmlformats.org/markup-compatibility/2006">
-        <mc:Choice xmlns:p14="http://schemas.microsoft.com/office/powerpoint/2010/main" Requires="p14">
+      <mc:AlternateContent xmlns:mc="http://schemas.openxmlformats.org/markup-compatibility/2006" xmlns:p14="http://schemas.microsoft.com/office/powerpoint/2010/main">
+        <mc:Choice Requires="p14">
           <p:contentPart p14:bwMode="auto" r:id="rId41">
             <p14:nvContentPartPr>
               <p14:cNvPr id="184" name="Ink 183">
@@ -11012,7 +11047,7 @@
             </p14:xfrm>
           </p:contentPart>
         </mc:Choice>
-        <mc:Fallback>
+        <mc:Fallback xmlns="">
           <p:pic>
             <p:nvPicPr>
               <p:cNvPr id="184" name="Ink 183">
@@ -11145,8 +11180,8 @@
           </a:p>
         </p:txBody>
       </p:sp>
-      <mc:AlternateContent xmlns:mc="http://schemas.openxmlformats.org/markup-compatibility/2006">
-        <mc:Choice xmlns:p14="http://schemas.microsoft.com/office/powerpoint/2010/main" Requires="p14">
+      <mc:AlternateContent xmlns:mc="http://schemas.openxmlformats.org/markup-compatibility/2006" xmlns:p14="http://schemas.microsoft.com/office/powerpoint/2010/main">
+        <mc:Choice Requires="p14">
           <p:contentPart p14:bwMode="auto" r:id="rId3">
             <p14:nvContentPartPr>
               <p14:cNvPr id="183" name="Ink 182">
@@ -11165,7 +11200,7 @@
             </p14:xfrm>
           </p:contentPart>
         </mc:Choice>
-        <mc:Fallback>
+        <mc:Fallback xmlns="">
           <p:pic>
             <p:nvPicPr>
               <p:cNvPr id="183" name="Ink 182">
@@ -11254,8 +11289,8 @@
           </a:p>
         </p:txBody>
       </p:sp>
-      <mc:AlternateContent xmlns:mc="http://schemas.openxmlformats.org/markup-compatibility/2006">
-        <mc:Choice xmlns:p14="http://schemas.microsoft.com/office/powerpoint/2010/main" Requires="p14">
+      <mc:AlternateContent xmlns:mc="http://schemas.openxmlformats.org/markup-compatibility/2006" xmlns:p14="http://schemas.microsoft.com/office/powerpoint/2010/main">
+        <mc:Choice Requires="p14">
           <p:contentPart p14:bwMode="auto" r:id="rId2">
             <p14:nvContentPartPr>
               <p14:cNvPr id="17" name="Ink 16">
@@ -11274,7 +11309,7 @@
             </p14:xfrm>
           </p:contentPart>
         </mc:Choice>
-        <mc:Fallback>
+        <mc:Fallback xmlns="">
           <p:pic>
             <p:nvPicPr>
               <p:cNvPr id="17" name="Ink 16">
@@ -11305,8 +11340,8 @@
           </p:pic>
         </mc:Fallback>
       </mc:AlternateContent>
-      <mc:AlternateContent xmlns:mc="http://schemas.openxmlformats.org/markup-compatibility/2006">
-        <mc:Choice xmlns:p14="http://schemas.microsoft.com/office/powerpoint/2010/main" Requires="p14">
+      <mc:AlternateContent xmlns:mc="http://schemas.openxmlformats.org/markup-compatibility/2006" xmlns:p14="http://schemas.microsoft.com/office/powerpoint/2010/main">
+        <mc:Choice Requires="p14">
           <p:contentPart p14:bwMode="auto" r:id="rId4">
             <p14:nvContentPartPr>
               <p14:cNvPr id="18" name="Ink 17">
@@ -11325,7 +11360,7 @@
             </p14:xfrm>
           </p:contentPart>
         </mc:Choice>
-        <mc:Fallback>
+        <mc:Fallback xmlns="">
           <p:pic>
             <p:nvPicPr>
               <p:cNvPr id="18" name="Ink 17">
@@ -11356,8 +11391,8 @@
           </p:pic>
         </mc:Fallback>
       </mc:AlternateContent>
-      <mc:AlternateContent xmlns:mc="http://schemas.openxmlformats.org/markup-compatibility/2006">
-        <mc:Choice xmlns:p14="http://schemas.microsoft.com/office/powerpoint/2010/main" Requires="p14">
+      <mc:AlternateContent xmlns:mc="http://schemas.openxmlformats.org/markup-compatibility/2006" xmlns:p14="http://schemas.microsoft.com/office/powerpoint/2010/main">
+        <mc:Choice Requires="p14">
           <p:contentPart p14:bwMode="auto" r:id="rId6">
             <p14:nvContentPartPr>
               <p14:cNvPr id="23" name="Ink 22">
@@ -11376,7 +11411,7 @@
             </p14:xfrm>
           </p:contentPart>
         </mc:Choice>
-        <mc:Fallback>
+        <mc:Fallback xmlns="">
           <p:pic>
             <p:nvPicPr>
               <p:cNvPr id="23" name="Ink 22">
@@ -11407,8 +11442,8 @@
           </p:pic>
         </mc:Fallback>
       </mc:AlternateContent>
-      <mc:AlternateContent xmlns:mc="http://schemas.openxmlformats.org/markup-compatibility/2006">
-        <mc:Choice xmlns:p14="http://schemas.microsoft.com/office/powerpoint/2010/main" Requires="p14">
+      <mc:AlternateContent xmlns:mc="http://schemas.openxmlformats.org/markup-compatibility/2006" xmlns:p14="http://schemas.microsoft.com/office/powerpoint/2010/main">
+        <mc:Choice Requires="p14">
           <p:contentPart p14:bwMode="auto" r:id="rId8">
             <p14:nvContentPartPr>
               <p14:cNvPr id="52" name="Ink 51">
@@ -11427,7 +11462,7 @@
             </p14:xfrm>
           </p:contentPart>
         </mc:Choice>
-        <mc:Fallback>
+        <mc:Fallback xmlns="">
           <p:pic>
             <p:nvPicPr>
               <p:cNvPr id="52" name="Ink 51">
@@ -11458,8 +11493,8 @@
           </p:pic>
         </mc:Fallback>
       </mc:AlternateContent>
-      <mc:AlternateContent xmlns:mc="http://schemas.openxmlformats.org/markup-compatibility/2006">
-        <mc:Choice xmlns:p14="http://schemas.microsoft.com/office/powerpoint/2010/main" Requires="p14">
+      <mc:AlternateContent xmlns:mc="http://schemas.openxmlformats.org/markup-compatibility/2006" xmlns:p14="http://schemas.microsoft.com/office/powerpoint/2010/main">
+        <mc:Choice Requires="p14">
           <p:contentPart p14:bwMode="auto" r:id="rId10">
             <p14:nvContentPartPr>
               <p14:cNvPr id="53" name="Ink 52">
@@ -11478,7 +11513,7 @@
             </p14:xfrm>
           </p:contentPart>
         </mc:Choice>
-        <mc:Fallback>
+        <mc:Fallback xmlns="">
           <p:pic>
             <p:nvPicPr>
               <p:cNvPr id="53" name="Ink 52">
@@ -11509,8 +11544,8 @@
           </p:pic>
         </mc:Fallback>
       </mc:AlternateContent>
-      <mc:AlternateContent xmlns:mc="http://schemas.openxmlformats.org/markup-compatibility/2006">
-        <mc:Choice xmlns:p14="http://schemas.microsoft.com/office/powerpoint/2010/main" Requires="p14">
+      <mc:AlternateContent xmlns:mc="http://schemas.openxmlformats.org/markup-compatibility/2006" xmlns:p14="http://schemas.microsoft.com/office/powerpoint/2010/main">
+        <mc:Choice Requires="p14">
           <p:contentPart p14:bwMode="auto" r:id="rId12">
             <p14:nvContentPartPr>
               <p14:cNvPr id="56" name="Ink 55">
@@ -11529,7 +11564,7 @@
             </p14:xfrm>
           </p:contentPart>
         </mc:Choice>
-        <mc:Fallback>
+        <mc:Fallback xmlns="">
           <p:pic>
             <p:nvPicPr>
               <p:cNvPr id="56" name="Ink 55">
@@ -11560,8 +11595,8 @@
           </p:pic>
         </mc:Fallback>
       </mc:AlternateContent>
-      <mc:AlternateContent xmlns:mc="http://schemas.openxmlformats.org/markup-compatibility/2006">
-        <mc:Choice xmlns:p14="http://schemas.microsoft.com/office/powerpoint/2010/main" Requires="p14">
+      <mc:AlternateContent xmlns:mc="http://schemas.openxmlformats.org/markup-compatibility/2006" xmlns:p14="http://schemas.microsoft.com/office/powerpoint/2010/main">
+        <mc:Choice Requires="p14">
           <p:contentPart p14:bwMode="auto" r:id="rId14">
             <p14:nvContentPartPr>
               <p14:cNvPr id="61" name="Ink 60">
@@ -11580,7 +11615,7 @@
             </p14:xfrm>
           </p:contentPart>
         </mc:Choice>
-        <mc:Fallback>
+        <mc:Fallback xmlns="">
           <p:pic>
             <p:nvPicPr>
               <p:cNvPr id="61" name="Ink 60">
@@ -11611,8 +11646,8 @@
           </p:pic>
         </mc:Fallback>
       </mc:AlternateContent>
-      <mc:AlternateContent xmlns:mc="http://schemas.openxmlformats.org/markup-compatibility/2006">
-        <mc:Choice xmlns:p14="http://schemas.microsoft.com/office/powerpoint/2010/main" Requires="p14">
+      <mc:AlternateContent xmlns:mc="http://schemas.openxmlformats.org/markup-compatibility/2006" xmlns:p14="http://schemas.microsoft.com/office/powerpoint/2010/main">
+        <mc:Choice Requires="p14">
           <p:contentPart p14:bwMode="auto" r:id="rId16">
             <p14:nvContentPartPr>
               <p14:cNvPr id="65" name="Ink 64">
@@ -11631,7 +11666,7 @@
             </p14:xfrm>
           </p:contentPart>
         </mc:Choice>
-        <mc:Fallback>
+        <mc:Fallback xmlns="">
           <p:pic>
             <p:nvPicPr>
               <p:cNvPr id="65" name="Ink 64">
@@ -11662,8 +11697,8 @@
           </p:pic>
         </mc:Fallback>
       </mc:AlternateContent>
-      <mc:AlternateContent xmlns:mc="http://schemas.openxmlformats.org/markup-compatibility/2006">
-        <mc:Choice xmlns:p14="http://schemas.microsoft.com/office/powerpoint/2010/main" Requires="p14">
+      <mc:AlternateContent xmlns:mc="http://schemas.openxmlformats.org/markup-compatibility/2006" xmlns:p14="http://schemas.microsoft.com/office/powerpoint/2010/main">
+        <mc:Choice Requires="p14">
           <p:contentPart p14:bwMode="auto" r:id="rId18">
             <p14:nvContentPartPr>
               <p14:cNvPr id="69" name="Ink 68">
@@ -11682,7 +11717,7 @@
             </p14:xfrm>
           </p:contentPart>
         </mc:Choice>
-        <mc:Fallback>
+        <mc:Fallback xmlns="">
           <p:pic>
             <p:nvPicPr>
               <p:cNvPr id="69" name="Ink 68">
@@ -11713,8 +11748,8 @@
           </p:pic>
         </mc:Fallback>
       </mc:AlternateContent>
-      <mc:AlternateContent xmlns:mc="http://schemas.openxmlformats.org/markup-compatibility/2006">
-        <mc:Choice xmlns:p14="http://schemas.microsoft.com/office/powerpoint/2010/main" Requires="p14">
+      <mc:AlternateContent xmlns:mc="http://schemas.openxmlformats.org/markup-compatibility/2006" xmlns:p14="http://schemas.microsoft.com/office/powerpoint/2010/main">
+        <mc:Choice Requires="p14">
           <p:contentPart p14:bwMode="auto" r:id="rId20">
             <p14:nvContentPartPr>
               <p14:cNvPr id="72" name="Ink 71">
@@ -11733,7 +11768,7 @@
             </p14:xfrm>
           </p:contentPart>
         </mc:Choice>
-        <mc:Fallback>
+        <mc:Fallback xmlns="">
           <p:pic>
             <p:nvPicPr>
               <p:cNvPr id="72" name="Ink 71">
@@ -11764,8 +11799,8 @@
           </p:pic>
         </mc:Fallback>
       </mc:AlternateContent>
-      <mc:AlternateContent xmlns:mc="http://schemas.openxmlformats.org/markup-compatibility/2006">
-        <mc:Choice xmlns:p14="http://schemas.microsoft.com/office/powerpoint/2010/main" Requires="p14">
+      <mc:AlternateContent xmlns:mc="http://schemas.openxmlformats.org/markup-compatibility/2006" xmlns:p14="http://schemas.microsoft.com/office/powerpoint/2010/main">
+        <mc:Choice Requires="p14">
           <p:contentPart p14:bwMode="auto" r:id="rId22">
             <p14:nvContentPartPr>
               <p14:cNvPr id="73" name="Ink 72">
@@ -11784,7 +11819,7 @@
             </p14:xfrm>
           </p:contentPart>
         </mc:Choice>
-        <mc:Fallback>
+        <mc:Fallback xmlns="">
           <p:pic>
             <p:nvPicPr>
               <p:cNvPr id="73" name="Ink 72">
@@ -11815,8 +11850,8 @@
           </p:pic>
         </mc:Fallback>
       </mc:AlternateContent>
-      <mc:AlternateContent xmlns:mc="http://schemas.openxmlformats.org/markup-compatibility/2006">
-        <mc:Choice xmlns:p14="http://schemas.microsoft.com/office/powerpoint/2010/main" Requires="p14">
+      <mc:AlternateContent xmlns:mc="http://schemas.openxmlformats.org/markup-compatibility/2006" xmlns:p14="http://schemas.microsoft.com/office/powerpoint/2010/main">
+        <mc:Choice Requires="p14">
           <p:contentPart p14:bwMode="auto" r:id="rId24">
             <p14:nvContentPartPr>
               <p14:cNvPr id="77" name="Ink 76">
@@ -11835,7 +11870,7 @@
             </p14:xfrm>
           </p:contentPart>
         </mc:Choice>
-        <mc:Fallback>
+        <mc:Fallback xmlns="">
           <p:pic>
             <p:nvPicPr>
               <p:cNvPr id="77" name="Ink 76">
@@ -11866,8 +11901,8 @@
           </p:pic>
         </mc:Fallback>
       </mc:AlternateContent>
-      <mc:AlternateContent xmlns:mc="http://schemas.openxmlformats.org/markup-compatibility/2006">
-        <mc:Choice xmlns:p14="http://schemas.microsoft.com/office/powerpoint/2010/main" Requires="p14">
+      <mc:AlternateContent xmlns:mc="http://schemas.openxmlformats.org/markup-compatibility/2006" xmlns:p14="http://schemas.microsoft.com/office/powerpoint/2010/main">
+        <mc:Choice Requires="p14">
           <p:contentPart p14:bwMode="auto" r:id="rId26">
             <p14:nvContentPartPr>
               <p14:cNvPr id="83" name="Ink 82">
@@ -11886,7 +11921,7 @@
             </p14:xfrm>
           </p:contentPart>
         </mc:Choice>
-        <mc:Fallback>
+        <mc:Fallback xmlns="">
           <p:pic>
             <p:nvPicPr>
               <p:cNvPr id="83" name="Ink 82">
@@ -11917,8 +11952,8 @@
           </p:pic>
         </mc:Fallback>
       </mc:AlternateContent>
-      <mc:AlternateContent xmlns:mc="http://schemas.openxmlformats.org/markup-compatibility/2006">
-        <mc:Choice xmlns:p14="http://schemas.microsoft.com/office/powerpoint/2010/main" Requires="p14">
+      <mc:AlternateContent xmlns:mc="http://schemas.openxmlformats.org/markup-compatibility/2006" xmlns:p14="http://schemas.microsoft.com/office/powerpoint/2010/main">
+        <mc:Choice Requires="p14">
           <p:contentPart p14:bwMode="auto" r:id="rId28">
             <p14:nvContentPartPr>
               <p14:cNvPr id="101" name="Ink 100">
@@ -11937,7 +11972,7 @@
             </p14:xfrm>
           </p:contentPart>
         </mc:Choice>
-        <mc:Fallback>
+        <mc:Fallback xmlns="">
           <p:pic>
             <p:nvPicPr>
               <p:cNvPr id="101" name="Ink 100">
@@ -11968,8 +12003,8 @@
           </p:pic>
         </mc:Fallback>
       </mc:AlternateContent>
-      <mc:AlternateContent xmlns:mc="http://schemas.openxmlformats.org/markup-compatibility/2006">
-        <mc:Choice xmlns:p14="http://schemas.microsoft.com/office/powerpoint/2010/main" Requires="p14">
+      <mc:AlternateContent xmlns:mc="http://schemas.openxmlformats.org/markup-compatibility/2006" xmlns:p14="http://schemas.microsoft.com/office/powerpoint/2010/main">
+        <mc:Choice Requires="p14">
           <p:contentPart p14:bwMode="auto" r:id="rId30">
             <p14:nvContentPartPr>
               <p14:cNvPr id="102" name="Ink 101">
@@ -11988,7 +12023,7 @@
             </p14:xfrm>
           </p:contentPart>
         </mc:Choice>
-        <mc:Fallback>
+        <mc:Fallback xmlns="">
           <p:pic>
             <p:nvPicPr>
               <p:cNvPr id="102" name="Ink 101">
@@ -12019,8 +12054,8 @@
           </p:pic>
         </mc:Fallback>
       </mc:AlternateContent>
-      <mc:AlternateContent xmlns:mc="http://schemas.openxmlformats.org/markup-compatibility/2006">
-        <mc:Choice xmlns:p14="http://schemas.microsoft.com/office/powerpoint/2010/main" Requires="p14">
+      <mc:AlternateContent xmlns:mc="http://schemas.openxmlformats.org/markup-compatibility/2006" xmlns:p14="http://schemas.microsoft.com/office/powerpoint/2010/main">
+        <mc:Choice Requires="p14">
           <p:contentPart p14:bwMode="auto" r:id="rId32">
             <p14:nvContentPartPr>
               <p14:cNvPr id="103" name="Ink 102">
@@ -12039,7 +12074,7 @@
             </p14:xfrm>
           </p:contentPart>
         </mc:Choice>
-        <mc:Fallback>
+        <mc:Fallback xmlns="">
           <p:pic>
             <p:nvPicPr>
               <p:cNvPr id="103" name="Ink 102">
@@ -12070,8 +12105,8 @@
           </p:pic>
         </mc:Fallback>
       </mc:AlternateContent>
-      <mc:AlternateContent xmlns:mc="http://schemas.openxmlformats.org/markup-compatibility/2006">
-        <mc:Choice xmlns:p14="http://schemas.microsoft.com/office/powerpoint/2010/main" Requires="p14">
+      <mc:AlternateContent xmlns:mc="http://schemas.openxmlformats.org/markup-compatibility/2006" xmlns:p14="http://schemas.microsoft.com/office/powerpoint/2010/main">
+        <mc:Choice Requires="p14">
           <p:contentPart p14:bwMode="auto" r:id="rId34">
             <p14:nvContentPartPr>
               <p14:cNvPr id="111" name="Ink 110">
@@ -12090,7 +12125,7 @@
             </p14:xfrm>
           </p:contentPart>
         </mc:Choice>
-        <mc:Fallback>
+        <mc:Fallback xmlns="">
           <p:pic>
             <p:nvPicPr>
               <p:cNvPr id="111" name="Ink 110">
@@ -12121,8 +12156,8 @@
           </p:pic>
         </mc:Fallback>
       </mc:AlternateContent>
-      <mc:AlternateContent xmlns:mc="http://schemas.openxmlformats.org/markup-compatibility/2006">
-        <mc:Choice xmlns:p14="http://schemas.microsoft.com/office/powerpoint/2010/main" Requires="p14">
+      <mc:AlternateContent xmlns:mc="http://schemas.openxmlformats.org/markup-compatibility/2006" xmlns:p14="http://schemas.microsoft.com/office/powerpoint/2010/main">
+        <mc:Choice Requires="p14">
           <p:contentPart p14:bwMode="auto" r:id="rId36">
             <p14:nvContentPartPr>
               <p14:cNvPr id="112" name="Ink 111">
@@ -12141,7 +12176,7 @@
             </p14:xfrm>
           </p:contentPart>
         </mc:Choice>
-        <mc:Fallback>
+        <mc:Fallback xmlns="">
           <p:pic>
             <p:nvPicPr>
               <p:cNvPr id="112" name="Ink 111">
@@ -12172,8 +12207,8 @@
           </p:pic>
         </mc:Fallback>
       </mc:AlternateContent>
-      <mc:AlternateContent xmlns:mc="http://schemas.openxmlformats.org/markup-compatibility/2006">
-        <mc:Choice xmlns:p14="http://schemas.microsoft.com/office/powerpoint/2010/main" Requires="p14">
+      <mc:AlternateContent xmlns:mc="http://schemas.openxmlformats.org/markup-compatibility/2006" xmlns:p14="http://schemas.microsoft.com/office/powerpoint/2010/main">
+        <mc:Choice Requires="p14">
           <p:contentPart p14:bwMode="auto" r:id="rId38">
             <p14:nvContentPartPr>
               <p14:cNvPr id="115" name="Ink 114">
@@ -12192,7 +12227,7 @@
             </p14:xfrm>
           </p:contentPart>
         </mc:Choice>
-        <mc:Fallback>
+        <mc:Fallback xmlns="">
           <p:pic>
             <p:nvPicPr>
               <p:cNvPr id="115" name="Ink 114">
@@ -12223,8 +12258,8 @@
           </p:pic>
         </mc:Fallback>
       </mc:AlternateContent>
-      <mc:AlternateContent xmlns:mc="http://schemas.openxmlformats.org/markup-compatibility/2006">
-        <mc:Choice xmlns:p14="http://schemas.microsoft.com/office/powerpoint/2010/main" Requires="p14">
+      <mc:AlternateContent xmlns:mc="http://schemas.openxmlformats.org/markup-compatibility/2006" xmlns:p14="http://schemas.microsoft.com/office/powerpoint/2010/main">
+        <mc:Choice Requires="p14">
           <p:contentPart p14:bwMode="auto" r:id="rId40">
             <p14:nvContentPartPr>
               <p14:cNvPr id="124" name="Ink 123">
@@ -12243,7 +12278,7 @@
             </p14:xfrm>
           </p:contentPart>
         </mc:Choice>
-        <mc:Fallback>
+        <mc:Fallback xmlns="">
           <p:pic>
             <p:nvPicPr>
               <p:cNvPr id="124" name="Ink 123">
@@ -12274,8 +12309,8 @@
           </p:pic>
         </mc:Fallback>
       </mc:AlternateContent>
-      <mc:AlternateContent xmlns:mc="http://schemas.openxmlformats.org/markup-compatibility/2006">
-        <mc:Choice xmlns:p14="http://schemas.microsoft.com/office/powerpoint/2010/main" Requires="p14">
+      <mc:AlternateContent xmlns:mc="http://schemas.openxmlformats.org/markup-compatibility/2006" xmlns:p14="http://schemas.microsoft.com/office/powerpoint/2010/main">
+        <mc:Choice Requires="p14">
           <p:contentPart p14:bwMode="auto" r:id="rId42">
             <p14:nvContentPartPr>
               <p14:cNvPr id="131" name="Ink 130">
@@ -12294,7 +12329,7 @@
             </p14:xfrm>
           </p:contentPart>
         </mc:Choice>
-        <mc:Fallback>
+        <mc:Fallback xmlns="">
           <p:pic>
             <p:nvPicPr>
               <p:cNvPr id="131" name="Ink 130">
@@ -12325,8 +12360,8 @@
           </p:pic>
         </mc:Fallback>
       </mc:AlternateContent>
-      <mc:AlternateContent xmlns:mc="http://schemas.openxmlformats.org/markup-compatibility/2006">
-        <mc:Choice xmlns:p14="http://schemas.microsoft.com/office/powerpoint/2010/main" Requires="p14">
+      <mc:AlternateContent xmlns:mc="http://schemas.openxmlformats.org/markup-compatibility/2006" xmlns:p14="http://schemas.microsoft.com/office/powerpoint/2010/main">
+        <mc:Choice Requires="p14">
           <p:contentPart p14:bwMode="auto" r:id="rId44">
             <p14:nvContentPartPr>
               <p14:cNvPr id="150" name="Ink 149">
@@ -12345,7 +12380,7 @@
             </p14:xfrm>
           </p:contentPart>
         </mc:Choice>
-        <mc:Fallback>
+        <mc:Fallback xmlns="">
           <p:pic>
             <p:nvPicPr>
               <p:cNvPr id="150" name="Ink 149">
@@ -12376,8 +12411,8 @@
           </p:pic>
         </mc:Fallback>
       </mc:AlternateContent>
-      <mc:AlternateContent xmlns:mc="http://schemas.openxmlformats.org/markup-compatibility/2006">
-        <mc:Choice xmlns:p14="http://schemas.microsoft.com/office/powerpoint/2010/main" Requires="p14">
+      <mc:AlternateContent xmlns:mc="http://schemas.openxmlformats.org/markup-compatibility/2006" xmlns:p14="http://schemas.microsoft.com/office/powerpoint/2010/main">
+        <mc:Choice Requires="p14">
           <p:contentPart p14:bwMode="auto" r:id="rId46">
             <p14:nvContentPartPr>
               <p14:cNvPr id="156" name="Ink 155">
@@ -12396,7 +12431,7 @@
             </p14:xfrm>
           </p:contentPart>
         </mc:Choice>
-        <mc:Fallback>
+        <mc:Fallback xmlns="">
           <p:pic>
             <p:nvPicPr>
               <p:cNvPr id="156" name="Ink 155">
@@ -12427,8 +12462,8 @@
           </p:pic>
         </mc:Fallback>
       </mc:AlternateContent>
-      <mc:AlternateContent xmlns:mc="http://schemas.openxmlformats.org/markup-compatibility/2006">
-        <mc:Choice xmlns:p14="http://schemas.microsoft.com/office/powerpoint/2010/main" Requires="p14">
+      <mc:AlternateContent xmlns:mc="http://schemas.openxmlformats.org/markup-compatibility/2006" xmlns:p14="http://schemas.microsoft.com/office/powerpoint/2010/main">
+        <mc:Choice Requires="p14">
           <p:contentPart p14:bwMode="auto" r:id="rId48">
             <p14:nvContentPartPr>
               <p14:cNvPr id="161" name="Ink 160">
@@ -12447,7 +12482,7 @@
             </p14:xfrm>
           </p:contentPart>
         </mc:Choice>
-        <mc:Fallback>
+        <mc:Fallback xmlns="">
           <p:pic>
             <p:nvPicPr>
               <p:cNvPr id="161" name="Ink 160">
@@ -12478,8 +12513,8 @@
           </p:pic>
         </mc:Fallback>
       </mc:AlternateContent>
-      <mc:AlternateContent xmlns:mc="http://schemas.openxmlformats.org/markup-compatibility/2006">
-        <mc:Choice xmlns:p14="http://schemas.microsoft.com/office/powerpoint/2010/main" Requires="p14">
+      <mc:AlternateContent xmlns:mc="http://schemas.openxmlformats.org/markup-compatibility/2006" xmlns:p14="http://schemas.microsoft.com/office/powerpoint/2010/main">
+        <mc:Choice Requires="p14">
           <p:contentPart p14:bwMode="auto" r:id="rId50">
             <p14:nvContentPartPr>
               <p14:cNvPr id="165" name="Ink 164">
@@ -12498,7 +12533,7 @@
             </p14:xfrm>
           </p:contentPart>
         </mc:Choice>
-        <mc:Fallback>
+        <mc:Fallback xmlns="">
           <p:pic>
             <p:nvPicPr>
               <p:cNvPr id="165" name="Ink 164">
@@ -12529,8 +12564,8 @@
           </p:pic>
         </mc:Fallback>
       </mc:AlternateContent>
-      <mc:AlternateContent xmlns:mc="http://schemas.openxmlformats.org/markup-compatibility/2006">
-        <mc:Choice xmlns:p14="http://schemas.microsoft.com/office/powerpoint/2010/main" Requires="p14">
+      <mc:AlternateContent xmlns:mc="http://schemas.openxmlformats.org/markup-compatibility/2006" xmlns:p14="http://schemas.microsoft.com/office/powerpoint/2010/main">
+        <mc:Choice Requires="p14">
           <p:contentPart p14:bwMode="auto" r:id="rId52">
             <p14:nvContentPartPr>
               <p14:cNvPr id="166" name="Ink 165">
@@ -12549,7 +12584,7 @@
             </p14:xfrm>
           </p:contentPart>
         </mc:Choice>
-        <mc:Fallback>
+        <mc:Fallback xmlns="">
           <p:pic>
             <p:nvPicPr>
               <p:cNvPr id="166" name="Ink 165">
@@ -12580,8 +12615,8 @@
           </p:pic>
         </mc:Fallback>
       </mc:AlternateContent>
-      <mc:AlternateContent xmlns:mc="http://schemas.openxmlformats.org/markup-compatibility/2006">
-        <mc:Choice xmlns:p14="http://schemas.microsoft.com/office/powerpoint/2010/main" Requires="p14">
+      <mc:AlternateContent xmlns:mc="http://schemas.openxmlformats.org/markup-compatibility/2006" xmlns:p14="http://schemas.microsoft.com/office/powerpoint/2010/main">
+        <mc:Choice Requires="p14">
           <p:contentPart p14:bwMode="auto" r:id="rId54">
             <p14:nvContentPartPr>
               <p14:cNvPr id="167" name="Ink 166">
@@ -12600,7 +12635,7 @@
             </p14:xfrm>
           </p:contentPart>
         </mc:Choice>
-        <mc:Fallback>
+        <mc:Fallback xmlns="">
           <p:pic>
             <p:nvPicPr>
               <p:cNvPr id="167" name="Ink 166">
@@ -12631,8 +12666,8 @@
           </p:pic>
         </mc:Fallback>
       </mc:AlternateContent>
-      <mc:AlternateContent xmlns:mc="http://schemas.openxmlformats.org/markup-compatibility/2006">
-        <mc:Choice xmlns:p14="http://schemas.microsoft.com/office/powerpoint/2010/main" Requires="p14">
+      <mc:AlternateContent xmlns:mc="http://schemas.openxmlformats.org/markup-compatibility/2006" xmlns:p14="http://schemas.microsoft.com/office/powerpoint/2010/main">
+        <mc:Choice Requires="p14">
           <p:contentPart p14:bwMode="auto" r:id="rId56">
             <p14:nvContentPartPr>
               <p14:cNvPr id="171" name="Ink 170">
@@ -12651,7 +12686,7 @@
             </p14:xfrm>
           </p:contentPart>
         </mc:Choice>
-        <mc:Fallback>
+        <mc:Fallback xmlns="">
           <p:pic>
             <p:nvPicPr>
               <p:cNvPr id="171" name="Ink 170">
@@ -12682,8 +12717,8 @@
           </p:pic>
         </mc:Fallback>
       </mc:AlternateContent>
-      <mc:AlternateContent xmlns:mc="http://schemas.openxmlformats.org/markup-compatibility/2006">
-        <mc:Choice xmlns:p14="http://schemas.microsoft.com/office/powerpoint/2010/main" Requires="p14">
+      <mc:AlternateContent xmlns:mc="http://schemas.openxmlformats.org/markup-compatibility/2006" xmlns:p14="http://schemas.microsoft.com/office/powerpoint/2010/main">
+        <mc:Choice Requires="p14">
           <p:contentPart p14:bwMode="auto" r:id="rId58">
             <p14:nvContentPartPr>
               <p14:cNvPr id="174" name="Ink 173">
@@ -12702,7 +12737,7 @@
             </p14:xfrm>
           </p:contentPart>
         </mc:Choice>
-        <mc:Fallback>
+        <mc:Fallback xmlns="">
           <p:pic>
             <p:nvPicPr>
               <p:cNvPr id="174" name="Ink 173">
@@ -12882,8 +12917,8 @@
           </a:extLst>
         </p:spPr>
       </p:pic>
-      <mc:AlternateContent xmlns:mc="http://schemas.openxmlformats.org/markup-compatibility/2006">
-        <mc:Choice xmlns:p14="http://schemas.microsoft.com/office/powerpoint/2010/main" Requires="p14">
+      <mc:AlternateContent xmlns:mc="http://schemas.openxmlformats.org/markup-compatibility/2006" xmlns:p14="http://schemas.microsoft.com/office/powerpoint/2010/main">
+        <mc:Choice Requires="p14">
           <p:contentPart p14:bwMode="auto" r:id="rId4">
             <p14:nvContentPartPr>
               <p14:cNvPr id="1052" name="Ink 1051">
@@ -12902,7 +12937,7 @@
             </p14:xfrm>
           </p:contentPart>
         </mc:Choice>
-        <mc:Fallback>
+        <mc:Fallback xmlns="">
           <p:pic>
             <p:nvPicPr>
               <p:cNvPr id="1052" name="Ink 1051">
@@ -13035,8 +13070,8 @@
           </a:p>
         </p:txBody>
       </p:sp>
-      <mc:AlternateContent xmlns:mc="http://schemas.openxmlformats.org/markup-compatibility/2006">
-        <mc:Choice xmlns:p14="http://schemas.microsoft.com/office/powerpoint/2010/main" Requires="p14">
+      <mc:AlternateContent xmlns:mc="http://schemas.openxmlformats.org/markup-compatibility/2006" xmlns:p14="http://schemas.microsoft.com/office/powerpoint/2010/main">
+        <mc:Choice Requires="p14">
           <p:contentPart p14:bwMode="auto" r:id="rId3">
             <p14:nvContentPartPr>
               <p14:cNvPr id="1052" name="Ink 1051">
@@ -13055,7 +13090,7 @@
             </p14:xfrm>
           </p:contentPart>
         </mc:Choice>
-        <mc:Fallback>
+        <mc:Fallback xmlns="">
           <p:pic>
             <p:nvPicPr>
               <p:cNvPr id="1052" name="Ink 1051">
@@ -13086,8 +13121,8 @@
           </p:pic>
         </mc:Fallback>
       </mc:AlternateContent>
-      <mc:AlternateContent xmlns:mc="http://schemas.openxmlformats.org/markup-compatibility/2006">
-        <mc:Choice xmlns:p14="http://schemas.microsoft.com/office/powerpoint/2010/main" Requires="p14">
+      <mc:AlternateContent xmlns:mc="http://schemas.openxmlformats.org/markup-compatibility/2006" xmlns:p14="http://schemas.microsoft.com/office/powerpoint/2010/main">
+        <mc:Choice Requires="p14">
           <p:contentPart p14:bwMode="auto" r:id="rId5">
             <p14:nvContentPartPr>
               <p14:cNvPr id="7" name="Ink 6">
@@ -13106,7 +13141,7 @@
             </p14:xfrm>
           </p:contentPart>
         </mc:Choice>
-        <mc:Fallback>
+        <mc:Fallback xmlns="">
           <p:pic>
             <p:nvPicPr>
               <p:cNvPr id="7" name="Ink 6">
@@ -13137,8 +13172,8 @@
           </p:pic>
         </mc:Fallback>
       </mc:AlternateContent>
-      <mc:AlternateContent xmlns:mc="http://schemas.openxmlformats.org/markup-compatibility/2006">
-        <mc:Choice xmlns:p14="http://schemas.microsoft.com/office/powerpoint/2010/main" Requires="p14">
+      <mc:AlternateContent xmlns:mc="http://schemas.openxmlformats.org/markup-compatibility/2006" xmlns:p14="http://schemas.microsoft.com/office/powerpoint/2010/main">
+        <mc:Choice Requires="p14">
           <p:contentPart p14:bwMode="auto" r:id="rId7">
             <p14:nvContentPartPr>
               <p14:cNvPr id="11" name="Ink 10">
@@ -13157,7 +13192,7 @@
             </p14:xfrm>
           </p:contentPart>
         </mc:Choice>
-        <mc:Fallback>
+        <mc:Fallback xmlns="">
           <p:pic>
             <p:nvPicPr>
               <p:cNvPr id="11" name="Ink 10">
@@ -13188,8 +13223,8 @@
           </p:pic>
         </mc:Fallback>
       </mc:AlternateContent>
-      <mc:AlternateContent xmlns:mc="http://schemas.openxmlformats.org/markup-compatibility/2006">
-        <mc:Choice xmlns:p14="http://schemas.microsoft.com/office/powerpoint/2010/main" Requires="p14">
+      <mc:AlternateContent xmlns:mc="http://schemas.openxmlformats.org/markup-compatibility/2006" xmlns:p14="http://schemas.microsoft.com/office/powerpoint/2010/main">
+        <mc:Choice Requires="p14">
           <p:contentPart p14:bwMode="auto" r:id="rId9">
             <p14:nvContentPartPr>
               <p14:cNvPr id="16" name="Ink 15">
@@ -13208,7 +13243,7 @@
             </p14:xfrm>
           </p:contentPart>
         </mc:Choice>
-        <mc:Fallback>
+        <mc:Fallback xmlns="">
           <p:pic>
             <p:nvPicPr>
               <p:cNvPr id="16" name="Ink 15">
@@ -13239,8 +13274,8 @@
           </p:pic>
         </mc:Fallback>
       </mc:AlternateContent>
-      <mc:AlternateContent xmlns:mc="http://schemas.openxmlformats.org/markup-compatibility/2006">
-        <mc:Choice xmlns:p14="http://schemas.microsoft.com/office/powerpoint/2010/main" Requires="p14">
+      <mc:AlternateContent xmlns:mc="http://schemas.openxmlformats.org/markup-compatibility/2006" xmlns:p14="http://schemas.microsoft.com/office/powerpoint/2010/main">
+        <mc:Choice Requires="p14">
           <p:contentPart p14:bwMode="auto" r:id="rId11">
             <p14:nvContentPartPr>
               <p14:cNvPr id="1077" name="Ink 1076">
@@ -13259,7 +13294,7 @@
             </p14:xfrm>
           </p:contentPart>
         </mc:Choice>
-        <mc:Fallback>
+        <mc:Fallback xmlns="">
           <p:pic>
             <p:nvPicPr>
               <p:cNvPr id="1077" name="Ink 1076">
@@ -13290,8 +13325,8 @@
           </p:pic>
         </mc:Fallback>
       </mc:AlternateContent>
-      <mc:AlternateContent xmlns:mc="http://schemas.openxmlformats.org/markup-compatibility/2006">
-        <mc:Choice xmlns:p14="http://schemas.microsoft.com/office/powerpoint/2010/main" Requires="p14">
+      <mc:AlternateContent xmlns:mc="http://schemas.openxmlformats.org/markup-compatibility/2006" xmlns:p14="http://schemas.microsoft.com/office/powerpoint/2010/main">
+        <mc:Choice Requires="p14">
           <p:contentPart p14:bwMode="auto" r:id="rId13">
             <p14:nvContentPartPr>
               <p14:cNvPr id="1078" name="Ink 1077">
@@ -13310,7 +13345,7 @@
             </p14:xfrm>
           </p:contentPart>
         </mc:Choice>
-        <mc:Fallback>
+        <mc:Fallback xmlns="">
           <p:pic>
             <p:nvPicPr>
               <p:cNvPr id="1078" name="Ink 1077">
@@ -13341,8 +13376,8 @@
           </p:pic>
         </mc:Fallback>
       </mc:AlternateContent>
-      <mc:AlternateContent xmlns:mc="http://schemas.openxmlformats.org/markup-compatibility/2006">
-        <mc:Choice xmlns:p14="http://schemas.microsoft.com/office/powerpoint/2010/main" Requires="p14">
+      <mc:AlternateContent xmlns:mc="http://schemas.openxmlformats.org/markup-compatibility/2006" xmlns:p14="http://schemas.microsoft.com/office/powerpoint/2010/main">
+        <mc:Choice Requires="p14">
           <p:contentPart p14:bwMode="auto" r:id="rId15">
             <p14:nvContentPartPr>
               <p14:cNvPr id="1079" name="Ink 1078">
@@ -13361,7 +13396,7 @@
             </p14:xfrm>
           </p:contentPart>
         </mc:Choice>
-        <mc:Fallback>
+        <mc:Fallback xmlns="">
           <p:pic>
             <p:nvPicPr>
               <p:cNvPr id="1079" name="Ink 1078">

</xml_diff>